<commit_message>
#44: Add base API to get Slide Master collection
</commit_message>
<xml_diff>
--- a/ShapeCrawler.Tests.Unit/Resource/002.pptx
+++ b/ShapeCrawler.Tests.Unit/Resource/002.pptx
@@ -3,11 +3,12 @@
 <p:presentation xmlns:a="http://schemas.openxmlformats.org/drawingml/2006/main" xmlns:r="http://schemas.openxmlformats.org/officeDocument/2006/relationships" xmlns:p="http://schemas.openxmlformats.org/presentationml/2006/main" saveSubsetFonts="1">
   <p:sldMasterIdLst>
     <p:sldMasterId id="2147483648" r:id="rId1"/>
+    <p:sldMasterId id="2147483660" r:id="rId2"/>
   </p:sldMasterIdLst>
   <p:sldIdLst>
-    <p:sldId id="256" r:id="rId2"/>
-    <p:sldId id="257" r:id="rId3"/>
-    <p:sldId id="258" r:id="rId4"/>
+    <p:sldId id="256" r:id="rId3"/>
+    <p:sldId id="257" r:id="rId4"/>
+    <p:sldId id="258" r:id="rId5"/>
   </p:sldIdLst>
   <p:sldSz cx="12192000" cy="6858000"/>
   <p:notesSz cx="6858000" cy="9144000"/>
@@ -1263,7 +1264,7 @@
           <a:p>
             <a:fld id="{6A2D1428-0459-4F75-829F-043936AE8C9E}" type="datetimeFigureOut">
               <a:rPr lang="en-US" smtClean="0"/>
-              <a:t>12/29/2020</a:t>
+              <a:t>1/16/2021</a:t>
             </a:fld>
             <a:endParaRPr lang="en-US"/>
           </a:p>
@@ -1463,7 +1464,7 @@
           <a:p>
             <a:fld id="{6A2D1428-0459-4F75-829F-043936AE8C9E}" type="datetimeFigureOut">
               <a:rPr lang="en-US" smtClean="0"/>
-              <a:t>12/29/2020</a:t>
+              <a:t>1/16/2021</a:t>
             </a:fld>
             <a:endParaRPr lang="en-US"/>
           </a:p>
@@ -1673,7 +1674,7 @@
           <a:p>
             <a:fld id="{6A2D1428-0459-4F75-829F-043936AE8C9E}" type="datetimeFigureOut">
               <a:rPr lang="en-US" smtClean="0"/>
-              <a:t>12/29/2020</a:t>
+              <a:t>1/16/2021</a:t>
             </a:fld>
             <a:endParaRPr lang="en-US"/>
           </a:p>
@@ -1737,6 +1738,1955 @@
     <p:extLst>
       <p:ext uri="{BB962C8B-B14F-4D97-AF65-F5344CB8AC3E}">
         <p14:creationId xmlns:p14="http://schemas.microsoft.com/office/powerpoint/2010/main" val="1918736846"/>
+      </p:ext>
+    </p:extLst>
+  </p:cSld>
+  <p:clrMapOvr>
+    <a:masterClrMapping/>
+  </p:clrMapOvr>
+</p:sldLayout>
+</file>
+
+<file path=ppt/slideLayouts/slideLayout12.xml><?xml version="1.0" encoding="utf-8"?>
+<p:sldLayout xmlns:a="http://schemas.openxmlformats.org/drawingml/2006/main" xmlns:r="http://schemas.openxmlformats.org/officeDocument/2006/relationships" xmlns:p="http://schemas.openxmlformats.org/presentationml/2006/main" type="title" preserve="1">
+  <p:cSld name="Title Slide">
+    <p:spTree>
+      <p:nvGrpSpPr>
+        <p:cNvPr id="1" name=""/>
+        <p:cNvGrpSpPr/>
+        <p:nvPr/>
+      </p:nvGrpSpPr>
+      <p:grpSpPr>
+        <a:xfrm>
+          <a:off x="0" y="0"/>
+          <a:ext cx="0" cy="0"/>
+          <a:chOff x="0" y="0"/>
+          <a:chExt cx="0" cy="0"/>
+        </a:xfrm>
+      </p:grpSpPr>
+      <p:sp>
+        <p:nvSpPr>
+          <p:cNvPr id="2" name="Title 1">
+            <a:extLst>
+              <a:ext uri="{FF2B5EF4-FFF2-40B4-BE49-F238E27FC236}">
+                <a16:creationId xmlns:a16="http://schemas.microsoft.com/office/drawing/2014/main" id="{F23892C7-9DD1-434E-AA12-D47DFEBC237B}"/>
+              </a:ext>
+            </a:extLst>
+          </p:cNvPr>
+          <p:cNvSpPr>
+            <a:spLocks noGrp="1"/>
+          </p:cNvSpPr>
+          <p:nvPr>
+            <p:ph type="ctrTitle"/>
+          </p:nvPr>
+        </p:nvSpPr>
+        <p:spPr>
+          <a:xfrm>
+            <a:off x="1524000" y="1122363"/>
+            <a:ext cx="9144000" cy="2387600"/>
+          </a:xfrm>
+        </p:spPr>
+        <p:txBody>
+          <a:bodyPr anchor="b"/>
+          <a:lstStyle>
+            <a:lvl1pPr algn="ctr">
+              <a:defRPr sz="6000"/>
+            </a:lvl1pPr>
+          </a:lstStyle>
+          <a:p>
+            <a:r>
+              <a:rPr lang="en-US"/>
+              <a:t>Click to edit Master title style</a:t>
+            </a:r>
+            <a:endParaRPr lang="ru-RU"/>
+          </a:p>
+        </p:txBody>
+      </p:sp>
+      <p:sp>
+        <p:nvSpPr>
+          <p:cNvPr id="3" name="Subtitle 2">
+            <a:extLst>
+              <a:ext uri="{FF2B5EF4-FFF2-40B4-BE49-F238E27FC236}">
+                <a16:creationId xmlns:a16="http://schemas.microsoft.com/office/drawing/2014/main" id="{E4332632-BF3A-4A82-AE40-F51F13614710}"/>
+              </a:ext>
+            </a:extLst>
+          </p:cNvPr>
+          <p:cNvSpPr>
+            <a:spLocks noGrp="1"/>
+          </p:cNvSpPr>
+          <p:nvPr>
+            <p:ph type="subTitle" idx="1"/>
+          </p:nvPr>
+        </p:nvSpPr>
+        <p:spPr>
+          <a:xfrm>
+            <a:off x="1524000" y="3602038"/>
+            <a:ext cx="9144000" cy="1655762"/>
+          </a:xfrm>
+        </p:spPr>
+        <p:txBody>
+          <a:bodyPr/>
+          <a:lstStyle>
+            <a:lvl1pPr marL="0" indent="0" algn="ctr">
+              <a:buNone/>
+              <a:defRPr sz="2400"/>
+            </a:lvl1pPr>
+            <a:lvl2pPr marL="457200" indent="0" algn="ctr">
+              <a:buNone/>
+              <a:defRPr sz="2000"/>
+            </a:lvl2pPr>
+            <a:lvl3pPr marL="914400" indent="0" algn="ctr">
+              <a:buNone/>
+              <a:defRPr sz="1800"/>
+            </a:lvl3pPr>
+            <a:lvl4pPr marL="1371600" indent="0" algn="ctr">
+              <a:buNone/>
+              <a:defRPr sz="1600"/>
+            </a:lvl4pPr>
+            <a:lvl5pPr marL="1828800" indent="0" algn="ctr">
+              <a:buNone/>
+              <a:defRPr sz="1600"/>
+            </a:lvl5pPr>
+            <a:lvl6pPr marL="2286000" indent="0" algn="ctr">
+              <a:buNone/>
+              <a:defRPr sz="1600"/>
+            </a:lvl6pPr>
+            <a:lvl7pPr marL="2743200" indent="0" algn="ctr">
+              <a:buNone/>
+              <a:defRPr sz="1600"/>
+            </a:lvl7pPr>
+            <a:lvl8pPr marL="3200400" indent="0" algn="ctr">
+              <a:buNone/>
+              <a:defRPr sz="1600"/>
+            </a:lvl8pPr>
+            <a:lvl9pPr marL="3657600" indent="0" algn="ctr">
+              <a:buNone/>
+              <a:defRPr sz="1600"/>
+            </a:lvl9pPr>
+          </a:lstStyle>
+          <a:p>
+            <a:r>
+              <a:rPr lang="en-US"/>
+              <a:t>Click to edit Master subtitle style</a:t>
+            </a:r>
+            <a:endParaRPr lang="ru-RU"/>
+          </a:p>
+        </p:txBody>
+      </p:sp>
+      <p:sp>
+        <p:nvSpPr>
+          <p:cNvPr id="4" name="Date Placeholder 3">
+            <a:extLst>
+              <a:ext uri="{FF2B5EF4-FFF2-40B4-BE49-F238E27FC236}">
+                <a16:creationId xmlns:a16="http://schemas.microsoft.com/office/drawing/2014/main" id="{D0ADC6C2-7F75-43A7-9EC9-6E5D37A0AA15}"/>
+              </a:ext>
+            </a:extLst>
+          </p:cNvPr>
+          <p:cNvSpPr>
+            <a:spLocks noGrp="1"/>
+          </p:cNvSpPr>
+          <p:nvPr>
+            <p:ph type="dt" sz="half" idx="10"/>
+          </p:nvPr>
+        </p:nvSpPr>
+        <p:spPr/>
+        <p:txBody>
+          <a:bodyPr/>
+          <a:lstStyle/>
+          <a:p>
+            <a:fld id="{CCE9C9EE-394A-4997-9AB6-FF4DF45241DD}" type="datetimeFigureOut">
+              <a:rPr lang="ru-RU" smtClean="0"/>
+              <a:t>16.01.2021</a:t>
+            </a:fld>
+            <a:endParaRPr lang="ru-RU"/>
+          </a:p>
+        </p:txBody>
+      </p:sp>
+      <p:sp>
+        <p:nvSpPr>
+          <p:cNvPr id="5" name="Footer Placeholder 4">
+            <a:extLst>
+              <a:ext uri="{FF2B5EF4-FFF2-40B4-BE49-F238E27FC236}">
+                <a16:creationId xmlns:a16="http://schemas.microsoft.com/office/drawing/2014/main" id="{5B1D918C-D00F-4F54-BEAC-F43BE12B0E91}"/>
+              </a:ext>
+            </a:extLst>
+          </p:cNvPr>
+          <p:cNvSpPr>
+            <a:spLocks noGrp="1"/>
+          </p:cNvSpPr>
+          <p:nvPr>
+            <p:ph type="ftr" sz="quarter" idx="11"/>
+          </p:nvPr>
+        </p:nvSpPr>
+        <p:spPr/>
+        <p:txBody>
+          <a:bodyPr/>
+          <a:lstStyle/>
+          <a:p>
+            <a:endParaRPr lang="ru-RU"/>
+          </a:p>
+        </p:txBody>
+      </p:sp>
+      <p:sp>
+        <p:nvSpPr>
+          <p:cNvPr id="6" name="Slide Number Placeholder 5">
+            <a:extLst>
+              <a:ext uri="{FF2B5EF4-FFF2-40B4-BE49-F238E27FC236}">
+                <a16:creationId xmlns:a16="http://schemas.microsoft.com/office/drawing/2014/main" id="{43E6C5EB-30AE-4ADE-BCA3-FA2007C4BE3E}"/>
+              </a:ext>
+            </a:extLst>
+          </p:cNvPr>
+          <p:cNvSpPr>
+            <a:spLocks noGrp="1"/>
+          </p:cNvSpPr>
+          <p:nvPr>
+            <p:ph type="sldNum" sz="quarter" idx="12"/>
+          </p:nvPr>
+        </p:nvSpPr>
+        <p:spPr/>
+        <p:txBody>
+          <a:bodyPr/>
+          <a:lstStyle/>
+          <a:p>
+            <a:fld id="{163AA9C3-46E6-45F3-8D85-E86FB74784B0}" type="slidenum">
+              <a:rPr lang="ru-RU" smtClean="0"/>
+              <a:t>‹#›</a:t>
+            </a:fld>
+            <a:endParaRPr lang="ru-RU"/>
+          </a:p>
+        </p:txBody>
+      </p:sp>
+    </p:spTree>
+    <p:extLst>
+      <p:ext uri="{BB962C8B-B14F-4D97-AF65-F5344CB8AC3E}">
+        <p14:creationId xmlns:p14="http://schemas.microsoft.com/office/powerpoint/2010/main" val="3455675271"/>
+      </p:ext>
+    </p:extLst>
+  </p:cSld>
+  <p:clrMapOvr>
+    <a:masterClrMapping/>
+  </p:clrMapOvr>
+</p:sldLayout>
+</file>
+
+<file path=ppt/slideLayouts/slideLayout13.xml><?xml version="1.0" encoding="utf-8"?>
+<p:sldLayout xmlns:a="http://schemas.openxmlformats.org/drawingml/2006/main" xmlns:r="http://schemas.openxmlformats.org/officeDocument/2006/relationships" xmlns:p="http://schemas.openxmlformats.org/presentationml/2006/main" type="obj" preserve="1">
+  <p:cSld name="Title and Content">
+    <p:spTree>
+      <p:nvGrpSpPr>
+        <p:cNvPr id="1" name=""/>
+        <p:cNvGrpSpPr/>
+        <p:nvPr/>
+      </p:nvGrpSpPr>
+      <p:grpSpPr>
+        <a:xfrm>
+          <a:off x="0" y="0"/>
+          <a:ext cx="0" cy="0"/>
+          <a:chOff x="0" y="0"/>
+          <a:chExt cx="0" cy="0"/>
+        </a:xfrm>
+      </p:grpSpPr>
+      <p:sp>
+        <p:nvSpPr>
+          <p:cNvPr id="2" name="Title 1">
+            <a:extLst>
+              <a:ext uri="{FF2B5EF4-FFF2-40B4-BE49-F238E27FC236}">
+                <a16:creationId xmlns:a16="http://schemas.microsoft.com/office/drawing/2014/main" id="{AA097075-A5C3-4C36-B3BC-0832802A0A7B}"/>
+              </a:ext>
+            </a:extLst>
+          </p:cNvPr>
+          <p:cNvSpPr>
+            <a:spLocks noGrp="1"/>
+          </p:cNvSpPr>
+          <p:nvPr>
+            <p:ph type="title"/>
+          </p:nvPr>
+        </p:nvSpPr>
+        <p:spPr/>
+        <p:txBody>
+          <a:bodyPr/>
+          <a:lstStyle/>
+          <a:p>
+            <a:r>
+              <a:rPr lang="en-US"/>
+              <a:t>Click to edit Master title style</a:t>
+            </a:r>
+            <a:endParaRPr lang="ru-RU"/>
+          </a:p>
+        </p:txBody>
+      </p:sp>
+      <p:sp>
+        <p:nvSpPr>
+          <p:cNvPr id="3" name="Content Placeholder 2">
+            <a:extLst>
+              <a:ext uri="{FF2B5EF4-FFF2-40B4-BE49-F238E27FC236}">
+                <a16:creationId xmlns:a16="http://schemas.microsoft.com/office/drawing/2014/main" id="{F36578B8-B788-4DCB-9BA3-C7634D4CBDA1}"/>
+              </a:ext>
+            </a:extLst>
+          </p:cNvPr>
+          <p:cNvSpPr>
+            <a:spLocks noGrp="1"/>
+          </p:cNvSpPr>
+          <p:nvPr>
+            <p:ph idx="1"/>
+          </p:nvPr>
+        </p:nvSpPr>
+        <p:spPr/>
+        <p:txBody>
+          <a:bodyPr/>
+          <a:lstStyle/>
+          <a:p>
+            <a:pPr lvl="0"/>
+            <a:r>
+              <a:rPr lang="en-US"/>
+              <a:t>Click to edit Master text styles</a:t>
+            </a:r>
+          </a:p>
+          <a:p>
+            <a:pPr lvl="1"/>
+            <a:r>
+              <a:rPr lang="en-US"/>
+              <a:t>Second level</a:t>
+            </a:r>
+          </a:p>
+          <a:p>
+            <a:pPr lvl="2"/>
+            <a:r>
+              <a:rPr lang="en-US"/>
+              <a:t>Third level</a:t>
+            </a:r>
+          </a:p>
+          <a:p>
+            <a:pPr lvl="3"/>
+            <a:r>
+              <a:rPr lang="en-US"/>
+              <a:t>Fourth level</a:t>
+            </a:r>
+          </a:p>
+          <a:p>
+            <a:pPr lvl="4"/>
+            <a:r>
+              <a:rPr lang="en-US"/>
+              <a:t>Fifth level</a:t>
+            </a:r>
+            <a:endParaRPr lang="ru-RU"/>
+          </a:p>
+        </p:txBody>
+      </p:sp>
+      <p:sp>
+        <p:nvSpPr>
+          <p:cNvPr id="4" name="Date Placeholder 3">
+            <a:extLst>
+              <a:ext uri="{FF2B5EF4-FFF2-40B4-BE49-F238E27FC236}">
+                <a16:creationId xmlns:a16="http://schemas.microsoft.com/office/drawing/2014/main" id="{A4F7FF1E-688B-485D-A515-211F5E276BAC}"/>
+              </a:ext>
+            </a:extLst>
+          </p:cNvPr>
+          <p:cNvSpPr>
+            <a:spLocks noGrp="1"/>
+          </p:cNvSpPr>
+          <p:nvPr>
+            <p:ph type="dt" sz="half" idx="10"/>
+          </p:nvPr>
+        </p:nvSpPr>
+        <p:spPr/>
+        <p:txBody>
+          <a:bodyPr/>
+          <a:lstStyle/>
+          <a:p>
+            <a:fld id="{CCE9C9EE-394A-4997-9AB6-FF4DF45241DD}" type="datetimeFigureOut">
+              <a:rPr lang="ru-RU" smtClean="0"/>
+              <a:t>16.01.2021</a:t>
+            </a:fld>
+            <a:endParaRPr lang="ru-RU"/>
+          </a:p>
+        </p:txBody>
+      </p:sp>
+      <p:sp>
+        <p:nvSpPr>
+          <p:cNvPr id="5" name="Footer Placeholder 4">
+            <a:extLst>
+              <a:ext uri="{FF2B5EF4-FFF2-40B4-BE49-F238E27FC236}">
+                <a16:creationId xmlns:a16="http://schemas.microsoft.com/office/drawing/2014/main" id="{937593EC-FD23-442E-8531-49B401BF434E}"/>
+              </a:ext>
+            </a:extLst>
+          </p:cNvPr>
+          <p:cNvSpPr>
+            <a:spLocks noGrp="1"/>
+          </p:cNvSpPr>
+          <p:nvPr>
+            <p:ph type="ftr" sz="quarter" idx="11"/>
+          </p:nvPr>
+        </p:nvSpPr>
+        <p:spPr/>
+        <p:txBody>
+          <a:bodyPr/>
+          <a:lstStyle/>
+          <a:p>
+            <a:endParaRPr lang="ru-RU"/>
+          </a:p>
+        </p:txBody>
+      </p:sp>
+      <p:sp>
+        <p:nvSpPr>
+          <p:cNvPr id="6" name="Slide Number Placeholder 5">
+            <a:extLst>
+              <a:ext uri="{FF2B5EF4-FFF2-40B4-BE49-F238E27FC236}">
+                <a16:creationId xmlns:a16="http://schemas.microsoft.com/office/drawing/2014/main" id="{6FFEAB9B-59E4-40C6-B197-32B5C6294782}"/>
+              </a:ext>
+            </a:extLst>
+          </p:cNvPr>
+          <p:cNvSpPr>
+            <a:spLocks noGrp="1"/>
+          </p:cNvSpPr>
+          <p:nvPr>
+            <p:ph type="sldNum" sz="quarter" idx="12"/>
+          </p:nvPr>
+        </p:nvSpPr>
+        <p:spPr/>
+        <p:txBody>
+          <a:bodyPr/>
+          <a:lstStyle/>
+          <a:p>
+            <a:fld id="{163AA9C3-46E6-45F3-8D85-E86FB74784B0}" type="slidenum">
+              <a:rPr lang="ru-RU" smtClean="0"/>
+              <a:t>‹#›</a:t>
+            </a:fld>
+            <a:endParaRPr lang="ru-RU"/>
+          </a:p>
+        </p:txBody>
+      </p:sp>
+    </p:spTree>
+    <p:extLst>
+      <p:ext uri="{BB962C8B-B14F-4D97-AF65-F5344CB8AC3E}">
+        <p14:creationId xmlns:p14="http://schemas.microsoft.com/office/powerpoint/2010/main" val="873709580"/>
+      </p:ext>
+    </p:extLst>
+  </p:cSld>
+  <p:clrMapOvr>
+    <a:masterClrMapping/>
+  </p:clrMapOvr>
+</p:sldLayout>
+</file>
+
+<file path=ppt/slideLayouts/slideLayout14.xml><?xml version="1.0" encoding="utf-8"?>
+<p:sldLayout xmlns:a="http://schemas.openxmlformats.org/drawingml/2006/main" xmlns:r="http://schemas.openxmlformats.org/officeDocument/2006/relationships" xmlns:p="http://schemas.openxmlformats.org/presentationml/2006/main" type="secHead" preserve="1">
+  <p:cSld name="Section Header">
+    <p:spTree>
+      <p:nvGrpSpPr>
+        <p:cNvPr id="1" name=""/>
+        <p:cNvGrpSpPr/>
+        <p:nvPr/>
+      </p:nvGrpSpPr>
+      <p:grpSpPr>
+        <a:xfrm>
+          <a:off x="0" y="0"/>
+          <a:ext cx="0" cy="0"/>
+          <a:chOff x="0" y="0"/>
+          <a:chExt cx="0" cy="0"/>
+        </a:xfrm>
+      </p:grpSpPr>
+      <p:sp>
+        <p:nvSpPr>
+          <p:cNvPr id="2" name="Title 1">
+            <a:extLst>
+              <a:ext uri="{FF2B5EF4-FFF2-40B4-BE49-F238E27FC236}">
+                <a16:creationId xmlns:a16="http://schemas.microsoft.com/office/drawing/2014/main" id="{A725B5D6-315B-4685-A0C3-7E37C3B3377B}"/>
+              </a:ext>
+            </a:extLst>
+          </p:cNvPr>
+          <p:cNvSpPr>
+            <a:spLocks noGrp="1"/>
+          </p:cNvSpPr>
+          <p:nvPr>
+            <p:ph type="title"/>
+          </p:nvPr>
+        </p:nvSpPr>
+        <p:spPr>
+          <a:xfrm>
+            <a:off x="831850" y="1709738"/>
+            <a:ext cx="10515600" cy="2852737"/>
+          </a:xfrm>
+        </p:spPr>
+        <p:txBody>
+          <a:bodyPr anchor="b"/>
+          <a:lstStyle>
+            <a:lvl1pPr>
+              <a:defRPr sz="6000"/>
+            </a:lvl1pPr>
+          </a:lstStyle>
+          <a:p>
+            <a:r>
+              <a:rPr lang="en-US"/>
+              <a:t>Click to edit Master title style</a:t>
+            </a:r>
+            <a:endParaRPr lang="ru-RU"/>
+          </a:p>
+        </p:txBody>
+      </p:sp>
+      <p:sp>
+        <p:nvSpPr>
+          <p:cNvPr id="3" name="Text Placeholder 2">
+            <a:extLst>
+              <a:ext uri="{FF2B5EF4-FFF2-40B4-BE49-F238E27FC236}">
+                <a16:creationId xmlns:a16="http://schemas.microsoft.com/office/drawing/2014/main" id="{0BC8CCA9-4616-47FD-84BC-ADE234C119C5}"/>
+              </a:ext>
+            </a:extLst>
+          </p:cNvPr>
+          <p:cNvSpPr>
+            <a:spLocks noGrp="1"/>
+          </p:cNvSpPr>
+          <p:nvPr>
+            <p:ph type="body" idx="1"/>
+          </p:nvPr>
+        </p:nvSpPr>
+        <p:spPr>
+          <a:xfrm>
+            <a:off x="831850" y="4589463"/>
+            <a:ext cx="10515600" cy="1500187"/>
+          </a:xfrm>
+        </p:spPr>
+        <p:txBody>
+          <a:bodyPr/>
+          <a:lstStyle>
+            <a:lvl1pPr marL="0" indent="0">
+              <a:buNone/>
+              <a:defRPr sz="2400">
+                <a:solidFill>
+                  <a:schemeClr val="tx1">
+                    <a:tint val="75000"/>
+                  </a:schemeClr>
+                </a:solidFill>
+              </a:defRPr>
+            </a:lvl1pPr>
+            <a:lvl2pPr marL="457200" indent="0">
+              <a:buNone/>
+              <a:defRPr sz="2000">
+                <a:solidFill>
+                  <a:schemeClr val="tx1">
+                    <a:tint val="75000"/>
+                  </a:schemeClr>
+                </a:solidFill>
+              </a:defRPr>
+            </a:lvl2pPr>
+            <a:lvl3pPr marL="914400" indent="0">
+              <a:buNone/>
+              <a:defRPr sz="1800">
+                <a:solidFill>
+                  <a:schemeClr val="tx1">
+                    <a:tint val="75000"/>
+                  </a:schemeClr>
+                </a:solidFill>
+              </a:defRPr>
+            </a:lvl3pPr>
+            <a:lvl4pPr marL="1371600" indent="0">
+              <a:buNone/>
+              <a:defRPr sz="1600">
+                <a:solidFill>
+                  <a:schemeClr val="tx1">
+                    <a:tint val="75000"/>
+                  </a:schemeClr>
+                </a:solidFill>
+              </a:defRPr>
+            </a:lvl4pPr>
+            <a:lvl5pPr marL="1828800" indent="0">
+              <a:buNone/>
+              <a:defRPr sz="1600">
+                <a:solidFill>
+                  <a:schemeClr val="tx1">
+                    <a:tint val="75000"/>
+                  </a:schemeClr>
+                </a:solidFill>
+              </a:defRPr>
+            </a:lvl5pPr>
+            <a:lvl6pPr marL="2286000" indent="0">
+              <a:buNone/>
+              <a:defRPr sz="1600">
+                <a:solidFill>
+                  <a:schemeClr val="tx1">
+                    <a:tint val="75000"/>
+                  </a:schemeClr>
+                </a:solidFill>
+              </a:defRPr>
+            </a:lvl6pPr>
+            <a:lvl7pPr marL="2743200" indent="0">
+              <a:buNone/>
+              <a:defRPr sz="1600">
+                <a:solidFill>
+                  <a:schemeClr val="tx1">
+                    <a:tint val="75000"/>
+                  </a:schemeClr>
+                </a:solidFill>
+              </a:defRPr>
+            </a:lvl7pPr>
+            <a:lvl8pPr marL="3200400" indent="0">
+              <a:buNone/>
+              <a:defRPr sz="1600">
+                <a:solidFill>
+                  <a:schemeClr val="tx1">
+                    <a:tint val="75000"/>
+                  </a:schemeClr>
+                </a:solidFill>
+              </a:defRPr>
+            </a:lvl8pPr>
+            <a:lvl9pPr marL="3657600" indent="0">
+              <a:buNone/>
+              <a:defRPr sz="1600">
+                <a:solidFill>
+                  <a:schemeClr val="tx1">
+                    <a:tint val="75000"/>
+                  </a:schemeClr>
+                </a:solidFill>
+              </a:defRPr>
+            </a:lvl9pPr>
+          </a:lstStyle>
+          <a:p>
+            <a:pPr lvl="0"/>
+            <a:r>
+              <a:rPr lang="en-US"/>
+              <a:t>Click to edit Master text styles</a:t>
+            </a:r>
+          </a:p>
+        </p:txBody>
+      </p:sp>
+      <p:sp>
+        <p:nvSpPr>
+          <p:cNvPr id="4" name="Date Placeholder 3">
+            <a:extLst>
+              <a:ext uri="{FF2B5EF4-FFF2-40B4-BE49-F238E27FC236}">
+                <a16:creationId xmlns:a16="http://schemas.microsoft.com/office/drawing/2014/main" id="{C7694868-A2F6-4159-9DB2-C643C67F88C3}"/>
+              </a:ext>
+            </a:extLst>
+          </p:cNvPr>
+          <p:cNvSpPr>
+            <a:spLocks noGrp="1"/>
+          </p:cNvSpPr>
+          <p:nvPr>
+            <p:ph type="dt" sz="half" idx="10"/>
+          </p:nvPr>
+        </p:nvSpPr>
+        <p:spPr/>
+        <p:txBody>
+          <a:bodyPr/>
+          <a:lstStyle/>
+          <a:p>
+            <a:fld id="{CCE9C9EE-394A-4997-9AB6-FF4DF45241DD}" type="datetimeFigureOut">
+              <a:rPr lang="ru-RU" smtClean="0"/>
+              <a:t>16.01.2021</a:t>
+            </a:fld>
+            <a:endParaRPr lang="ru-RU"/>
+          </a:p>
+        </p:txBody>
+      </p:sp>
+      <p:sp>
+        <p:nvSpPr>
+          <p:cNvPr id="5" name="Footer Placeholder 4">
+            <a:extLst>
+              <a:ext uri="{FF2B5EF4-FFF2-40B4-BE49-F238E27FC236}">
+                <a16:creationId xmlns:a16="http://schemas.microsoft.com/office/drawing/2014/main" id="{66205A39-F16B-46DB-8333-A0C3ED2DF876}"/>
+              </a:ext>
+            </a:extLst>
+          </p:cNvPr>
+          <p:cNvSpPr>
+            <a:spLocks noGrp="1"/>
+          </p:cNvSpPr>
+          <p:nvPr>
+            <p:ph type="ftr" sz="quarter" idx="11"/>
+          </p:nvPr>
+        </p:nvSpPr>
+        <p:spPr/>
+        <p:txBody>
+          <a:bodyPr/>
+          <a:lstStyle/>
+          <a:p>
+            <a:endParaRPr lang="ru-RU"/>
+          </a:p>
+        </p:txBody>
+      </p:sp>
+      <p:sp>
+        <p:nvSpPr>
+          <p:cNvPr id="6" name="Slide Number Placeholder 5">
+            <a:extLst>
+              <a:ext uri="{FF2B5EF4-FFF2-40B4-BE49-F238E27FC236}">
+                <a16:creationId xmlns:a16="http://schemas.microsoft.com/office/drawing/2014/main" id="{57B59FCB-7F13-4F2E-A64A-93EDD1EDB633}"/>
+              </a:ext>
+            </a:extLst>
+          </p:cNvPr>
+          <p:cNvSpPr>
+            <a:spLocks noGrp="1"/>
+          </p:cNvSpPr>
+          <p:nvPr>
+            <p:ph type="sldNum" sz="quarter" idx="12"/>
+          </p:nvPr>
+        </p:nvSpPr>
+        <p:spPr/>
+        <p:txBody>
+          <a:bodyPr/>
+          <a:lstStyle/>
+          <a:p>
+            <a:fld id="{163AA9C3-46E6-45F3-8D85-E86FB74784B0}" type="slidenum">
+              <a:rPr lang="ru-RU" smtClean="0"/>
+              <a:t>‹#›</a:t>
+            </a:fld>
+            <a:endParaRPr lang="ru-RU"/>
+          </a:p>
+        </p:txBody>
+      </p:sp>
+    </p:spTree>
+    <p:extLst>
+      <p:ext uri="{BB962C8B-B14F-4D97-AF65-F5344CB8AC3E}">
+        <p14:creationId xmlns:p14="http://schemas.microsoft.com/office/powerpoint/2010/main" val="3948370147"/>
+      </p:ext>
+    </p:extLst>
+  </p:cSld>
+  <p:clrMapOvr>
+    <a:masterClrMapping/>
+  </p:clrMapOvr>
+</p:sldLayout>
+</file>
+
+<file path=ppt/slideLayouts/slideLayout15.xml><?xml version="1.0" encoding="utf-8"?>
+<p:sldLayout xmlns:a="http://schemas.openxmlformats.org/drawingml/2006/main" xmlns:r="http://schemas.openxmlformats.org/officeDocument/2006/relationships" xmlns:p="http://schemas.openxmlformats.org/presentationml/2006/main" type="twoObj" preserve="1">
+  <p:cSld name="Two Content">
+    <p:spTree>
+      <p:nvGrpSpPr>
+        <p:cNvPr id="1" name=""/>
+        <p:cNvGrpSpPr/>
+        <p:nvPr/>
+      </p:nvGrpSpPr>
+      <p:grpSpPr>
+        <a:xfrm>
+          <a:off x="0" y="0"/>
+          <a:ext cx="0" cy="0"/>
+          <a:chOff x="0" y="0"/>
+          <a:chExt cx="0" cy="0"/>
+        </a:xfrm>
+      </p:grpSpPr>
+      <p:sp>
+        <p:nvSpPr>
+          <p:cNvPr id="2" name="Title 1">
+            <a:extLst>
+              <a:ext uri="{FF2B5EF4-FFF2-40B4-BE49-F238E27FC236}">
+                <a16:creationId xmlns:a16="http://schemas.microsoft.com/office/drawing/2014/main" id="{0D05038E-49A5-4D26-B189-DC6294F854C7}"/>
+              </a:ext>
+            </a:extLst>
+          </p:cNvPr>
+          <p:cNvSpPr>
+            <a:spLocks noGrp="1"/>
+          </p:cNvSpPr>
+          <p:nvPr>
+            <p:ph type="title"/>
+          </p:nvPr>
+        </p:nvSpPr>
+        <p:spPr/>
+        <p:txBody>
+          <a:bodyPr/>
+          <a:lstStyle/>
+          <a:p>
+            <a:r>
+              <a:rPr lang="en-US"/>
+              <a:t>Click to edit Master title style</a:t>
+            </a:r>
+            <a:endParaRPr lang="ru-RU"/>
+          </a:p>
+        </p:txBody>
+      </p:sp>
+      <p:sp>
+        <p:nvSpPr>
+          <p:cNvPr id="3" name="Content Placeholder 2">
+            <a:extLst>
+              <a:ext uri="{FF2B5EF4-FFF2-40B4-BE49-F238E27FC236}">
+                <a16:creationId xmlns:a16="http://schemas.microsoft.com/office/drawing/2014/main" id="{87A0D5EE-0FF1-4954-A0E4-BC4D241070D7}"/>
+              </a:ext>
+            </a:extLst>
+          </p:cNvPr>
+          <p:cNvSpPr>
+            <a:spLocks noGrp="1"/>
+          </p:cNvSpPr>
+          <p:nvPr>
+            <p:ph sz="half" idx="1"/>
+          </p:nvPr>
+        </p:nvSpPr>
+        <p:spPr>
+          <a:xfrm>
+            <a:off x="838200" y="1825625"/>
+            <a:ext cx="5181600" cy="4351338"/>
+          </a:xfrm>
+        </p:spPr>
+        <p:txBody>
+          <a:bodyPr/>
+          <a:lstStyle/>
+          <a:p>
+            <a:pPr lvl="0"/>
+            <a:r>
+              <a:rPr lang="en-US"/>
+              <a:t>Click to edit Master text styles</a:t>
+            </a:r>
+          </a:p>
+          <a:p>
+            <a:pPr lvl="1"/>
+            <a:r>
+              <a:rPr lang="en-US"/>
+              <a:t>Second level</a:t>
+            </a:r>
+          </a:p>
+          <a:p>
+            <a:pPr lvl="2"/>
+            <a:r>
+              <a:rPr lang="en-US"/>
+              <a:t>Third level</a:t>
+            </a:r>
+          </a:p>
+          <a:p>
+            <a:pPr lvl="3"/>
+            <a:r>
+              <a:rPr lang="en-US"/>
+              <a:t>Fourth level</a:t>
+            </a:r>
+          </a:p>
+          <a:p>
+            <a:pPr lvl="4"/>
+            <a:r>
+              <a:rPr lang="en-US"/>
+              <a:t>Fifth level</a:t>
+            </a:r>
+            <a:endParaRPr lang="ru-RU"/>
+          </a:p>
+        </p:txBody>
+      </p:sp>
+      <p:sp>
+        <p:nvSpPr>
+          <p:cNvPr id="4" name="Content Placeholder 3">
+            <a:extLst>
+              <a:ext uri="{FF2B5EF4-FFF2-40B4-BE49-F238E27FC236}">
+                <a16:creationId xmlns:a16="http://schemas.microsoft.com/office/drawing/2014/main" id="{19795135-AB63-442D-9D97-FEB05C210CF2}"/>
+              </a:ext>
+            </a:extLst>
+          </p:cNvPr>
+          <p:cNvSpPr>
+            <a:spLocks noGrp="1"/>
+          </p:cNvSpPr>
+          <p:nvPr>
+            <p:ph sz="half" idx="2"/>
+          </p:nvPr>
+        </p:nvSpPr>
+        <p:spPr>
+          <a:xfrm>
+            <a:off x="6172200" y="1825625"/>
+            <a:ext cx="5181600" cy="4351338"/>
+          </a:xfrm>
+        </p:spPr>
+        <p:txBody>
+          <a:bodyPr/>
+          <a:lstStyle/>
+          <a:p>
+            <a:pPr lvl="0"/>
+            <a:r>
+              <a:rPr lang="en-US"/>
+              <a:t>Click to edit Master text styles</a:t>
+            </a:r>
+          </a:p>
+          <a:p>
+            <a:pPr lvl="1"/>
+            <a:r>
+              <a:rPr lang="en-US"/>
+              <a:t>Second level</a:t>
+            </a:r>
+          </a:p>
+          <a:p>
+            <a:pPr lvl="2"/>
+            <a:r>
+              <a:rPr lang="en-US"/>
+              <a:t>Third level</a:t>
+            </a:r>
+          </a:p>
+          <a:p>
+            <a:pPr lvl="3"/>
+            <a:r>
+              <a:rPr lang="en-US"/>
+              <a:t>Fourth level</a:t>
+            </a:r>
+          </a:p>
+          <a:p>
+            <a:pPr lvl="4"/>
+            <a:r>
+              <a:rPr lang="en-US"/>
+              <a:t>Fifth level</a:t>
+            </a:r>
+            <a:endParaRPr lang="ru-RU"/>
+          </a:p>
+        </p:txBody>
+      </p:sp>
+      <p:sp>
+        <p:nvSpPr>
+          <p:cNvPr id="5" name="Date Placeholder 4">
+            <a:extLst>
+              <a:ext uri="{FF2B5EF4-FFF2-40B4-BE49-F238E27FC236}">
+                <a16:creationId xmlns:a16="http://schemas.microsoft.com/office/drawing/2014/main" id="{FD21C545-190D-4C03-AD03-A72A2041D2E6}"/>
+              </a:ext>
+            </a:extLst>
+          </p:cNvPr>
+          <p:cNvSpPr>
+            <a:spLocks noGrp="1"/>
+          </p:cNvSpPr>
+          <p:nvPr>
+            <p:ph type="dt" sz="half" idx="10"/>
+          </p:nvPr>
+        </p:nvSpPr>
+        <p:spPr/>
+        <p:txBody>
+          <a:bodyPr/>
+          <a:lstStyle/>
+          <a:p>
+            <a:fld id="{CCE9C9EE-394A-4997-9AB6-FF4DF45241DD}" type="datetimeFigureOut">
+              <a:rPr lang="ru-RU" smtClean="0"/>
+              <a:t>16.01.2021</a:t>
+            </a:fld>
+            <a:endParaRPr lang="ru-RU"/>
+          </a:p>
+        </p:txBody>
+      </p:sp>
+      <p:sp>
+        <p:nvSpPr>
+          <p:cNvPr id="6" name="Footer Placeholder 5">
+            <a:extLst>
+              <a:ext uri="{FF2B5EF4-FFF2-40B4-BE49-F238E27FC236}">
+                <a16:creationId xmlns:a16="http://schemas.microsoft.com/office/drawing/2014/main" id="{381480D0-7D90-4922-B332-690B40D1524A}"/>
+              </a:ext>
+            </a:extLst>
+          </p:cNvPr>
+          <p:cNvSpPr>
+            <a:spLocks noGrp="1"/>
+          </p:cNvSpPr>
+          <p:nvPr>
+            <p:ph type="ftr" sz="quarter" idx="11"/>
+          </p:nvPr>
+        </p:nvSpPr>
+        <p:spPr/>
+        <p:txBody>
+          <a:bodyPr/>
+          <a:lstStyle/>
+          <a:p>
+            <a:endParaRPr lang="ru-RU"/>
+          </a:p>
+        </p:txBody>
+      </p:sp>
+      <p:sp>
+        <p:nvSpPr>
+          <p:cNvPr id="7" name="Slide Number Placeholder 6">
+            <a:extLst>
+              <a:ext uri="{FF2B5EF4-FFF2-40B4-BE49-F238E27FC236}">
+                <a16:creationId xmlns:a16="http://schemas.microsoft.com/office/drawing/2014/main" id="{F0B39328-1B0D-41A4-9478-86E4F375C25C}"/>
+              </a:ext>
+            </a:extLst>
+          </p:cNvPr>
+          <p:cNvSpPr>
+            <a:spLocks noGrp="1"/>
+          </p:cNvSpPr>
+          <p:nvPr>
+            <p:ph type="sldNum" sz="quarter" idx="12"/>
+          </p:nvPr>
+        </p:nvSpPr>
+        <p:spPr/>
+        <p:txBody>
+          <a:bodyPr/>
+          <a:lstStyle/>
+          <a:p>
+            <a:fld id="{163AA9C3-46E6-45F3-8D85-E86FB74784B0}" type="slidenum">
+              <a:rPr lang="ru-RU" smtClean="0"/>
+              <a:t>‹#›</a:t>
+            </a:fld>
+            <a:endParaRPr lang="ru-RU"/>
+          </a:p>
+        </p:txBody>
+      </p:sp>
+    </p:spTree>
+    <p:extLst>
+      <p:ext uri="{BB962C8B-B14F-4D97-AF65-F5344CB8AC3E}">
+        <p14:creationId xmlns:p14="http://schemas.microsoft.com/office/powerpoint/2010/main" val="850710192"/>
+      </p:ext>
+    </p:extLst>
+  </p:cSld>
+  <p:clrMapOvr>
+    <a:masterClrMapping/>
+  </p:clrMapOvr>
+</p:sldLayout>
+</file>
+
+<file path=ppt/slideLayouts/slideLayout16.xml><?xml version="1.0" encoding="utf-8"?>
+<p:sldLayout xmlns:a="http://schemas.openxmlformats.org/drawingml/2006/main" xmlns:r="http://schemas.openxmlformats.org/officeDocument/2006/relationships" xmlns:p="http://schemas.openxmlformats.org/presentationml/2006/main" type="twoTxTwoObj" preserve="1">
+  <p:cSld name="Comparison">
+    <p:spTree>
+      <p:nvGrpSpPr>
+        <p:cNvPr id="1" name=""/>
+        <p:cNvGrpSpPr/>
+        <p:nvPr/>
+      </p:nvGrpSpPr>
+      <p:grpSpPr>
+        <a:xfrm>
+          <a:off x="0" y="0"/>
+          <a:ext cx="0" cy="0"/>
+          <a:chOff x="0" y="0"/>
+          <a:chExt cx="0" cy="0"/>
+        </a:xfrm>
+      </p:grpSpPr>
+      <p:sp>
+        <p:nvSpPr>
+          <p:cNvPr id="2" name="Title 1">
+            <a:extLst>
+              <a:ext uri="{FF2B5EF4-FFF2-40B4-BE49-F238E27FC236}">
+                <a16:creationId xmlns:a16="http://schemas.microsoft.com/office/drawing/2014/main" id="{85921FF9-E642-4DE5-8E94-4247F3B65A5B}"/>
+              </a:ext>
+            </a:extLst>
+          </p:cNvPr>
+          <p:cNvSpPr>
+            <a:spLocks noGrp="1"/>
+          </p:cNvSpPr>
+          <p:nvPr>
+            <p:ph type="title"/>
+          </p:nvPr>
+        </p:nvSpPr>
+        <p:spPr>
+          <a:xfrm>
+            <a:off x="839788" y="365125"/>
+            <a:ext cx="10515600" cy="1325563"/>
+          </a:xfrm>
+        </p:spPr>
+        <p:txBody>
+          <a:bodyPr/>
+          <a:lstStyle/>
+          <a:p>
+            <a:r>
+              <a:rPr lang="en-US"/>
+              <a:t>Click to edit Master title style</a:t>
+            </a:r>
+            <a:endParaRPr lang="ru-RU"/>
+          </a:p>
+        </p:txBody>
+      </p:sp>
+      <p:sp>
+        <p:nvSpPr>
+          <p:cNvPr id="3" name="Text Placeholder 2">
+            <a:extLst>
+              <a:ext uri="{FF2B5EF4-FFF2-40B4-BE49-F238E27FC236}">
+                <a16:creationId xmlns:a16="http://schemas.microsoft.com/office/drawing/2014/main" id="{4D3B4CA4-03E2-485A-A148-AA73E96FAC61}"/>
+              </a:ext>
+            </a:extLst>
+          </p:cNvPr>
+          <p:cNvSpPr>
+            <a:spLocks noGrp="1"/>
+          </p:cNvSpPr>
+          <p:nvPr>
+            <p:ph type="body" idx="1"/>
+          </p:nvPr>
+        </p:nvSpPr>
+        <p:spPr>
+          <a:xfrm>
+            <a:off x="839788" y="1681163"/>
+            <a:ext cx="5157787" cy="823912"/>
+          </a:xfrm>
+        </p:spPr>
+        <p:txBody>
+          <a:bodyPr anchor="b"/>
+          <a:lstStyle>
+            <a:lvl1pPr marL="0" indent="0">
+              <a:buNone/>
+              <a:defRPr sz="2400" b="1"/>
+            </a:lvl1pPr>
+            <a:lvl2pPr marL="457200" indent="0">
+              <a:buNone/>
+              <a:defRPr sz="2000" b="1"/>
+            </a:lvl2pPr>
+            <a:lvl3pPr marL="914400" indent="0">
+              <a:buNone/>
+              <a:defRPr sz="1800" b="1"/>
+            </a:lvl3pPr>
+            <a:lvl4pPr marL="1371600" indent="0">
+              <a:buNone/>
+              <a:defRPr sz="1600" b="1"/>
+            </a:lvl4pPr>
+            <a:lvl5pPr marL="1828800" indent="0">
+              <a:buNone/>
+              <a:defRPr sz="1600" b="1"/>
+            </a:lvl5pPr>
+            <a:lvl6pPr marL="2286000" indent="0">
+              <a:buNone/>
+              <a:defRPr sz="1600" b="1"/>
+            </a:lvl6pPr>
+            <a:lvl7pPr marL="2743200" indent="0">
+              <a:buNone/>
+              <a:defRPr sz="1600" b="1"/>
+            </a:lvl7pPr>
+            <a:lvl8pPr marL="3200400" indent="0">
+              <a:buNone/>
+              <a:defRPr sz="1600" b="1"/>
+            </a:lvl8pPr>
+            <a:lvl9pPr marL="3657600" indent="0">
+              <a:buNone/>
+              <a:defRPr sz="1600" b="1"/>
+            </a:lvl9pPr>
+          </a:lstStyle>
+          <a:p>
+            <a:pPr lvl="0"/>
+            <a:r>
+              <a:rPr lang="en-US"/>
+              <a:t>Click to edit Master text styles</a:t>
+            </a:r>
+          </a:p>
+        </p:txBody>
+      </p:sp>
+      <p:sp>
+        <p:nvSpPr>
+          <p:cNvPr id="4" name="Content Placeholder 3">
+            <a:extLst>
+              <a:ext uri="{FF2B5EF4-FFF2-40B4-BE49-F238E27FC236}">
+                <a16:creationId xmlns:a16="http://schemas.microsoft.com/office/drawing/2014/main" id="{135CA531-45FA-43F7-B6BC-34144819136E}"/>
+              </a:ext>
+            </a:extLst>
+          </p:cNvPr>
+          <p:cNvSpPr>
+            <a:spLocks noGrp="1"/>
+          </p:cNvSpPr>
+          <p:nvPr>
+            <p:ph sz="half" idx="2"/>
+          </p:nvPr>
+        </p:nvSpPr>
+        <p:spPr>
+          <a:xfrm>
+            <a:off x="839788" y="2505075"/>
+            <a:ext cx="5157787" cy="3684588"/>
+          </a:xfrm>
+        </p:spPr>
+        <p:txBody>
+          <a:bodyPr/>
+          <a:lstStyle/>
+          <a:p>
+            <a:pPr lvl="0"/>
+            <a:r>
+              <a:rPr lang="en-US"/>
+              <a:t>Click to edit Master text styles</a:t>
+            </a:r>
+          </a:p>
+          <a:p>
+            <a:pPr lvl="1"/>
+            <a:r>
+              <a:rPr lang="en-US"/>
+              <a:t>Second level</a:t>
+            </a:r>
+          </a:p>
+          <a:p>
+            <a:pPr lvl="2"/>
+            <a:r>
+              <a:rPr lang="en-US"/>
+              <a:t>Third level</a:t>
+            </a:r>
+          </a:p>
+          <a:p>
+            <a:pPr lvl="3"/>
+            <a:r>
+              <a:rPr lang="en-US"/>
+              <a:t>Fourth level</a:t>
+            </a:r>
+          </a:p>
+          <a:p>
+            <a:pPr lvl="4"/>
+            <a:r>
+              <a:rPr lang="en-US"/>
+              <a:t>Fifth level</a:t>
+            </a:r>
+            <a:endParaRPr lang="ru-RU"/>
+          </a:p>
+        </p:txBody>
+      </p:sp>
+      <p:sp>
+        <p:nvSpPr>
+          <p:cNvPr id="5" name="Text Placeholder 4">
+            <a:extLst>
+              <a:ext uri="{FF2B5EF4-FFF2-40B4-BE49-F238E27FC236}">
+                <a16:creationId xmlns:a16="http://schemas.microsoft.com/office/drawing/2014/main" id="{63A5F208-50D3-4409-839D-3E0BB5D1C811}"/>
+              </a:ext>
+            </a:extLst>
+          </p:cNvPr>
+          <p:cNvSpPr>
+            <a:spLocks noGrp="1"/>
+          </p:cNvSpPr>
+          <p:nvPr>
+            <p:ph type="body" sz="quarter" idx="3"/>
+          </p:nvPr>
+        </p:nvSpPr>
+        <p:spPr>
+          <a:xfrm>
+            <a:off x="6172200" y="1681163"/>
+            <a:ext cx="5183188" cy="823912"/>
+          </a:xfrm>
+        </p:spPr>
+        <p:txBody>
+          <a:bodyPr anchor="b"/>
+          <a:lstStyle>
+            <a:lvl1pPr marL="0" indent="0">
+              <a:buNone/>
+              <a:defRPr sz="2400" b="1"/>
+            </a:lvl1pPr>
+            <a:lvl2pPr marL="457200" indent="0">
+              <a:buNone/>
+              <a:defRPr sz="2000" b="1"/>
+            </a:lvl2pPr>
+            <a:lvl3pPr marL="914400" indent="0">
+              <a:buNone/>
+              <a:defRPr sz="1800" b="1"/>
+            </a:lvl3pPr>
+            <a:lvl4pPr marL="1371600" indent="0">
+              <a:buNone/>
+              <a:defRPr sz="1600" b="1"/>
+            </a:lvl4pPr>
+            <a:lvl5pPr marL="1828800" indent="0">
+              <a:buNone/>
+              <a:defRPr sz="1600" b="1"/>
+            </a:lvl5pPr>
+            <a:lvl6pPr marL="2286000" indent="0">
+              <a:buNone/>
+              <a:defRPr sz="1600" b="1"/>
+            </a:lvl6pPr>
+            <a:lvl7pPr marL="2743200" indent="0">
+              <a:buNone/>
+              <a:defRPr sz="1600" b="1"/>
+            </a:lvl7pPr>
+            <a:lvl8pPr marL="3200400" indent="0">
+              <a:buNone/>
+              <a:defRPr sz="1600" b="1"/>
+            </a:lvl8pPr>
+            <a:lvl9pPr marL="3657600" indent="0">
+              <a:buNone/>
+              <a:defRPr sz="1600" b="1"/>
+            </a:lvl9pPr>
+          </a:lstStyle>
+          <a:p>
+            <a:pPr lvl="0"/>
+            <a:r>
+              <a:rPr lang="en-US"/>
+              <a:t>Click to edit Master text styles</a:t>
+            </a:r>
+          </a:p>
+        </p:txBody>
+      </p:sp>
+      <p:sp>
+        <p:nvSpPr>
+          <p:cNvPr id="6" name="Content Placeholder 5">
+            <a:extLst>
+              <a:ext uri="{FF2B5EF4-FFF2-40B4-BE49-F238E27FC236}">
+                <a16:creationId xmlns:a16="http://schemas.microsoft.com/office/drawing/2014/main" id="{78268002-E787-481B-8499-387082814FE3}"/>
+              </a:ext>
+            </a:extLst>
+          </p:cNvPr>
+          <p:cNvSpPr>
+            <a:spLocks noGrp="1"/>
+          </p:cNvSpPr>
+          <p:nvPr>
+            <p:ph sz="quarter" idx="4"/>
+          </p:nvPr>
+        </p:nvSpPr>
+        <p:spPr>
+          <a:xfrm>
+            <a:off x="6172200" y="2505075"/>
+            <a:ext cx="5183188" cy="3684588"/>
+          </a:xfrm>
+        </p:spPr>
+        <p:txBody>
+          <a:bodyPr/>
+          <a:lstStyle/>
+          <a:p>
+            <a:pPr lvl="0"/>
+            <a:r>
+              <a:rPr lang="en-US"/>
+              <a:t>Click to edit Master text styles</a:t>
+            </a:r>
+          </a:p>
+          <a:p>
+            <a:pPr lvl="1"/>
+            <a:r>
+              <a:rPr lang="en-US"/>
+              <a:t>Second level</a:t>
+            </a:r>
+          </a:p>
+          <a:p>
+            <a:pPr lvl="2"/>
+            <a:r>
+              <a:rPr lang="en-US"/>
+              <a:t>Third level</a:t>
+            </a:r>
+          </a:p>
+          <a:p>
+            <a:pPr lvl="3"/>
+            <a:r>
+              <a:rPr lang="en-US"/>
+              <a:t>Fourth level</a:t>
+            </a:r>
+          </a:p>
+          <a:p>
+            <a:pPr lvl="4"/>
+            <a:r>
+              <a:rPr lang="en-US"/>
+              <a:t>Fifth level</a:t>
+            </a:r>
+            <a:endParaRPr lang="ru-RU"/>
+          </a:p>
+        </p:txBody>
+      </p:sp>
+      <p:sp>
+        <p:nvSpPr>
+          <p:cNvPr id="7" name="Date Placeholder 6">
+            <a:extLst>
+              <a:ext uri="{FF2B5EF4-FFF2-40B4-BE49-F238E27FC236}">
+                <a16:creationId xmlns:a16="http://schemas.microsoft.com/office/drawing/2014/main" id="{D5753F34-EB66-40DF-95BE-DE4190A9067F}"/>
+              </a:ext>
+            </a:extLst>
+          </p:cNvPr>
+          <p:cNvSpPr>
+            <a:spLocks noGrp="1"/>
+          </p:cNvSpPr>
+          <p:nvPr>
+            <p:ph type="dt" sz="half" idx="10"/>
+          </p:nvPr>
+        </p:nvSpPr>
+        <p:spPr/>
+        <p:txBody>
+          <a:bodyPr/>
+          <a:lstStyle/>
+          <a:p>
+            <a:fld id="{CCE9C9EE-394A-4997-9AB6-FF4DF45241DD}" type="datetimeFigureOut">
+              <a:rPr lang="ru-RU" smtClean="0"/>
+              <a:t>16.01.2021</a:t>
+            </a:fld>
+            <a:endParaRPr lang="ru-RU"/>
+          </a:p>
+        </p:txBody>
+      </p:sp>
+      <p:sp>
+        <p:nvSpPr>
+          <p:cNvPr id="8" name="Footer Placeholder 7">
+            <a:extLst>
+              <a:ext uri="{FF2B5EF4-FFF2-40B4-BE49-F238E27FC236}">
+                <a16:creationId xmlns:a16="http://schemas.microsoft.com/office/drawing/2014/main" id="{46D56356-56F1-4728-9E08-516E6B4403E9}"/>
+              </a:ext>
+            </a:extLst>
+          </p:cNvPr>
+          <p:cNvSpPr>
+            <a:spLocks noGrp="1"/>
+          </p:cNvSpPr>
+          <p:nvPr>
+            <p:ph type="ftr" sz="quarter" idx="11"/>
+          </p:nvPr>
+        </p:nvSpPr>
+        <p:spPr/>
+        <p:txBody>
+          <a:bodyPr/>
+          <a:lstStyle/>
+          <a:p>
+            <a:endParaRPr lang="ru-RU"/>
+          </a:p>
+        </p:txBody>
+      </p:sp>
+      <p:sp>
+        <p:nvSpPr>
+          <p:cNvPr id="9" name="Slide Number Placeholder 8">
+            <a:extLst>
+              <a:ext uri="{FF2B5EF4-FFF2-40B4-BE49-F238E27FC236}">
+                <a16:creationId xmlns:a16="http://schemas.microsoft.com/office/drawing/2014/main" id="{F653AD86-1874-4D7A-9FF4-706100AA98B4}"/>
+              </a:ext>
+            </a:extLst>
+          </p:cNvPr>
+          <p:cNvSpPr>
+            <a:spLocks noGrp="1"/>
+          </p:cNvSpPr>
+          <p:nvPr>
+            <p:ph type="sldNum" sz="quarter" idx="12"/>
+          </p:nvPr>
+        </p:nvSpPr>
+        <p:spPr/>
+        <p:txBody>
+          <a:bodyPr/>
+          <a:lstStyle/>
+          <a:p>
+            <a:fld id="{163AA9C3-46E6-45F3-8D85-E86FB74784B0}" type="slidenum">
+              <a:rPr lang="ru-RU" smtClean="0"/>
+              <a:t>‹#›</a:t>
+            </a:fld>
+            <a:endParaRPr lang="ru-RU"/>
+          </a:p>
+        </p:txBody>
+      </p:sp>
+    </p:spTree>
+    <p:extLst>
+      <p:ext uri="{BB962C8B-B14F-4D97-AF65-F5344CB8AC3E}">
+        <p14:creationId xmlns:p14="http://schemas.microsoft.com/office/powerpoint/2010/main" val="3600612390"/>
+      </p:ext>
+    </p:extLst>
+  </p:cSld>
+  <p:clrMapOvr>
+    <a:masterClrMapping/>
+  </p:clrMapOvr>
+</p:sldLayout>
+</file>
+
+<file path=ppt/slideLayouts/slideLayout17.xml><?xml version="1.0" encoding="utf-8"?>
+<p:sldLayout xmlns:a="http://schemas.openxmlformats.org/drawingml/2006/main" xmlns:r="http://schemas.openxmlformats.org/officeDocument/2006/relationships" xmlns:p="http://schemas.openxmlformats.org/presentationml/2006/main" type="titleOnly" preserve="1">
+  <p:cSld name="Title Only">
+    <p:spTree>
+      <p:nvGrpSpPr>
+        <p:cNvPr id="1" name=""/>
+        <p:cNvGrpSpPr/>
+        <p:nvPr/>
+      </p:nvGrpSpPr>
+      <p:grpSpPr>
+        <a:xfrm>
+          <a:off x="0" y="0"/>
+          <a:ext cx="0" cy="0"/>
+          <a:chOff x="0" y="0"/>
+          <a:chExt cx="0" cy="0"/>
+        </a:xfrm>
+      </p:grpSpPr>
+      <p:sp>
+        <p:nvSpPr>
+          <p:cNvPr id="2" name="Title 1">
+            <a:extLst>
+              <a:ext uri="{FF2B5EF4-FFF2-40B4-BE49-F238E27FC236}">
+                <a16:creationId xmlns:a16="http://schemas.microsoft.com/office/drawing/2014/main" id="{374510DB-1EF8-4063-9D6D-541CD2F4A184}"/>
+              </a:ext>
+            </a:extLst>
+          </p:cNvPr>
+          <p:cNvSpPr>
+            <a:spLocks noGrp="1"/>
+          </p:cNvSpPr>
+          <p:nvPr>
+            <p:ph type="title"/>
+          </p:nvPr>
+        </p:nvSpPr>
+        <p:spPr/>
+        <p:txBody>
+          <a:bodyPr/>
+          <a:lstStyle/>
+          <a:p>
+            <a:r>
+              <a:rPr lang="en-US"/>
+              <a:t>Click to edit Master title style</a:t>
+            </a:r>
+            <a:endParaRPr lang="ru-RU"/>
+          </a:p>
+        </p:txBody>
+      </p:sp>
+      <p:sp>
+        <p:nvSpPr>
+          <p:cNvPr id="3" name="Date Placeholder 2">
+            <a:extLst>
+              <a:ext uri="{FF2B5EF4-FFF2-40B4-BE49-F238E27FC236}">
+                <a16:creationId xmlns:a16="http://schemas.microsoft.com/office/drawing/2014/main" id="{8B804AA4-FFF2-4F7A-94D9-4CB53ABD03A5}"/>
+              </a:ext>
+            </a:extLst>
+          </p:cNvPr>
+          <p:cNvSpPr>
+            <a:spLocks noGrp="1"/>
+          </p:cNvSpPr>
+          <p:nvPr>
+            <p:ph type="dt" sz="half" idx="10"/>
+          </p:nvPr>
+        </p:nvSpPr>
+        <p:spPr/>
+        <p:txBody>
+          <a:bodyPr/>
+          <a:lstStyle/>
+          <a:p>
+            <a:fld id="{CCE9C9EE-394A-4997-9AB6-FF4DF45241DD}" type="datetimeFigureOut">
+              <a:rPr lang="ru-RU" smtClean="0"/>
+              <a:t>16.01.2021</a:t>
+            </a:fld>
+            <a:endParaRPr lang="ru-RU"/>
+          </a:p>
+        </p:txBody>
+      </p:sp>
+      <p:sp>
+        <p:nvSpPr>
+          <p:cNvPr id="4" name="Footer Placeholder 3">
+            <a:extLst>
+              <a:ext uri="{FF2B5EF4-FFF2-40B4-BE49-F238E27FC236}">
+                <a16:creationId xmlns:a16="http://schemas.microsoft.com/office/drawing/2014/main" id="{FDF16265-A9FB-4B1B-B7A9-4DC5CF7E7B56}"/>
+              </a:ext>
+            </a:extLst>
+          </p:cNvPr>
+          <p:cNvSpPr>
+            <a:spLocks noGrp="1"/>
+          </p:cNvSpPr>
+          <p:nvPr>
+            <p:ph type="ftr" sz="quarter" idx="11"/>
+          </p:nvPr>
+        </p:nvSpPr>
+        <p:spPr/>
+        <p:txBody>
+          <a:bodyPr/>
+          <a:lstStyle/>
+          <a:p>
+            <a:endParaRPr lang="ru-RU"/>
+          </a:p>
+        </p:txBody>
+      </p:sp>
+      <p:sp>
+        <p:nvSpPr>
+          <p:cNvPr id="5" name="Slide Number Placeholder 4">
+            <a:extLst>
+              <a:ext uri="{FF2B5EF4-FFF2-40B4-BE49-F238E27FC236}">
+                <a16:creationId xmlns:a16="http://schemas.microsoft.com/office/drawing/2014/main" id="{90D3EC47-638D-41C5-A2BF-537A8C4ADDE4}"/>
+              </a:ext>
+            </a:extLst>
+          </p:cNvPr>
+          <p:cNvSpPr>
+            <a:spLocks noGrp="1"/>
+          </p:cNvSpPr>
+          <p:nvPr>
+            <p:ph type="sldNum" sz="quarter" idx="12"/>
+          </p:nvPr>
+        </p:nvSpPr>
+        <p:spPr/>
+        <p:txBody>
+          <a:bodyPr/>
+          <a:lstStyle/>
+          <a:p>
+            <a:fld id="{163AA9C3-46E6-45F3-8D85-E86FB74784B0}" type="slidenum">
+              <a:rPr lang="ru-RU" smtClean="0"/>
+              <a:t>‹#›</a:t>
+            </a:fld>
+            <a:endParaRPr lang="ru-RU"/>
+          </a:p>
+        </p:txBody>
+      </p:sp>
+    </p:spTree>
+    <p:extLst>
+      <p:ext uri="{BB962C8B-B14F-4D97-AF65-F5344CB8AC3E}">
+        <p14:creationId xmlns:p14="http://schemas.microsoft.com/office/powerpoint/2010/main" val="4025948681"/>
+      </p:ext>
+    </p:extLst>
+  </p:cSld>
+  <p:clrMapOvr>
+    <a:masterClrMapping/>
+  </p:clrMapOvr>
+</p:sldLayout>
+</file>
+
+<file path=ppt/slideLayouts/slideLayout18.xml><?xml version="1.0" encoding="utf-8"?>
+<p:sldLayout xmlns:a="http://schemas.openxmlformats.org/drawingml/2006/main" xmlns:r="http://schemas.openxmlformats.org/officeDocument/2006/relationships" xmlns:p="http://schemas.openxmlformats.org/presentationml/2006/main" type="blank" preserve="1">
+  <p:cSld name="Blank">
+    <p:spTree>
+      <p:nvGrpSpPr>
+        <p:cNvPr id="1" name=""/>
+        <p:cNvGrpSpPr/>
+        <p:nvPr/>
+      </p:nvGrpSpPr>
+      <p:grpSpPr>
+        <a:xfrm>
+          <a:off x="0" y="0"/>
+          <a:ext cx="0" cy="0"/>
+          <a:chOff x="0" y="0"/>
+          <a:chExt cx="0" cy="0"/>
+        </a:xfrm>
+      </p:grpSpPr>
+      <p:sp>
+        <p:nvSpPr>
+          <p:cNvPr id="2" name="Date Placeholder 1">
+            <a:extLst>
+              <a:ext uri="{FF2B5EF4-FFF2-40B4-BE49-F238E27FC236}">
+                <a16:creationId xmlns:a16="http://schemas.microsoft.com/office/drawing/2014/main" id="{D5DEBEC2-644A-4152-88D4-30A2D4BB0B21}"/>
+              </a:ext>
+            </a:extLst>
+          </p:cNvPr>
+          <p:cNvSpPr>
+            <a:spLocks noGrp="1"/>
+          </p:cNvSpPr>
+          <p:nvPr>
+            <p:ph type="dt" sz="half" idx="10"/>
+          </p:nvPr>
+        </p:nvSpPr>
+        <p:spPr/>
+        <p:txBody>
+          <a:bodyPr/>
+          <a:lstStyle/>
+          <a:p>
+            <a:fld id="{CCE9C9EE-394A-4997-9AB6-FF4DF45241DD}" type="datetimeFigureOut">
+              <a:rPr lang="ru-RU" smtClean="0"/>
+              <a:t>16.01.2021</a:t>
+            </a:fld>
+            <a:endParaRPr lang="ru-RU"/>
+          </a:p>
+        </p:txBody>
+      </p:sp>
+      <p:sp>
+        <p:nvSpPr>
+          <p:cNvPr id="3" name="Footer Placeholder 2">
+            <a:extLst>
+              <a:ext uri="{FF2B5EF4-FFF2-40B4-BE49-F238E27FC236}">
+                <a16:creationId xmlns:a16="http://schemas.microsoft.com/office/drawing/2014/main" id="{08F325D8-9357-4B0B-9BC2-932F479F1F66}"/>
+              </a:ext>
+            </a:extLst>
+          </p:cNvPr>
+          <p:cNvSpPr>
+            <a:spLocks noGrp="1"/>
+          </p:cNvSpPr>
+          <p:nvPr>
+            <p:ph type="ftr" sz="quarter" idx="11"/>
+          </p:nvPr>
+        </p:nvSpPr>
+        <p:spPr/>
+        <p:txBody>
+          <a:bodyPr/>
+          <a:lstStyle/>
+          <a:p>
+            <a:endParaRPr lang="ru-RU"/>
+          </a:p>
+        </p:txBody>
+      </p:sp>
+      <p:sp>
+        <p:nvSpPr>
+          <p:cNvPr id="4" name="Slide Number Placeholder 3">
+            <a:extLst>
+              <a:ext uri="{FF2B5EF4-FFF2-40B4-BE49-F238E27FC236}">
+                <a16:creationId xmlns:a16="http://schemas.microsoft.com/office/drawing/2014/main" id="{668605D4-6141-4569-A902-4C0D5B773C1A}"/>
+              </a:ext>
+            </a:extLst>
+          </p:cNvPr>
+          <p:cNvSpPr>
+            <a:spLocks noGrp="1"/>
+          </p:cNvSpPr>
+          <p:nvPr>
+            <p:ph type="sldNum" sz="quarter" idx="12"/>
+          </p:nvPr>
+        </p:nvSpPr>
+        <p:spPr/>
+        <p:txBody>
+          <a:bodyPr/>
+          <a:lstStyle/>
+          <a:p>
+            <a:fld id="{163AA9C3-46E6-45F3-8D85-E86FB74784B0}" type="slidenum">
+              <a:rPr lang="ru-RU" smtClean="0"/>
+              <a:t>‹#›</a:t>
+            </a:fld>
+            <a:endParaRPr lang="ru-RU"/>
+          </a:p>
+        </p:txBody>
+      </p:sp>
+    </p:spTree>
+    <p:extLst>
+      <p:ext uri="{BB962C8B-B14F-4D97-AF65-F5344CB8AC3E}">
+        <p14:creationId xmlns:p14="http://schemas.microsoft.com/office/powerpoint/2010/main" val="1120224097"/>
+      </p:ext>
+    </p:extLst>
+  </p:cSld>
+  <p:clrMapOvr>
+    <a:masterClrMapping/>
+  </p:clrMapOvr>
+</p:sldLayout>
+</file>
+
+<file path=ppt/slideLayouts/slideLayout19.xml><?xml version="1.0" encoding="utf-8"?>
+<p:sldLayout xmlns:a="http://schemas.openxmlformats.org/drawingml/2006/main" xmlns:r="http://schemas.openxmlformats.org/officeDocument/2006/relationships" xmlns:p="http://schemas.openxmlformats.org/presentationml/2006/main" type="objTx" preserve="1">
+  <p:cSld name="Content with Caption">
+    <p:spTree>
+      <p:nvGrpSpPr>
+        <p:cNvPr id="1" name=""/>
+        <p:cNvGrpSpPr/>
+        <p:nvPr/>
+      </p:nvGrpSpPr>
+      <p:grpSpPr>
+        <a:xfrm>
+          <a:off x="0" y="0"/>
+          <a:ext cx="0" cy="0"/>
+          <a:chOff x="0" y="0"/>
+          <a:chExt cx="0" cy="0"/>
+        </a:xfrm>
+      </p:grpSpPr>
+      <p:sp>
+        <p:nvSpPr>
+          <p:cNvPr id="2" name="Title 1">
+            <a:extLst>
+              <a:ext uri="{FF2B5EF4-FFF2-40B4-BE49-F238E27FC236}">
+                <a16:creationId xmlns:a16="http://schemas.microsoft.com/office/drawing/2014/main" id="{3D02DB12-8AD6-45FB-BE21-7F0095E9FD26}"/>
+              </a:ext>
+            </a:extLst>
+          </p:cNvPr>
+          <p:cNvSpPr>
+            <a:spLocks noGrp="1"/>
+          </p:cNvSpPr>
+          <p:nvPr>
+            <p:ph type="title"/>
+          </p:nvPr>
+        </p:nvSpPr>
+        <p:spPr>
+          <a:xfrm>
+            <a:off x="839788" y="457200"/>
+            <a:ext cx="3932237" cy="1600200"/>
+          </a:xfrm>
+        </p:spPr>
+        <p:txBody>
+          <a:bodyPr anchor="b"/>
+          <a:lstStyle>
+            <a:lvl1pPr>
+              <a:defRPr sz="3200"/>
+            </a:lvl1pPr>
+          </a:lstStyle>
+          <a:p>
+            <a:r>
+              <a:rPr lang="en-US"/>
+              <a:t>Click to edit Master title style</a:t>
+            </a:r>
+            <a:endParaRPr lang="ru-RU"/>
+          </a:p>
+        </p:txBody>
+      </p:sp>
+      <p:sp>
+        <p:nvSpPr>
+          <p:cNvPr id="3" name="Content Placeholder 2">
+            <a:extLst>
+              <a:ext uri="{FF2B5EF4-FFF2-40B4-BE49-F238E27FC236}">
+                <a16:creationId xmlns:a16="http://schemas.microsoft.com/office/drawing/2014/main" id="{DFAC8C00-89C8-4336-90CC-FE42EA68BDF3}"/>
+              </a:ext>
+            </a:extLst>
+          </p:cNvPr>
+          <p:cNvSpPr>
+            <a:spLocks noGrp="1"/>
+          </p:cNvSpPr>
+          <p:nvPr>
+            <p:ph idx="1"/>
+          </p:nvPr>
+        </p:nvSpPr>
+        <p:spPr>
+          <a:xfrm>
+            <a:off x="5183188" y="987425"/>
+            <a:ext cx="6172200" cy="4873625"/>
+          </a:xfrm>
+        </p:spPr>
+        <p:txBody>
+          <a:bodyPr/>
+          <a:lstStyle>
+            <a:lvl1pPr>
+              <a:defRPr sz="3200"/>
+            </a:lvl1pPr>
+            <a:lvl2pPr>
+              <a:defRPr sz="2800"/>
+            </a:lvl2pPr>
+            <a:lvl3pPr>
+              <a:defRPr sz="2400"/>
+            </a:lvl3pPr>
+            <a:lvl4pPr>
+              <a:defRPr sz="2000"/>
+            </a:lvl4pPr>
+            <a:lvl5pPr>
+              <a:defRPr sz="2000"/>
+            </a:lvl5pPr>
+            <a:lvl6pPr>
+              <a:defRPr sz="2000"/>
+            </a:lvl6pPr>
+            <a:lvl7pPr>
+              <a:defRPr sz="2000"/>
+            </a:lvl7pPr>
+            <a:lvl8pPr>
+              <a:defRPr sz="2000"/>
+            </a:lvl8pPr>
+            <a:lvl9pPr>
+              <a:defRPr sz="2000"/>
+            </a:lvl9pPr>
+          </a:lstStyle>
+          <a:p>
+            <a:pPr lvl="0"/>
+            <a:r>
+              <a:rPr lang="en-US"/>
+              <a:t>Click to edit Master text styles</a:t>
+            </a:r>
+          </a:p>
+          <a:p>
+            <a:pPr lvl="1"/>
+            <a:r>
+              <a:rPr lang="en-US"/>
+              <a:t>Second level</a:t>
+            </a:r>
+          </a:p>
+          <a:p>
+            <a:pPr lvl="2"/>
+            <a:r>
+              <a:rPr lang="en-US"/>
+              <a:t>Third level</a:t>
+            </a:r>
+          </a:p>
+          <a:p>
+            <a:pPr lvl="3"/>
+            <a:r>
+              <a:rPr lang="en-US"/>
+              <a:t>Fourth level</a:t>
+            </a:r>
+          </a:p>
+          <a:p>
+            <a:pPr lvl="4"/>
+            <a:r>
+              <a:rPr lang="en-US"/>
+              <a:t>Fifth level</a:t>
+            </a:r>
+            <a:endParaRPr lang="ru-RU"/>
+          </a:p>
+        </p:txBody>
+      </p:sp>
+      <p:sp>
+        <p:nvSpPr>
+          <p:cNvPr id="4" name="Text Placeholder 3">
+            <a:extLst>
+              <a:ext uri="{FF2B5EF4-FFF2-40B4-BE49-F238E27FC236}">
+                <a16:creationId xmlns:a16="http://schemas.microsoft.com/office/drawing/2014/main" id="{5238DAEC-C1AE-473C-8543-BCF92EDABE4F}"/>
+              </a:ext>
+            </a:extLst>
+          </p:cNvPr>
+          <p:cNvSpPr>
+            <a:spLocks noGrp="1"/>
+          </p:cNvSpPr>
+          <p:nvPr>
+            <p:ph type="body" sz="half" idx="2"/>
+          </p:nvPr>
+        </p:nvSpPr>
+        <p:spPr>
+          <a:xfrm>
+            <a:off x="839788" y="2057400"/>
+            <a:ext cx="3932237" cy="3811588"/>
+          </a:xfrm>
+        </p:spPr>
+        <p:txBody>
+          <a:bodyPr/>
+          <a:lstStyle>
+            <a:lvl1pPr marL="0" indent="0">
+              <a:buNone/>
+              <a:defRPr sz="1600"/>
+            </a:lvl1pPr>
+            <a:lvl2pPr marL="457200" indent="0">
+              <a:buNone/>
+              <a:defRPr sz="1400"/>
+            </a:lvl2pPr>
+            <a:lvl3pPr marL="914400" indent="0">
+              <a:buNone/>
+              <a:defRPr sz="1200"/>
+            </a:lvl3pPr>
+            <a:lvl4pPr marL="1371600" indent="0">
+              <a:buNone/>
+              <a:defRPr sz="1000"/>
+            </a:lvl4pPr>
+            <a:lvl5pPr marL="1828800" indent="0">
+              <a:buNone/>
+              <a:defRPr sz="1000"/>
+            </a:lvl5pPr>
+            <a:lvl6pPr marL="2286000" indent="0">
+              <a:buNone/>
+              <a:defRPr sz="1000"/>
+            </a:lvl6pPr>
+            <a:lvl7pPr marL="2743200" indent="0">
+              <a:buNone/>
+              <a:defRPr sz="1000"/>
+            </a:lvl7pPr>
+            <a:lvl8pPr marL="3200400" indent="0">
+              <a:buNone/>
+              <a:defRPr sz="1000"/>
+            </a:lvl8pPr>
+            <a:lvl9pPr marL="3657600" indent="0">
+              <a:buNone/>
+              <a:defRPr sz="1000"/>
+            </a:lvl9pPr>
+          </a:lstStyle>
+          <a:p>
+            <a:pPr lvl="0"/>
+            <a:r>
+              <a:rPr lang="en-US"/>
+              <a:t>Click to edit Master text styles</a:t>
+            </a:r>
+          </a:p>
+        </p:txBody>
+      </p:sp>
+      <p:sp>
+        <p:nvSpPr>
+          <p:cNvPr id="5" name="Date Placeholder 4">
+            <a:extLst>
+              <a:ext uri="{FF2B5EF4-FFF2-40B4-BE49-F238E27FC236}">
+                <a16:creationId xmlns:a16="http://schemas.microsoft.com/office/drawing/2014/main" id="{E53C1A71-B978-4368-8B7D-573C793F5D6B}"/>
+              </a:ext>
+            </a:extLst>
+          </p:cNvPr>
+          <p:cNvSpPr>
+            <a:spLocks noGrp="1"/>
+          </p:cNvSpPr>
+          <p:nvPr>
+            <p:ph type="dt" sz="half" idx="10"/>
+          </p:nvPr>
+        </p:nvSpPr>
+        <p:spPr/>
+        <p:txBody>
+          <a:bodyPr/>
+          <a:lstStyle/>
+          <a:p>
+            <a:fld id="{CCE9C9EE-394A-4997-9AB6-FF4DF45241DD}" type="datetimeFigureOut">
+              <a:rPr lang="ru-RU" smtClean="0"/>
+              <a:t>16.01.2021</a:t>
+            </a:fld>
+            <a:endParaRPr lang="ru-RU"/>
+          </a:p>
+        </p:txBody>
+      </p:sp>
+      <p:sp>
+        <p:nvSpPr>
+          <p:cNvPr id="6" name="Footer Placeholder 5">
+            <a:extLst>
+              <a:ext uri="{FF2B5EF4-FFF2-40B4-BE49-F238E27FC236}">
+                <a16:creationId xmlns:a16="http://schemas.microsoft.com/office/drawing/2014/main" id="{2CD3433E-B658-4833-B4C7-5C4DA2117118}"/>
+              </a:ext>
+            </a:extLst>
+          </p:cNvPr>
+          <p:cNvSpPr>
+            <a:spLocks noGrp="1"/>
+          </p:cNvSpPr>
+          <p:nvPr>
+            <p:ph type="ftr" sz="quarter" idx="11"/>
+          </p:nvPr>
+        </p:nvSpPr>
+        <p:spPr/>
+        <p:txBody>
+          <a:bodyPr/>
+          <a:lstStyle/>
+          <a:p>
+            <a:endParaRPr lang="ru-RU"/>
+          </a:p>
+        </p:txBody>
+      </p:sp>
+      <p:sp>
+        <p:nvSpPr>
+          <p:cNvPr id="7" name="Slide Number Placeholder 6">
+            <a:extLst>
+              <a:ext uri="{FF2B5EF4-FFF2-40B4-BE49-F238E27FC236}">
+                <a16:creationId xmlns:a16="http://schemas.microsoft.com/office/drawing/2014/main" id="{7F190E35-BB80-49AD-9F5D-49F792573BCC}"/>
+              </a:ext>
+            </a:extLst>
+          </p:cNvPr>
+          <p:cNvSpPr>
+            <a:spLocks noGrp="1"/>
+          </p:cNvSpPr>
+          <p:nvPr>
+            <p:ph type="sldNum" sz="quarter" idx="12"/>
+          </p:nvPr>
+        </p:nvSpPr>
+        <p:spPr/>
+        <p:txBody>
+          <a:bodyPr/>
+          <a:lstStyle/>
+          <a:p>
+            <a:fld id="{163AA9C3-46E6-45F3-8D85-E86FB74784B0}" type="slidenum">
+              <a:rPr lang="ru-RU" smtClean="0"/>
+              <a:t>‹#›</a:t>
+            </a:fld>
+            <a:endParaRPr lang="ru-RU"/>
+          </a:p>
+        </p:txBody>
+      </p:sp>
+    </p:spTree>
+    <p:extLst>
+      <p:ext uri="{BB962C8B-B14F-4D97-AF65-F5344CB8AC3E}">
+        <p14:creationId xmlns:p14="http://schemas.microsoft.com/office/powerpoint/2010/main" val="4261361707"/>
       </p:ext>
     </p:extLst>
   </p:cSld>
@@ -1873,7 +3823,7 @@
           <a:p>
             <a:fld id="{6A2D1428-0459-4F75-829F-043936AE8C9E}" type="datetimeFigureOut">
               <a:rPr lang="en-US" smtClean="0"/>
-              <a:t>12/29/2020</a:t>
+              <a:t>1/16/2021</a:t>
             </a:fld>
             <a:endParaRPr lang="en-US"/>
           </a:p>
@@ -1937,6 +3887,705 @@
     <p:extLst>
       <p:ext uri="{BB962C8B-B14F-4D97-AF65-F5344CB8AC3E}">
         <p14:creationId xmlns:p14="http://schemas.microsoft.com/office/powerpoint/2010/main" val="3618271668"/>
+      </p:ext>
+    </p:extLst>
+  </p:cSld>
+  <p:clrMapOvr>
+    <a:masterClrMapping/>
+  </p:clrMapOvr>
+</p:sldLayout>
+</file>
+
+<file path=ppt/slideLayouts/slideLayout20.xml><?xml version="1.0" encoding="utf-8"?>
+<p:sldLayout xmlns:a="http://schemas.openxmlformats.org/drawingml/2006/main" xmlns:r="http://schemas.openxmlformats.org/officeDocument/2006/relationships" xmlns:p="http://schemas.openxmlformats.org/presentationml/2006/main" type="picTx" preserve="1">
+  <p:cSld name="Picture with Caption">
+    <p:spTree>
+      <p:nvGrpSpPr>
+        <p:cNvPr id="1" name=""/>
+        <p:cNvGrpSpPr/>
+        <p:nvPr/>
+      </p:nvGrpSpPr>
+      <p:grpSpPr>
+        <a:xfrm>
+          <a:off x="0" y="0"/>
+          <a:ext cx="0" cy="0"/>
+          <a:chOff x="0" y="0"/>
+          <a:chExt cx="0" cy="0"/>
+        </a:xfrm>
+      </p:grpSpPr>
+      <p:sp>
+        <p:nvSpPr>
+          <p:cNvPr id="2" name="Title 1">
+            <a:extLst>
+              <a:ext uri="{FF2B5EF4-FFF2-40B4-BE49-F238E27FC236}">
+                <a16:creationId xmlns:a16="http://schemas.microsoft.com/office/drawing/2014/main" id="{35C0FB1F-3D35-4034-9111-41C32BBE77C1}"/>
+              </a:ext>
+            </a:extLst>
+          </p:cNvPr>
+          <p:cNvSpPr>
+            <a:spLocks noGrp="1"/>
+          </p:cNvSpPr>
+          <p:nvPr>
+            <p:ph type="title"/>
+          </p:nvPr>
+        </p:nvSpPr>
+        <p:spPr>
+          <a:xfrm>
+            <a:off x="839788" y="457200"/>
+            <a:ext cx="3932237" cy="1600200"/>
+          </a:xfrm>
+        </p:spPr>
+        <p:txBody>
+          <a:bodyPr anchor="b"/>
+          <a:lstStyle>
+            <a:lvl1pPr>
+              <a:defRPr sz="3200"/>
+            </a:lvl1pPr>
+          </a:lstStyle>
+          <a:p>
+            <a:r>
+              <a:rPr lang="en-US"/>
+              <a:t>Click to edit Master title style</a:t>
+            </a:r>
+            <a:endParaRPr lang="ru-RU"/>
+          </a:p>
+        </p:txBody>
+      </p:sp>
+      <p:sp>
+        <p:nvSpPr>
+          <p:cNvPr id="3" name="Picture Placeholder 2">
+            <a:extLst>
+              <a:ext uri="{FF2B5EF4-FFF2-40B4-BE49-F238E27FC236}">
+                <a16:creationId xmlns:a16="http://schemas.microsoft.com/office/drawing/2014/main" id="{9C735B84-D92A-47B3-BB68-AD16F2A9B4C0}"/>
+              </a:ext>
+            </a:extLst>
+          </p:cNvPr>
+          <p:cNvSpPr>
+            <a:spLocks noGrp="1"/>
+          </p:cNvSpPr>
+          <p:nvPr>
+            <p:ph type="pic" idx="1"/>
+          </p:nvPr>
+        </p:nvSpPr>
+        <p:spPr>
+          <a:xfrm>
+            <a:off x="5183188" y="987425"/>
+            <a:ext cx="6172200" cy="4873625"/>
+          </a:xfrm>
+        </p:spPr>
+        <p:txBody>
+          <a:bodyPr/>
+          <a:lstStyle>
+            <a:lvl1pPr marL="0" indent="0">
+              <a:buNone/>
+              <a:defRPr sz="3200"/>
+            </a:lvl1pPr>
+            <a:lvl2pPr marL="457200" indent="0">
+              <a:buNone/>
+              <a:defRPr sz="2800"/>
+            </a:lvl2pPr>
+            <a:lvl3pPr marL="914400" indent="0">
+              <a:buNone/>
+              <a:defRPr sz="2400"/>
+            </a:lvl3pPr>
+            <a:lvl4pPr marL="1371600" indent="0">
+              <a:buNone/>
+              <a:defRPr sz="2000"/>
+            </a:lvl4pPr>
+            <a:lvl5pPr marL="1828800" indent="0">
+              <a:buNone/>
+              <a:defRPr sz="2000"/>
+            </a:lvl5pPr>
+            <a:lvl6pPr marL="2286000" indent="0">
+              <a:buNone/>
+              <a:defRPr sz="2000"/>
+            </a:lvl6pPr>
+            <a:lvl7pPr marL="2743200" indent="0">
+              <a:buNone/>
+              <a:defRPr sz="2000"/>
+            </a:lvl7pPr>
+            <a:lvl8pPr marL="3200400" indent="0">
+              <a:buNone/>
+              <a:defRPr sz="2000"/>
+            </a:lvl8pPr>
+            <a:lvl9pPr marL="3657600" indent="0">
+              <a:buNone/>
+              <a:defRPr sz="2000"/>
+            </a:lvl9pPr>
+          </a:lstStyle>
+          <a:p>
+            <a:endParaRPr lang="ru-RU"/>
+          </a:p>
+        </p:txBody>
+      </p:sp>
+      <p:sp>
+        <p:nvSpPr>
+          <p:cNvPr id="4" name="Text Placeholder 3">
+            <a:extLst>
+              <a:ext uri="{FF2B5EF4-FFF2-40B4-BE49-F238E27FC236}">
+                <a16:creationId xmlns:a16="http://schemas.microsoft.com/office/drawing/2014/main" id="{52D8EA8B-0D80-4DB7-9B94-31A5523D3991}"/>
+              </a:ext>
+            </a:extLst>
+          </p:cNvPr>
+          <p:cNvSpPr>
+            <a:spLocks noGrp="1"/>
+          </p:cNvSpPr>
+          <p:nvPr>
+            <p:ph type="body" sz="half" idx="2"/>
+          </p:nvPr>
+        </p:nvSpPr>
+        <p:spPr>
+          <a:xfrm>
+            <a:off x="839788" y="2057400"/>
+            <a:ext cx="3932237" cy="3811588"/>
+          </a:xfrm>
+        </p:spPr>
+        <p:txBody>
+          <a:bodyPr/>
+          <a:lstStyle>
+            <a:lvl1pPr marL="0" indent="0">
+              <a:buNone/>
+              <a:defRPr sz="1600"/>
+            </a:lvl1pPr>
+            <a:lvl2pPr marL="457200" indent="0">
+              <a:buNone/>
+              <a:defRPr sz="1400"/>
+            </a:lvl2pPr>
+            <a:lvl3pPr marL="914400" indent="0">
+              <a:buNone/>
+              <a:defRPr sz="1200"/>
+            </a:lvl3pPr>
+            <a:lvl4pPr marL="1371600" indent="0">
+              <a:buNone/>
+              <a:defRPr sz="1000"/>
+            </a:lvl4pPr>
+            <a:lvl5pPr marL="1828800" indent="0">
+              <a:buNone/>
+              <a:defRPr sz="1000"/>
+            </a:lvl5pPr>
+            <a:lvl6pPr marL="2286000" indent="0">
+              <a:buNone/>
+              <a:defRPr sz="1000"/>
+            </a:lvl6pPr>
+            <a:lvl7pPr marL="2743200" indent="0">
+              <a:buNone/>
+              <a:defRPr sz="1000"/>
+            </a:lvl7pPr>
+            <a:lvl8pPr marL="3200400" indent="0">
+              <a:buNone/>
+              <a:defRPr sz="1000"/>
+            </a:lvl8pPr>
+            <a:lvl9pPr marL="3657600" indent="0">
+              <a:buNone/>
+              <a:defRPr sz="1000"/>
+            </a:lvl9pPr>
+          </a:lstStyle>
+          <a:p>
+            <a:pPr lvl="0"/>
+            <a:r>
+              <a:rPr lang="en-US"/>
+              <a:t>Click to edit Master text styles</a:t>
+            </a:r>
+          </a:p>
+        </p:txBody>
+      </p:sp>
+      <p:sp>
+        <p:nvSpPr>
+          <p:cNvPr id="5" name="Date Placeholder 4">
+            <a:extLst>
+              <a:ext uri="{FF2B5EF4-FFF2-40B4-BE49-F238E27FC236}">
+                <a16:creationId xmlns:a16="http://schemas.microsoft.com/office/drawing/2014/main" id="{D91CD360-050E-458B-BA2E-02C8C7E21882}"/>
+              </a:ext>
+            </a:extLst>
+          </p:cNvPr>
+          <p:cNvSpPr>
+            <a:spLocks noGrp="1"/>
+          </p:cNvSpPr>
+          <p:nvPr>
+            <p:ph type="dt" sz="half" idx="10"/>
+          </p:nvPr>
+        </p:nvSpPr>
+        <p:spPr/>
+        <p:txBody>
+          <a:bodyPr/>
+          <a:lstStyle/>
+          <a:p>
+            <a:fld id="{CCE9C9EE-394A-4997-9AB6-FF4DF45241DD}" type="datetimeFigureOut">
+              <a:rPr lang="ru-RU" smtClean="0"/>
+              <a:t>16.01.2021</a:t>
+            </a:fld>
+            <a:endParaRPr lang="ru-RU"/>
+          </a:p>
+        </p:txBody>
+      </p:sp>
+      <p:sp>
+        <p:nvSpPr>
+          <p:cNvPr id="6" name="Footer Placeholder 5">
+            <a:extLst>
+              <a:ext uri="{FF2B5EF4-FFF2-40B4-BE49-F238E27FC236}">
+                <a16:creationId xmlns:a16="http://schemas.microsoft.com/office/drawing/2014/main" id="{C2028114-D16C-45C6-B60B-E77347B8CC3B}"/>
+              </a:ext>
+            </a:extLst>
+          </p:cNvPr>
+          <p:cNvSpPr>
+            <a:spLocks noGrp="1"/>
+          </p:cNvSpPr>
+          <p:nvPr>
+            <p:ph type="ftr" sz="quarter" idx="11"/>
+          </p:nvPr>
+        </p:nvSpPr>
+        <p:spPr/>
+        <p:txBody>
+          <a:bodyPr/>
+          <a:lstStyle/>
+          <a:p>
+            <a:endParaRPr lang="ru-RU"/>
+          </a:p>
+        </p:txBody>
+      </p:sp>
+      <p:sp>
+        <p:nvSpPr>
+          <p:cNvPr id="7" name="Slide Number Placeholder 6">
+            <a:extLst>
+              <a:ext uri="{FF2B5EF4-FFF2-40B4-BE49-F238E27FC236}">
+                <a16:creationId xmlns:a16="http://schemas.microsoft.com/office/drawing/2014/main" id="{6A627B13-D65B-49B2-A2B9-39B15ED5CCB7}"/>
+              </a:ext>
+            </a:extLst>
+          </p:cNvPr>
+          <p:cNvSpPr>
+            <a:spLocks noGrp="1"/>
+          </p:cNvSpPr>
+          <p:nvPr>
+            <p:ph type="sldNum" sz="quarter" idx="12"/>
+          </p:nvPr>
+        </p:nvSpPr>
+        <p:spPr/>
+        <p:txBody>
+          <a:bodyPr/>
+          <a:lstStyle/>
+          <a:p>
+            <a:fld id="{163AA9C3-46E6-45F3-8D85-E86FB74784B0}" type="slidenum">
+              <a:rPr lang="ru-RU" smtClean="0"/>
+              <a:t>‹#›</a:t>
+            </a:fld>
+            <a:endParaRPr lang="ru-RU"/>
+          </a:p>
+        </p:txBody>
+      </p:sp>
+    </p:spTree>
+    <p:extLst>
+      <p:ext uri="{BB962C8B-B14F-4D97-AF65-F5344CB8AC3E}">
+        <p14:creationId xmlns:p14="http://schemas.microsoft.com/office/powerpoint/2010/main" val="220815512"/>
+      </p:ext>
+    </p:extLst>
+  </p:cSld>
+  <p:clrMapOvr>
+    <a:masterClrMapping/>
+  </p:clrMapOvr>
+</p:sldLayout>
+</file>
+
+<file path=ppt/slideLayouts/slideLayout21.xml><?xml version="1.0" encoding="utf-8"?>
+<p:sldLayout xmlns:a="http://schemas.openxmlformats.org/drawingml/2006/main" xmlns:r="http://schemas.openxmlformats.org/officeDocument/2006/relationships" xmlns:p="http://schemas.openxmlformats.org/presentationml/2006/main" type="vertTx" preserve="1">
+  <p:cSld name="Title and Vertical Text">
+    <p:spTree>
+      <p:nvGrpSpPr>
+        <p:cNvPr id="1" name=""/>
+        <p:cNvGrpSpPr/>
+        <p:nvPr/>
+      </p:nvGrpSpPr>
+      <p:grpSpPr>
+        <a:xfrm>
+          <a:off x="0" y="0"/>
+          <a:ext cx="0" cy="0"/>
+          <a:chOff x="0" y="0"/>
+          <a:chExt cx="0" cy="0"/>
+        </a:xfrm>
+      </p:grpSpPr>
+      <p:sp>
+        <p:nvSpPr>
+          <p:cNvPr id="2" name="Title 1">
+            <a:extLst>
+              <a:ext uri="{FF2B5EF4-FFF2-40B4-BE49-F238E27FC236}">
+                <a16:creationId xmlns:a16="http://schemas.microsoft.com/office/drawing/2014/main" id="{854B4651-F838-421B-B355-05BACA71FBDA}"/>
+              </a:ext>
+            </a:extLst>
+          </p:cNvPr>
+          <p:cNvSpPr>
+            <a:spLocks noGrp="1"/>
+          </p:cNvSpPr>
+          <p:nvPr>
+            <p:ph type="title"/>
+          </p:nvPr>
+        </p:nvSpPr>
+        <p:spPr/>
+        <p:txBody>
+          <a:bodyPr/>
+          <a:lstStyle/>
+          <a:p>
+            <a:r>
+              <a:rPr lang="en-US"/>
+              <a:t>Click to edit Master title style</a:t>
+            </a:r>
+            <a:endParaRPr lang="ru-RU"/>
+          </a:p>
+        </p:txBody>
+      </p:sp>
+      <p:sp>
+        <p:nvSpPr>
+          <p:cNvPr id="3" name="Vertical Text Placeholder 2">
+            <a:extLst>
+              <a:ext uri="{FF2B5EF4-FFF2-40B4-BE49-F238E27FC236}">
+                <a16:creationId xmlns:a16="http://schemas.microsoft.com/office/drawing/2014/main" id="{BF87E54A-D29D-4FF8-9283-B6C4AC9D49FC}"/>
+              </a:ext>
+            </a:extLst>
+          </p:cNvPr>
+          <p:cNvSpPr>
+            <a:spLocks noGrp="1"/>
+          </p:cNvSpPr>
+          <p:nvPr>
+            <p:ph type="body" orient="vert" idx="1"/>
+          </p:nvPr>
+        </p:nvSpPr>
+        <p:spPr/>
+        <p:txBody>
+          <a:bodyPr vert="eaVert"/>
+          <a:lstStyle/>
+          <a:p>
+            <a:pPr lvl="0"/>
+            <a:r>
+              <a:rPr lang="en-US"/>
+              <a:t>Click to edit Master text styles</a:t>
+            </a:r>
+          </a:p>
+          <a:p>
+            <a:pPr lvl="1"/>
+            <a:r>
+              <a:rPr lang="en-US"/>
+              <a:t>Second level</a:t>
+            </a:r>
+          </a:p>
+          <a:p>
+            <a:pPr lvl="2"/>
+            <a:r>
+              <a:rPr lang="en-US"/>
+              <a:t>Third level</a:t>
+            </a:r>
+          </a:p>
+          <a:p>
+            <a:pPr lvl="3"/>
+            <a:r>
+              <a:rPr lang="en-US"/>
+              <a:t>Fourth level</a:t>
+            </a:r>
+          </a:p>
+          <a:p>
+            <a:pPr lvl="4"/>
+            <a:r>
+              <a:rPr lang="en-US"/>
+              <a:t>Fifth level</a:t>
+            </a:r>
+            <a:endParaRPr lang="ru-RU"/>
+          </a:p>
+        </p:txBody>
+      </p:sp>
+      <p:sp>
+        <p:nvSpPr>
+          <p:cNvPr id="4" name="Date Placeholder 3">
+            <a:extLst>
+              <a:ext uri="{FF2B5EF4-FFF2-40B4-BE49-F238E27FC236}">
+                <a16:creationId xmlns:a16="http://schemas.microsoft.com/office/drawing/2014/main" id="{88795A5C-8F28-4ACC-A9A4-2D809F9AD361}"/>
+              </a:ext>
+            </a:extLst>
+          </p:cNvPr>
+          <p:cNvSpPr>
+            <a:spLocks noGrp="1"/>
+          </p:cNvSpPr>
+          <p:nvPr>
+            <p:ph type="dt" sz="half" idx="10"/>
+          </p:nvPr>
+        </p:nvSpPr>
+        <p:spPr/>
+        <p:txBody>
+          <a:bodyPr/>
+          <a:lstStyle/>
+          <a:p>
+            <a:fld id="{CCE9C9EE-394A-4997-9AB6-FF4DF45241DD}" type="datetimeFigureOut">
+              <a:rPr lang="ru-RU" smtClean="0"/>
+              <a:t>16.01.2021</a:t>
+            </a:fld>
+            <a:endParaRPr lang="ru-RU"/>
+          </a:p>
+        </p:txBody>
+      </p:sp>
+      <p:sp>
+        <p:nvSpPr>
+          <p:cNvPr id="5" name="Footer Placeholder 4">
+            <a:extLst>
+              <a:ext uri="{FF2B5EF4-FFF2-40B4-BE49-F238E27FC236}">
+                <a16:creationId xmlns:a16="http://schemas.microsoft.com/office/drawing/2014/main" id="{61FD8B3B-6F80-4AB7-8C86-8E34DC703088}"/>
+              </a:ext>
+            </a:extLst>
+          </p:cNvPr>
+          <p:cNvSpPr>
+            <a:spLocks noGrp="1"/>
+          </p:cNvSpPr>
+          <p:nvPr>
+            <p:ph type="ftr" sz="quarter" idx="11"/>
+          </p:nvPr>
+        </p:nvSpPr>
+        <p:spPr/>
+        <p:txBody>
+          <a:bodyPr/>
+          <a:lstStyle/>
+          <a:p>
+            <a:endParaRPr lang="ru-RU"/>
+          </a:p>
+        </p:txBody>
+      </p:sp>
+      <p:sp>
+        <p:nvSpPr>
+          <p:cNvPr id="6" name="Slide Number Placeholder 5">
+            <a:extLst>
+              <a:ext uri="{FF2B5EF4-FFF2-40B4-BE49-F238E27FC236}">
+                <a16:creationId xmlns:a16="http://schemas.microsoft.com/office/drawing/2014/main" id="{FBE8A5A0-0371-40BA-AC69-65F168BC1AB3}"/>
+              </a:ext>
+            </a:extLst>
+          </p:cNvPr>
+          <p:cNvSpPr>
+            <a:spLocks noGrp="1"/>
+          </p:cNvSpPr>
+          <p:nvPr>
+            <p:ph type="sldNum" sz="quarter" idx="12"/>
+          </p:nvPr>
+        </p:nvSpPr>
+        <p:spPr/>
+        <p:txBody>
+          <a:bodyPr/>
+          <a:lstStyle/>
+          <a:p>
+            <a:fld id="{163AA9C3-46E6-45F3-8D85-E86FB74784B0}" type="slidenum">
+              <a:rPr lang="ru-RU" smtClean="0"/>
+              <a:t>‹#›</a:t>
+            </a:fld>
+            <a:endParaRPr lang="ru-RU"/>
+          </a:p>
+        </p:txBody>
+      </p:sp>
+    </p:spTree>
+    <p:extLst>
+      <p:ext uri="{BB962C8B-B14F-4D97-AF65-F5344CB8AC3E}">
+        <p14:creationId xmlns:p14="http://schemas.microsoft.com/office/powerpoint/2010/main" val="1926408487"/>
+      </p:ext>
+    </p:extLst>
+  </p:cSld>
+  <p:clrMapOvr>
+    <a:masterClrMapping/>
+  </p:clrMapOvr>
+</p:sldLayout>
+</file>
+
+<file path=ppt/slideLayouts/slideLayout22.xml><?xml version="1.0" encoding="utf-8"?>
+<p:sldLayout xmlns:a="http://schemas.openxmlformats.org/drawingml/2006/main" xmlns:r="http://schemas.openxmlformats.org/officeDocument/2006/relationships" xmlns:p="http://schemas.openxmlformats.org/presentationml/2006/main" type="vertTitleAndTx" preserve="1">
+  <p:cSld name="Vertical Title and Text">
+    <p:spTree>
+      <p:nvGrpSpPr>
+        <p:cNvPr id="1" name=""/>
+        <p:cNvGrpSpPr/>
+        <p:nvPr/>
+      </p:nvGrpSpPr>
+      <p:grpSpPr>
+        <a:xfrm>
+          <a:off x="0" y="0"/>
+          <a:ext cx="0" cy="0"/>
+          <a:chOff x="0" y="0"/>
+          <a:chExt cx="0" cy="0"/>
+        </a:xfrm>
+      </p:grpSpPr>
+      <p:sp>
+        <p:nvSpPr>
+          <p:cNvPr id="2" name="Vertical Title 1">
+            <a:extLst>
+              <a:ext uri="{FF2B5EF4-FFF2-40B4-BE49-F238E27FC236}">
+                <a16:creationId xmlns:a16="http://schemas.microsoft.com/office/drawing/2014/main" id="{0A105EDF-0BD2-4C25-9513-804C57801693}"/>
+              </a:ext>
+            </a:extLst>
+          </p:cNvPr>
+          <p:cNvSpPr>
+            <a:spLocks noGrp="1"/>
+          </p:cNvSpPr>
+          <p:nvPr>
+            <p:ph type="title" orient="vert"/>
+          </p:nvPr>
+        </p:nvSpPr>
+        <p:spPr>
+          <a:xfrm>
+            <a:off x="8724900" y="365125"/>
+            <a:ext cx="2628900" cy="5811838"/>
+          </a:xfrm>
+        </p:spPr>
+        <p:txBody>
+          <a:bodyPr vert="eaVert"/>
+          <a:lstStyle/>
+          <a:p>
+            <a:r>
+              <a:rPr lang="en-US"/>
+              <a:t>Click to edit Master title style</a:t>
+            </a:r>
+            <a:endParaRPr lang="ru-RU"/>
+          </a:p>
+        </p:txBody>
+      </p:sp>
+      <p:sp>
+        <p:nvSpPr>
+          <p:cNvPr id="3" name="Vertical Text Placeholder 2">
+            <a:extLst>
+              <a:ext uri="{FF2B5EF4-FFF2-40B4-BE49-F238E27FC236}">
+                <a16:creationId xmlns:a16="http://schemas.microsoft.com/office/drawing/2014/main" id="{32D72B23-989B-4F81-B89A-F6603B1F3A4D}"/>
+              </a:ext>
+            </a:extLst>
+          </p:cNvPr>
+          <p:cNvSpPr>
+            <a:spLocks noGrp="1"/>
+          </p:cNvSpPr>
+          <p:nvPr>
+            <p:ph type="body" orient="vert" idx="1"/>
+          </p:nvPr>
+        </p:nvSpPr>
+        <p:spPr>
+          <a:xfrm>
+            <a:off x="838200" y="365125"/>
+            <a:ext cx="7734300" cy="5811838"/>
+          </a:xfrm>
+        </p:spPr>
+        <p:txBody>
+          <a:bodyPr vert="eaVert"/>
+          <a:lstStyle/>
+          <a:p>
+            <a:pPr lvl="0"/>
+            <a:r>
+              <a:rPr lang="en-US"/>
+              <a:t>Click to edit Master text styles</a:t>
+            </a:r>
+          </a:p>
+          <a:p>
+            <a:pPr lvl="1"/>
+            <a:r>
+              <a:rPr lang="en-US"/>
+              <a:t>Second level</a:t>
+            </a:r>
+          </a:p>
+          <a:p>
+            <a:pPr lvl="2"/>
+            <a:r>
+              <a:rPr lang="en-US"/>
+              <a:t>Third level</a:t>
+            </a:r>
+          </a:p>
+          <a:p>
+            <a:pPr lvl="3"/>
+            <a:r>
+              <a:rPr lang="en-US"/>
+              <a:t>Fourth level</a:t>
+            </a:r>
+          </a:p>
+          <a:p>
+            <a:pPr lvl="4"/>
+            <a:r>
+              <a:rPr lang="en-US"/>
+              <a:t>Fifth level</a:t>
+            </a:r>
+            <a:endParaRPr lang="ru-RU"/>
+          </a:p>
+        </p:txBody>
+      </p:sp>
+      <p:sp>
+        <p:nvSpPr>
+          <p:cNvPr id="4" name="Date Placeholder 3">
+            <a:extLst>
+              <a:ext uri="{FF2B5EF4-FFF2-40B4-BE49-F238E27FC236}">
+                <a16:creationId xmlns:a16="http://schemas.microsoft.com/office/drawing/2014/main" id="{AFE162BE-FD4E-432C-8148-B55D26B4053D}"/>
+              </a:ext>
+            </a:extLst>
+          </p:cNvPr>
+          <p:cNvSpPr>
+            <a:spLocks noGrp="1"/>
+          </p:cNvSpPr>
+          <p:nvPr>
+            <p:ph type="dt" sz="half" idx="10"/>
+          </p:nvPr>
+        </p:nvSpPr>
+        <p:spPr/>
+        <p:txBody>
+          <a:bodyPr/>
+          <a:lstStyle/>
+          <a:p>
+            <a:fld id="{CCE9C9EE-394A-4997-9AB6-FF4DF45241DD}" type="datetimeFigureOut">
+              <a:rPr lang="ru-RU" smtClean="0"/>
+              <a:t>16.01.2021</a:t>
+            </a:fld>
+            <a:endParaRPr lang="ru-RU"/>
+          </a:p>
+        </p:txBody>
+      </p:sp>
+      <p:sp>
+        <p:nvSpPr>
+          <p:cNvPr id="5" name="Footer Placeholder 4">
+            <a:extLst>
+              <a:ext uri="{FF2B5EF4-FFF2-40B4-BE49-F238E27FC236}">
+                <a16:creationId xmlns:a16="http://schemas.microsoft.com/office/drawing/2014/main" id="{871A9294-E248-4E91-B25F-AD56879363E3}"/>
+              </a:ext>
+            </a:extLst>
+          </p:cNvPr>
+          <p:cNvSpPr>
+            <a:spLocks noGrp="1"/>
+          </p:cNvSpPr>
+          <p:nvPr>
+            <p:ph type="ftr" sz="quarter" idx="11"/>
+          </p:nvPr>
+        </p:nvSpPr>
+        <p:spPr/>
+        <p:txBody>
+          <a:bodyPr/>
+          <a:lstStyle/>
+          <a:p>
+            <a:endParaRPr lang="ru-RU"/>
+          </a:p>
+        </p:txBody>
+      </p:sp>
+      <p:sp>
+        <p:nvSpPr>
+          <p:cNvPr id="6" name="Slide Number Placeholder 5">
+            <a:extLst>
+              <a:ext uri="{FF2B5EF4-FFF2-40B4-BE49-F238E27FC236}">
+                <a16:creationId xmlns:a16="http://schemas.microsoft.com/office/drawing/2014/main" id="{B4B8A8FC-17FF-450F-9CF7-02879FC142B4}"/>
+              </a:ext>
+            </a:extLst>
+          </p:cNvPr>
+          <p:cNvSpPr>
+            <a:spLocks noGrp="1"/>
+          </p:cNvSpPr>
+          <p:nvPr>
+            <p:ph type="sldNum" sz="quarter" idx="12"/>
+          </p:nvPr>
+        </p:nvSpPr>
+        <p:spPr/>
+        <p:txBody>
+          <a:bodyPr/>
+          <a:lstStyle/>
+          <a:p>
+            <a:fld id="{163AA9C3-46E6-45F3-8D85-E86FB74784B0}" type="slidenum">
+              <a:rPr lang="ru-RU" smtClean="0"/>
+              <a:t>‹#›</a:t>
+            </a:fld>
+            <a:endParaRPr lang="ru-RU"/>
+          </a:p>
+        </p:txBody>
+      </p:sp>
+    </p:spTree>
+    <p:extLst>
+      <p:ext uri="{BB962C8B-B14F-4D97-AF65-F5344CB8AC3E}">
+        <p14:creationId xmlns:p14="http://schemas.microsoft.com/office/powerpoint/2010/main" val="1634526763"/>
       </p:ext>
     </p:extLst>
   </p:cSld>
@@ -2149,7 +4798,7 @@
           <a:p>
             <a:fld id="{6A2D1428-0459-4F75-829F-043936AE8C9E}" type="datetimeFigureOut">
               <a:rPr lang="en-US" smtClean="0"/>
-              <a:t>12/29/2020</a:t>
+              <a:t>1/16/2021</a:t>
             </a:fld>
             <a:endParaRPr lang="en-US"/>
           </a:p>
@@ -2417,7 +5066,7 @@
           <a:p>
             <a:fld id="{6A2D1428-0459-4F75-829F-043936AE8C9E}" type="datetimeFigureOut">
               <a:rPr lang="en-US" smtClean="0"/>
-              <a:t>12/29/2020</a:t>
+              <a:t>1/16/2021</a:t>
             </a:fld>
             <a:endParaRPr lang="en-US"/>
           </a:p>
@@ -2832,7 +5481,7 @@
           <a:p>
             <a:fld id="{6A2D1428-0459-4F75-829F-043936AE8C9E}" type="datetimeFigureOut">
               <a:rPr lang="en-US" smtClean="0"/>
-              <a:t>12/29/2020</a:t>
+              <a:t>1/16/2021</a:t>
             </a:fld>
             <a:endParaRPr lang="en-US"/>
           </a:p>
@@ -2974,7 +5623,7 @@
           <a:p>
             <a:fld id="{6A2D1428-0459-4F75-829F-043936AE8C9E}" type="datetimeFigureOut">
               <a:rPr lang="en-US" smtClean="0"/>
-              <a:t>12/29/2020</a:t>
+              <a:t>1/16/2021</a:t>
             </a:fld>
             <a:endParaRPr lang="en-US"/>
           </a:p>
@@ -3087,7 +5736,7 @@
           <a:p>
             <a:fld id="{6A2D1428-0459-4F75-829F-043936AE8C9E}" type="datetimeFigureOut">
               <a:rPr lang="en-US" smtClean="0"/>
-              <a:t>12/29/2020</a:t>
+              <a:t>1/16/2021</a:t>
             </a:fld>
             <a:endParaRPr lang="en-US"/>
           </a:p>
@@ -3400,7 +6049,7 @@
           <a:p>
             <a:fld id="{6A2D1428-0459-4F75-829F-043936AE8C9E}" type="datetimeFigureOut">
               <a:rPr lang="en-US" smtClean="0"/>
-              <a:t>12/29/2020</a:t>
+              <a:t>1/16/2021</a:t>
             </a:fld>
             <a:endParaRPr lang="en-US"/>
           </a:p>
@@ -3689,7 +6338,7 @@
           <a:p>
             <a:fld id="{6A2D1428-0459-4F75-829F-043936AE8C9E}" type="datetimeFigureOut">
               <a:rPr lang="en-US" smtClean="0"/>
-              <a:t>12/29/2020</a:t>
+              <a:t>1/16/2021</a:t>
             </a:fld>
             <a:endParaRPr lang="en-US"/>
           </a:p>
@@ -3932,7 +6581,7 @@
           <a:p>
             <a:fld id="{6A2D1428-0459-4F75-829F-043936AE8C9E}" type="datetimeFigureOut">
               <a:rPr lang="en-US" smtClean="0"/>
-              <a:t>12/29/2020</a:t>
+              <a:t>1/16/2021</a:t>
             </a:fld>
             <a:endParaRPr lang="en-US"/>
           </a:p>
@@ -4236,6 +6885,576 @@
     <p:otherStyle>
       <a:defPPr>
         <a:defRPr lang="en-US"/>
+      </a:defPPr>
+      <a:lvl1pPr marL="0" algn="l" defTabSz="914400" rtl="0" eaLnBrk="1" latinLnBrk="0" hangingPunct="1">
+        <a:defRPr sz="1800" kern="1200">
+          <a:solidFill>
+            <a:schemeClr val="tx1"/>
+          </a:solidFill>
+          <a:latin typeface="+mn-lt"/>
+          <a:ea typeface="+mn-ea"/>
+          <a:cs typeface="+mn-cs"/>
+        </a:defRPr>
+      </a:lvl1pPr>
+      <a:lvl2pPr marL="457200" algn="l" defTabSz="914400" rtl="0" eaLnBrk="1" latinLnBrk="0" hangingPunct="1">
+        <a:defRPr sz="1800" kern="1200">
+          <a:solidFill>
+            <a:schemeClr val="tx1"/>
+          </a:solidFill>
+          <a:latin typeface="+mn-lt"/>
+          <a:ea typeface="+mn-ea"/>
+          <a:cs typeface="+mn-cs"/>
+        </a:defRPr>
+      </a:lvl2pPr>
+      <a:lvl3pPr marL="914400" algn="l" defTabSz="914400" rtl="0" eaLnBrk="1" latinLnBrk="0" hangingPunct="1">
+        <a:defRPr sz="1800" kern="1200">
+          <a:solidFill>
+            <a:schemeClr val="tx1"/>
+          </a:solidFill>
+          <a:latin typeface="+mn-lt"/>
+          <a:ea typeface="+mn-ea"/>
+          <a:cs typeface="+mn-cs"/>
+        </a:defRPr>
+      </a:lvl3pPr>
+      <a:lvl4pPr marL="1371600" algn="l" defTabSz="914400" rtl="0" eaLnBrk="1" latinLnBrk="0" hangingPunct="1">
+        <a:defRPr sz="1800" kern="1200">
+          <a:solidFill>
+            <a:schemeClr val="tx1"/>
+          </a:solidFill>
+          <a:latin typeface="+mn-lt"/>
+          <a:ea typeface="+mn-ea"/>
+          <a:cs typeface="+mn-cs"/>
+        </a:defRPr>
+      </a:lvl4pPr>
+      <a:lvl5pPr marL="1828800" algn="l" defTabSz="914400" rtl="0" eaLnBrk="1" latinLnBrk="0" hangingPunct="1">
+        <a:defRPr sz="1800" kern="1200">
+          <a:solidFill>
+            <a:schemeClr val="tx1"/>
+          </a:solidFill>
+          <a:latin typeface="+mn-lt"/>
+          <a:ea typeface="+mn-ea"/>
+          <a:cs typeface="+mn-cs"/>
+        </a:defRPr>
+      </a:lvl5pPr>
+      <a:lvl6pPr marL="2286000" algn="l" defTabSz="914400" rtl="0" eaLnBrk="1" latinLnBrk="0" hangingPunct="1">
+        <a:defRPr sz="1800" kern="1200">
+          <a:solidFill>
+            <a:schemeClr val="tx1"/>
+          </a:solidFill>
+          <a:latin typeface="+mn-lt"/>
+          <a:ea typeface="+mn-ea"/>
+          <a:cs typeface="+mn-cs"/>
+        </a:defRPr>
+      </a:lvl6pPr>
+      <a:lvl7pPr marL="2743200" algn="l" defTabSz="914400" rtl="0" eaLnBrk="1" latinLnBrk="0" hangingPunct="1">
+        <a:defRPr sz="1800" kern="1200">
+          <a:solidFill>
+            <a:schemeClr val="tx1"/>
+          </a:solidFill>
+          <a:latin typeface="+mn-lt"/>
+          <a:ea typeface="+mn-ea"/>
+          <a:cs typeface="+mn-cs"/>
+        </a:defRPr>
+      </a:lvl7pPr>
+      <a:lvl8pPr marL="3200400" algn="l" defTabSz="914400" rtl="0" eaLnBrk="1" latinLnBrk="0" hangingPunct="1">
+        <a:defRPr sz="1800" kern="1200">
+          <a:solidFill>
+            <a:schemeClr val="tx1"/>
+          </a:solidFill>
+          <a:latin typeface="+mn-lt"/>
+          <a:ea typeface="+mn-ea"/>
+          <a:cs typeface="+mn-cs"/>
+        </a:defRPr>
+      </a:lvl8pPr>
+      <a:lvl9pPr marL="3657600" algn="l" defTabSz="914400" rtl="0" eaLnBrk="1" latinLnBrk="0" hangingPunct="1">
+        <a:defRPr sz="1800" kern="1200">
+          <a:solidFill>
+            <a:schemeClr val="tx1"/>
+          </a:solidFill>
+          <a:latin typeface="+mn-lt"/>
+          <a:ea typeface="+mn-ea"/>
+          <a:cs typeface="+mn-cs"/>
+        </a:defRPr>
+      </a:lvl9pPr>
+    </p:otherStyle>
+  </p:txStyles>
+</p:sldMaster>
+</file>
+
+<file path=ppt/slideMasters/slideMaster2.xml><?xml version="1.0" encoding="utf-8"?>
+<p:sldMaster xmlns:a="http://schemas.openxmlformats.org/drawingml/2006/main" xmlns:r="http://schemas.openxmlformats.org/officeDocument/2006/relationships" xmlns:p="http://schemas.openxmlformats.org/presentationml/2006/main" preserve="1">
+  <p:cSld>
+    <p:bg>
+      <p:bgRef idx="1001">
+        <a:schemeClr val="bg1"/>
+      </p:bgRef>
+    </p:bg>
+    <p:spTree>
+      <p:nvGrpSpPr>
+        <p:cNvPr id="1" name=""/>
+        <p:cNvGrpSpPr/>
+        <p:nvPr/>
+      </p:nvGrpSpPr>
+      <p:grpSpPr>
+        <a:xfrm>
+          <a:off x="0" y="0"/>
+          <a:ext cx="0" cy="0"/>
+          <a:chOff x="0" y="0"/>
+          <a:chExt cx="0" cy="0"/>
+        </a:xfrm>
+      </p:grpSpPr>
+      <p:sp>
+        <p:nvSpPr>
+          <p:cNvPr id="2" name="Title Placeholder 1">
+            <a:extLst>
+              <a:ext uri="{FF2B5EF4-FFF2-40B4-BE49-F238E27FC236}">
+                <a16:creationId xmlns:a16="http://schemas.microsoft.com/office/drawing/2014/main" id="{2776DC2D-F0C2-457F-9C57-EE8A30F106E1}"/>
+              </a:ext>
+            </a:extLst>
+          </p:cNvPr>
+          <p:cNvSpPr>
+            <a:spLocks noGrp="1"/>
+          </p:cNvSpPr>
+          <p:nvPr>
+            <p:ph type="title"/>
+          </p:nvPr>
+        </p:nvSpPr>
+        <p:spPr>
+          <a:xfrm>
+            <a:off x="838200" y="365125"/>
+            <a:ext cx="10515600" cy="1325563"/>
+          </a:xfrm>
+          <a:prstGeom prst="rect">
+            <a:avLst/>
+          </a:prstGeom>
+        </p:spPr>
+        <p:txBody>
+          <a:bodyPr vert="horz" lIns="91440" tIns="45720" rIns="91440" bIns="45720" rtlCol="0" anchor="ctr">
+            <a:normAutofit/>
+          </a:bodyPr>
+          <a:lstStyle/>
+          <a:p>
+            <a:r>
+              <a:rPr lang="en-US"/>
+              <a:t>Click to edit Master title style</a:t>
+            </a:r>
+            <a:endParaRPr lang="ru-RU"/>
+          </a:p>
+        </p:txBody>
+      </p:sp>
+      <p:sp>
+        <p:nvSpPr>
+          <p:cNvPr id="3" name="Text Placeholder 2">
+            <a:extLst>
+              <a:ext uri="{FF2B5EF4-FFF2-40B4-BE49-F238E27FC236}">
+                <a16:creationId xmlns:a16="http://schemas.microsoft.com/office/drawing/2014/main" id="{B2B1526C-310A-4C91-88DE-FA8B2F528790}"/>
+              </a:ext>
+            </a:extLst>
+          </p:cNvPr>
+          <p:cNvSpPr>
+            <a:spLocks noGrp="1"/>
+          </p:cNvSpPr>
+          <p:nvPr>
+            <p:ph type="body" idx="1"/>
+          </p:nvPr>
+        </p:nvSpPr>
+        <p:spPr>
+          <a:xfrm>
+            <a:off x="838200" y="1825625"/>
+            <a:ext cx="10515600" cy="4351338"/>
+          </a:xfrm>
+          <a:prstGeom prst="rect">
+            <a:avLst/>
+          </a:prstGeom>
+        </p:spPr>
+        <p:txBody>
+          <a:bodyPr vert="horz" lIns="91440" tIns="45720" rIns="91440" bIns="45720" rtlCol="0">
+            <a:normAutofit/>
+          </a:bodyPr>
+          <a:lstStyle/>
+          <a:p>
+            <a:pPr lvl="0"/>
+            <a:r>
+              <a:rPr lang="en-US"/>
+              <a:t>Click to edit Master text styles</a:t>
+            </a:r>
+          </a:p>
+          <a:p>
+            <a:pPr lvl="1"/>
+            <a:r>
+              <a:rPr lang="en-US"/>
+              <a:t>Second level</a:t>
+            </a:r>
+          </a:p>
+          <a:p>
+            <a:pPr lvl="2"/>
+            <a:r>
+              <a:rPr lang="en-US"/>
+              <a:t>Third level</a:t>
+            </a:r>
+          </a:p>
+          <a:p>
+            <a:pPr lvl="3"/>
+            <a:r>
+              <a:rPr lang="en-US"/>
+              <a:t>Fourth level</a:t>
+            </a:r>
+          </a:p>
+          <a:p>
+            <a:pPr lvl="4"/>
+            <a:r>
+              <a:rPr lang="en-US"/>
+              <a:t>Fifth level</a:t>
+            </a:r>
+            <a:endParaRPr lang="ru-RU"/>
+          </a:p>
+        </p:txBody>
+      </p:sp>
+      <p:sp>
+        <p:nvSpPr>
+          <p:cNvPr id="4" name="Date Placeholder 3">
+            <a:extLst>
+              <a:ext uri="{FF2B5EF4-FFF2-40B4-BE49-F238E27FC236}">
+                <a16:creationId xmlns:a16="http://schemas.microsoft.com/office/drawing/2014/main" id="{968F1387-45CD-4559-9295-6443C5C82962}"/>
+              </a:ext>
+            </a:extLst>
+          </p:cNvPr>
+          <p:cNvSpPr>
+            <a:spLocks noGrp="1"/>
+          </p:cNvSpPr>
+          <p:nvPr>
+            <p:ph type="dt" sz="half" idx="2"/>
+          </p:nvPr>
+        </p:nvSpPr>
+        <p:spPr>
+          <a:xfrm>
+            <a:off x="838200" y="6356350"/>
+            <a:ext cx="2743200" cy="365125"/>
+          </a:xfrm>
+          <a:prstGeom prst="rect">
+            <a:avLst/>
+          </a:prstGeom>
+        </p:spPr>
+        <p:txBody>
+          <a:bodyPr vert="horz" lIns="91440" tIns="45720" rIns="91440" bIns="45720" rtlCol="0" anchor="ctr"/>
+          <a:lstStyle>
+            <a:lvl1pPr algn="l">
+              <a:defRPr sz="1200">
+                <a:solidFill>
+                  <a:schemeClr val="tx1">
+                    <a:tint val="75000"/>
+                  </a:schemeClr>
+                </a:solidFill>
+              </a:defRPr>
+            </a:lvl1pPr>
+          </a:lstStyle>
+          <a:p>
+            <a:fld id="{CCE9C9EE-394A-4997-9AB6-FF4DF45241DD}" type="datetimeFigureOut">
+              <a:rPr lang="ru-RU" smtClean="0"/>
+              <a:t>16.01.2021</a:t>
+            </a:fld>
+            <a:endParaRPr lang="ru-RU"/>
+          </a:p>
+        </p:txBody>
+      </p:sp>
+      <p:sp>
+        <p:nvSpPr>
+          <p:cNvPr id="5" name="Footer Placeholder 4">
+            <a:extLst>
+              <a:ext uri="{FF2B5EF4-FFF2-40B4-BE49-F238E27FC236}">
+                <a16:creationId xmlns:a16="http://schemas.microsoft.com/office/drawing/2014/main" id="{3157A664-63CB-4E5E-9B8A-40B049079BE7}"/>
+              </a:ext>
+            </a:extLst>
+          </p:cNvPr>
+          <p:cNvSpPr>
+            <a:spLocks noGrp="1"/>
+          </p:cNvSpPr>
+          <p:nvPr>
+            <p:ph type="ftr" sz="quarter" idx="3"/>
+          </p:nvPr>
+        </p:nvSpPr>
+        <p:spPr>
+          <a:xfrm>
+            <a:off x="4038600" y="6356350"/>
+            <a:ext cx="4114800" cy="365125"/>
+          </a:xfrm>
+          <a:prstGeom prst="rect">
+            <a:avLst/>
+          </a:prstGeom>
+        </p:spPr>
+        <p:txBody>
+          <a:bodyPr vert="horz" lIns="91440" tIns="45720" rIns="91440" bIns="45720" rtlCol="0" anchor="ctr"/>
+          <a:lstStyle>
+            <a:lvl1pPr algn="ctr">
+              <a:defRPr sz="1200">
+                <a:solidFill>
+                  <a:schemeClr val="tx1">
+                    <a:tint val="75000"/>
+                  </a:schemeClr>
+                </a:solidFill>
+              </a:defRPr>
+            </a:lvl1pPr>
+          </a:lstStyle>
+          <a:p>
+            <a:endParaRPr lang="ru-RU"/>
+          </a:p>
+        </p:txBody>
+      </p:sp>
+      <p:sp>
+        <p:nvSpPr>
+          <p:cNvPr id="6" name="Slide Number Placeholder 5">
+            <a:extLst>
+              <a:ext uri="{FF2B5EF4-FFF2-40B4-BE49-F238E27FC236}">
+                <a16:creationId xmlns:a16="http://schemas.microsoft.com/office/drawing/2014/main" id="{AFEBA7C1-6C01-440B-B61F-3C7C8C405D4F}"/>
+              </a:ext>
+            </a:extLst>
+          </p:cNvPr>
+          <p:cNvSpPr>
+            <a:spLocks noGrp="1"/>
+          </p:cNvSpPr>
+          <p:nvPr>
+            <p:ph type="sldNum" sz="quarter" idx="4"/>
+          </p:nvPr>
+        </p:nvSpPr>
+        <p:spPr>
+          <a:xfrm>
+            <a:off x="8610600" y="6356350"/>
+            <a:ext cx="2743200" cy="365125"/>
+          </a:xfrm>
+          <a:prstGeom prst="rect">
+            <a:avLst/>
+          </a:prstGeom>
+        </p:spPr>
+        <p:txBody>
+          <a:bodyPr vert="horz" lIns="91440" tIns="45720" rIns="91440" bIns="45720" rtlCol="0" anchor="ctr"/>
+          <a:lstStyle>
+            <a:lvl1pPr algn="r">
+              <a:defRPr sz="1200">
+                <a:solidFill>
+                  <a:schemeClr val="tx1">
+                    <a:tint val="75000"/>
+                  </a:schemeClr>
+                </a:solidFill>
+              </a:defRPr>
+            </a:lvl1pPr>
+          </a:lstStyle>
+          <a:p>
+            <a:fld id="{163AA9C3-46E6-45F3-8D85-E86FB74784B0}" type="slidenum">
+              <a:rPr lang="ru-RU" smtClean="0"/>
+              <a:t>‹#›</a:t>
+            </a:fld>
+            <a:endParaRPr lang="ru-RU"/>
+          </a:p>
+        </p:txBody>
+      </p:sp>
+    </p:spTree>
+    <p:extLst>
+      <p:ext uri="{BB962C8B-B14F-4D97-AF65-F5344CB8AC3E}">
+        <p14:creationId xmlns:p14="http://schemas.microsoft.com/office/powerpoint/2010/main" val="122591122"/>
+      </p:ext>
+    </p:extLst>
+  </p:cSld>
+  <p:clrMap bg1="lt1" tx1="dk1" bg2="lt2" tx2="dk2" accent1="accent1" accent2="accent2" accent3="accent3" accent4="accent4" accent5="accent5" accent6="accent6" hlink="hlink" folHlink="folHlink"/>
+  <p:sldLayoutIdLst>
+    <p:sldLayoutId id="2147483661" r:id="rId1"/>
+    <p:sldLayoutId id="2147483662" r:id="rId2"/>
+    <p:sldLayoutId id="2147483663" r:id="rId3"/>
+    <p:sldLayoutId id="2147483664" r:id="rId4"/>
+    <p:sldLayoutId id="2147483665" r:id="rId5"/>
+    <p:sldLayoutId id="2147483666" r:id="rId6"/>
+    <p:sldLayoutId id="2147483667" r:id="rId7"/>
+    <p:sldLayoutId id="2147483668" r:id="rId8"/>
+    <p:sldLayoutId id="2147483669" r:id="rId9"/>
+    <p:sldLayoutId id="2147483670" r:id="rId10"/>
+    <p:sldLayoutId id="2147483671" r:id="rId11"/>
+  </p:sldLayoutIdLst>
+  <p:txStyles>
+    <p:titleStyle>
+      <a:lvl1pPr algn="l" defTabSz="914400" rtl="0" eaLnBrk="1" latinLnBrk="0" hangingPunct="1">
+        <a:lnSpc>
+          <a:spcPct val="90000"/>
+        </a:lnSpc>
+        <a:spcBef>
+          <a:spcPct val="0"/>
+        </a:spcBef>
+        <a:buNone/>
+        <a:defRPr sz="4400" kern="1200">
+          <a:solidFill>
+            <a:schemeClr val="tx1"/>
+          </a:solidFill>
+          <a:latin typeface="+mj-lt"/>
+          <a:ea typeface="+mj-ea"/>
+          <a:cs typeface="+mj-cs"/>
+        </a:defRPr>
+      </a:lvl1pPr>
+    </p:titleStyle>
+    <p:bodyStyle>
+      <a:lvl1pPr marL="228600" indent="-228600" algn="l" defTabSz="914400" rtl="0" eaLnBrk="1" latinLnBrk="0" hangingPunct="1">
+        <a:lnSpc>
+          <a:spcPct val="90000"/>
+        </a:lnSpc>
+        <a:spcBef>
+          <a:spcPts val="1000"/>
+        </a:spcBef>
+        <a:buFont typeface="Arial" panose="020B0604020202020204" pitchFamily="34" charset="0"/>
+        <a:buChar char="•"/>
+        <a:defRPr sz="2800" kern="1200">
+          <a:solidFill>
+            <a:schemeClr val="tx1"/>
+          </a:solidFill>
+          <a:latin typeface="+mn-lt"/>
+          <a:ea typeface="+mn-ea"/>
+          <a:cs typeface="+mn-cs"/>
+        </a:defRPr>
+      </a:lvl1pPr>
+      <a:lvl2pPr marL="685800" indent="-228600" algn="l" defTabSz="914400" rtl="0" eaLnBrk="1" latinLnBrk="0" hangingPunct="1">
+        <a:lnSpc>
+          <a:spcPct val="90000"/>
+        </a:lnSpc>
+        <a:spcBef>
+          <a:spcPts val="500"/>
+        </a:spcBef>
+        <a:buFont typeface="Arial" panose="020B0604020202020204" pitchFamily="34" charset="0"/>
+        <a:buChar char="•"/>
+        <a:defRPr sz="2400" kern="1200">
+          <a:solidFill>
+            <a:schemeClr val="tx1"/>
+          </a:solidFill>
+          <a:latin typeface="+mn-lt"/>
+          <a:ea typeface="+mn-ea"/>
+          <a:cs typeface="+mn-cs"/>
+        </a:defRPr>
+      </a:lvl2pPr>
+      <a:lvl3pPr marL="1143000" indent="-228600" algn="l" defTabSz="914400" rtl="0" eaLnBrk="1" latinLnBrk="0" hangingPunct="1">
+        <a:lnSpc>
+          <a:spcPct val="90000"/>
+        </a:lnSpc>
+        <a:spcBef>
+          <a:spcPts val="500"/>
+        </a:spcBef>
+        <a:buFont typeface="Arial" panose="020B0604020202020204" pitchFamily="34" charset="0"/>
+        <a:buChar char="•"/>
+        <a:defRPr sz="2000" kern="1200">
+          <a:solidFill>
+            <a:schemeClr val="tx1"/>
+          </a:solidFill>
+          <a:latin typeface="+mn-lt"/>
+          <a:ea typeface="+mn-ea"/>
+          <a:cs typeface="+mn-cs"/>
+        </a:defRPr>
+      </a:lvl3pPr>
+      <a:lvl4pPr marL="1600200" indent="-228600" algn="l" defTabSz="914400" rtl="0" eaLnBrk="1" latinLnBrk="0" hangingPunct="1">
+        <a:lnSpc>
+          <a:spcPct val="90000"/>
+        </a:lnSpc>
+        <a:spcBef>
+          <a:spcPts val="500"/>
+        </a:spcBef>
+        <a:buFont typeface="Arial" panose="020B0604020202020204" pitchFamily="34" charset="0"/>
+        <a:buChar char="•"/>
+        <a:defRPr sz="1800" kern="1200">
+          <a:solidFill>
+            <a:schemeClr val="tx1"/>
+          </a:solidFill>
+          <a:latin typeface="+mn-lt"/>
+          <a:ea typeface="+mn-ea"/>
+          <a:cs typeface="+mn-cs"/>
+        </a:defRPr>
+      </a:lvl4pPr>
+      <a:lvl5pPr marL="2057400" indent="-228600" algn="l" defTabSz="914400" rtl="0" eaLnBrk="1" latinLnBrk="0" hangingPunct="1">
+        <a:lnSpc>
+          <a:spcPct val="90000"/>
+        </a:lnSpc>
+        <a:spcBef>
+          <a:spcPts val="500"/>
+        </a:spcBef>
+        <a:buFont typeface="Arial" panose="020B0604020202020204" pitchFamily="34" charset="0"/>
+        <a:buChar char="•"/>
+        <a:defRPr sz="1800" kern="1200">
+          <a:solidFill>
+            <a:schemeClr val="tx1"/>
+          </a:solidFill>
+          <a:latin typeface="+mn-lt"/>
+          <a:ea typeface="+mn-ea"/>
+          <a:cs typeface="+mn-cs"/>
+        </a:defRPr>
+      </a:lvl5pPr>
+      <a:lvl6pPr marL="2514600" indent="-228600" algn="l" defTabSz="914400" rtl="0" eaLnBrk="1" latinLnBrk="0" hangingPunct="1">
+        <a:lnSpc>
+          <a:spcPct val="90000"/>
+        </a:lnSpc>
+        <a:spcBef>
+          <a:spcPts val="500"/>
+        </a:spcBef>
+        <a:buFont typeface="Arial" panose="020B0604020202020204" pitchFamily="34" charset="0"/>
+        <a:buChar char="•"/>
+        <a:defRPr sz="1800" kern="1200">
+          <a:solidFill>
+            <a:schemeClr val="tx1"/>
+          </a:solidFill>
+          <a:latin typeface="+mn-lt"/>
+          <a:ea typeface="+mn-ea"/>
+          <a:cs typeface="+mn-cs"/>
+        </a:defRPr>
+      </a:lvl6pPr>
+      <a:lvl7pPr marL="2971800" indent="-228600" algn="l" defTabSz="914400" rtl="0" eaLnBrk="1" latinLnBrk="0" hangingPunct="1">
+        <a:lnSpc>
+          <a:spcPct val="90000"/>
+        </a:lnSpc>
+        <a:spcBef>
+          <a:spcPts val="500"/>
+        </a:spcBef>
+        <a:buFont typeface="Arial" panose="020B0604020202020204" pitchFamily="34" charset="0"/>
+        <a:buChar char="•"/>
+        <a:defRPr sz="1800" kern="1200">
+          <a:solidFill>
+            <a:schemeClr val="tx1"/>
+          </a:solidFill>
+          <a:latin typeface="+mn-lt"/>
+          <a:ea typeface="+mn-ea"/>
+          <a:cs typeface="+mn-cs"/>
+        </a:defRPr>
+      </a:lvl7pPr>
+      <a:lvl8pPr marL="3429000" indent="-228600" algn="l" defTabSz="914400" rtl="0" eaLnBrk="1" latinLnBrk="0" hangingPunct="1">
+        <a:lnSpc>
+          <a:spcPct val="90000"/>
+        </a:lnSpc>
+        <a:spcBef>
+          <a:spcPts val="500"/>
+        </a:spcBef>
+        <a:buFont typeface="Arial" panose="020B0604020202020204" pitchFamily="34" charset="0"/>
+        <a:buChar char="•"/>
+        <a:defRPr sz="1800" kern="1200">
+          <a:solidFill>
+            <a:schemeClr val="tx1"/>
+          </a:solidFill>
+          <a:latin typeface="+mn-lt"/>
+          <a:ea typeface="+mn-ea"/>
+          <a:cs typeface="+mn-cs"/>
+        </a:defRPr>
+      </a:lvl8pPr>
+      <a:lvl9pPr marL="3886200" indent="-228600" algn="l" defTabSz="914400" rtl="0" eaLnBrk="1" latinLnBrk="0" hangingPunct="1">
+        <a:lnSpc>
+          <a:spcPct val="90000"/>
+        </a:lnSpc>
+        <a:spcBef>
+          <a:spcPts val="500"/>
+        </a:spcBef>
+        <a:buFont typeface="Arial" panose="020B0604020202020204" pitchFamily="34" charset="0"/>
+        <a:buChar char="•"/>
+        <a:defRPr sz="1800" kern="1200">
+          <a:solidFill>
+            <a:schemeClr val="tx1"/>
+          </a:solidFill>
+          <a:latin typeface="+mn-lt"/>
+          <a:ea typeface="+mn-ea"/>
+          <a:cs typeface="+mn-cs"/>
+        </a:defRPr>
+      </a:lvl9pPr>
+    </p:bodyStyle>
+    <p:otherStyle>
+      <a:defPPr>
+        <a:defRPr lang="ru-RU"/>
       </a:defPPr>
       <a:lvl1pPr marL="0" algn="l" defTabSz="914400" rtl="0" eaLnBrk="1" latinLnBrk="0" hangingPunct="1">
         <a:defRPr sz="1800" kern="1200">
@@ -5176,4 +8395,299 @@
     </a:ext>
   </a:extLst>
 </a:theme>
+</file>
+
+<file path=ppt/theme/theme2.xml><?xml version="1.0" encoding="utf-8"?>
+<a:theme xmlns:a="http://schemas.openxmlformats.org/drawingml/2006/main" name="Custom Design">
+  <a:themeElements>
+    <a:clrScheme name="Office">
+      <a:dk1>
+        <a:sysClr val="windowText" lastClr="000000"/>
+      </a:dk1>
+      <a:lt1>
+        <a:sysClr val="window" lastClr="FFFFFF"/>
+      </a:lt1>
+      <a:dk2>
+        <a:srgbClr val="44546A"/>
+      </a:dk2>
+      <a:lt2>
+        <a:srgbClr val="E7E6E6"/>
+      </a:lt2>
+      <a:accent1>
+        <a:srgbClr val="4472C4"/>
+      </a:accent1>
+      <a:accent2>
+        <a:srgbClr val="ED7D31"/>
+      </a:accent2>
+      <a:accent3>
+        <a:srgbClr val="A5A5A5"/>
+      </a:accent3>
+      <a:accent4>
+        <a:srgbClr val="FFC000"/>
+      </a:accent4>
+      <a:accent5>
+        <a:srgbClr val="5B9BD5"/>
+      </a:accent5>
+      <a:accent6>
+        <a:srgbClr val="70AD47"/>
+      </a:accent6>
+      <a:hlink>
+        <a:srgbClr val="0563C1"/>
+      </a:hlink>
+      <a:folHlink>
+        <a:srgbClr val="954F72"/>
+      </a:folHlink>
+    </a:clrScheme>
+    <a:fontScheme name="Office">
+      <a:majorFont>
+        <a:latin typeface="Calibri Light" panose="020F0302020204030204"/>
+        <a:ea typeface=""/>
+        <a:cs typeface=""/>
+        <a:font script="Jpan" typeface="游ゴシック Light"/>
+        <a:font script="Hang" typeface="맑은 고딕"/>
+        <a:font script="Hans" typeface="等线 Light"/>
+        <a:font script="Hant" typeface="新細明體"/>
+        <a:font script="Arab" typeface="Times New Roman"/>
+        <a:font script="Hebr" typeface="Times New Roman"/>
+        <a:font script="Thai" typeface="Angsana New"/>
+        <a:font script="Ethi" typeface="Nyala"/>
+        <a:font script="Beng" typeface="Vrinda"/>
+        <a:font script="Gujr" typeface="Shruti"/>
+        <a:font script="Khmr" typeface="MoolBoran"/>
+        <a:font script="Knda" typeface="Tunga"/>
+        <a:font script="Guru" typeface="Raavi"/>
+        <a:font script="Cans" typeface="Euphemia"/>
+        <a:font script="Cher" typeface="Plantagenet Cherokee"/>
+        <a:font script="Yiii" typeface="Microsoft Yi Baiti"/>
+        <a:font script="Tibt" typeface="Microsoft Himalaya"/>
+        <a:font script="Thaa" typeface="MV Boli"/>
+        <a:font script="Deva" typeface="Mangal"/>
+        <a:font script="Telu" typeface="Gautami"/>
+        <a:font script="Taml" typeface="Latha"/>
+        <a:font script="Syrc" typeface="Estrangelo Edessa"/>
+        <a:font script="Orya" typeface="Kalinga"/>
+        <a:font script="Mlym" typeface="Kartika"/>
+        <a:font script="Laoo" typeface="DokChampa"/>
+        <a:font script="Sinh" typeface="Iskoola Pota"/>
+        <a:font script="Mong" typeface="Mongolian Baiti"/>
+        <a:font script="Viet" typeface="Times New Roman"/>
+        <a:font script="Uigh" typeface="Microsoft Uighur"/>
+        <a:font script="Geor" typeface="Sylfaen"/>
+        <a:font script="Armn" typeface="Arial"/>
+        <a:font script="Bugi" typeface="Leelawadee UI"/>
+        <a:font script="Bopo" typeface="Microsoft JhengHei"/>
+        <a:font script="Java" typeface="Javanese Text"/>
+        <a:font script="Lisu" typeface="Segoe UI"/>
+        <a:font script="Mymr" typeface="Myanmar Text"/>
+        <a:font script="Nkoo" typeface="Ebrima"/>
+        <a:font script="Olck" typeface="Nirmala UI"/>
+        <a:font script="Osma" typeface="Ebrima"/>
+        <a:font script="Phag" typeface="Phagspa"/>
+        <a:font script="Syrn" typeface="Estrangelo Edessa"/>
+        <a:font script="Syrj" typeface="Estrangelo Edessa"/>
+        <a:font script="Syre" typeface="Estrangelo Edessa"/>
+        <a:font script="Sora" typeface="Nirmala UI"/>
+        <a:font script="Tale" typeface="Microsoft Tai Le"/>
+        <a:font script="Talu" typeface="Microsoft New Tai Lue"/>
+        <a:font script="Tfng" typeface="Ebrima"/>
+      </a:majorFont>
+      <a:minorFont>
+        <a:latin typeface="Calibri" panose="020F0502020204030204"/>
+        <a:ea typeface=""/>
+        <a:cs typeface=""/>
+        <a:font script="Jpan" typeface="游ゴシック"/>
+        <a:font script="Hang" typeface="맑은 고딕"/>
+        <a:font script="Hans" typeface="等线"/>
+        <a:font script="Hant" typeface="新細明體"/>
+        <a:font script="Arab" typeface="Arial"/>
+        <a:font script="Hebr" typeface="Arial"/>
+        <a:font script="Thai" typeface="Cordia New"/>
+        <a:font script="Ethi" typeface="Nyala"/>
+        <a:font script="Beng" typeface="Vrinda"/>
+        <a:font script="Gujr" typeface="Shruti"/>
+        <a:font script="Khmr" typeface="DaunPenh"/>
+        <a:font script="Knda" typeface="Tunga"/>
+        <a:font script="Guru" typeface="Raavi"/>
+        <a:font script="Cans" typeface="Euphemia"/>
+        <a:font script="Cher" typeface="Plantagenet Cherokee"/>
+        <a:font script="Yiii" typeface="Microsoft Yi Baiti"/>
+        <a:font script="Tibt" typeface="Microsoft Himalaya"/>
+        <a:font script="Thaa" typeface="MV Boli"/>
+        <a:font script="Deva" typeface="Mangal"/>
+        <a:font script="Telu" typeface="Gautami"/>
+        <a:font script="Taml" typeface="Latha"/>
+        <a:font script="Syrc" typeface="Estrangelo Edessa"/>
+        <a:font script="Orya" typeface="Kalinga"/>
+        <a:font script="Mlym" typeface="Kartika"/>
+        <a:font script="Laoo" typeface="DokChampa"/>
+        <a:font script="Sinh" typeface="Iskoola Pota"/>
+        <a:font script="Mong" typeface="Mongolian Baiti"/>
+        <a:font script="Viet" typeface="Arial"/>
+        <a:font script="Uigh" typeface="Microsoft Uighur"/>
+        <a:font script="Geor" typeface="Sylfaen"/>
+        <a:font script="Armn" typeface="Arial"/>
+        <a:font script="Bugi" typeface="Leelawadee UI"/>
+        <a:font script="Bopo" typeface="Microsoft JhengHei"/>
+        <a:font script="Java" typeface="Javanese Text"/>
+        <a:font script="Lisu" typeface="Segoe UI"/>
+        <a:font script="Mymr" typeface="Myanmar Text"/>
+        <a:font script="Nkoo" typeface="Ebrima"/>
+        <a:font script="Olck" typeface="Nirmala UI"/>
+        <a:font script="Osma" typeface="Ebrima"/>
+        <a:font script="Phag" typeface="Phagspa"/>
+        <a:font script="Syrn" typeface="Estrangelo Edessa"/>
+        <a:font script="Syrj" typeface="Estrangelo Edessa"/>
+        <a:font script="Syre" typeface="Estrangelo Edessa"/>
+        <a:font script="Sora" typeface="Nirmala UI"/>
+        <a:font script="Tale" typeface="Microsoft Tai Le"/>
+        <a:font script="Talu" typeface="Microsoft New Tai Lue"/>
+        <a:font script="Tfng" typeface="Ebrima"/>
+      </a:minorFont>
+    </a:fontScheme>
+    <a:fmtScheme name="Office">
+      <a:fillStyleLst>
+        <a:solidFill>
+          <a:schemeClr val="phClr"/>
+        </a:solidFill>
+        <a:gradFill rotWithShape="1">
+          <a:gsLst>
+            <a:gs pos="0">
+              <a:schemeClr val="phClr">
+                <a:lumMod val="110000"/>
+                <a:satMod val="105000"/>
+                <a:tint val="67000"/>
+              </a:schemeClr>
+            </a:gs>
+            <a:gs pos="50000">
+              <a:schemeClr val="phClr">
+                <a:lumMod val="105000"/>
+                <a:satMod val="103000"/>
+                <a:tint val="73000"/>
+              </a:schemeClr>
+            </a:gs>
+            <a:gs pos="100000">
+              <a:schemeClr val="phClr">
+                <a:lumMod val="105000"/>
+                <a:satMod val="109000"/>
+                <a:tint val="81000"/>
+              </a:schemeClr>
+            </a:gs>
+          </a:gsLst>
+          <a:lin ang="5400000" scaled="0"/>
+        </a:gradFill>
+        <a:gradFill rotWithShape="1">
+          <a:gsLst>
+            <a:gs pos="0">
+              <a:schemeClr val="phClr">
+                <a:satMod val="103000"/>
+                <a:lumMod val="102000"/>
+                <a:tint val="94000"/>
+              </a:schemeClr>
+            </a:gs>
+            <a:gs pos="50000">
+              <a:schemeClr val="phClr">
+                <a:satMod val="110000"/>
+                <a:lumMod val="100000"/>
+                <a:shade val="100000"/>
+              </a:schemeClr>
+            </a:gs>
+            <a:gs pos="100000">
+              <a:schemeClr val="phClr">
+                <a:lumMod val="99000"/>
+                <a:satMod val="120000"/>
+                <a:shade val="78000"/>
+              </a:schemeClr>
+            </a:gs>
+          </a:gsLst>
+          <a:lin ang="5400000" scaled="0"/>
+        </a:gradFill>
+      </a:fillStyleLst>
+      <a:lnStyleLst>
+        <a:ln w="6350" cap="flat" cmpd="sng" algn="ctr">
+          <a:solidFill>
+            <a:schemeClr val="phClr"/>
+          </a:solidFill>
+          <a:prstDash val="solid"/>
+          <a:miter lim="800000"/>
+        </a:ln>
+        <a:ln w="12700" cap="flat" cmpd="sng" algn="ctr">
+          <a:solidFill>
+            <a:schemeClr val="phClr"/>
+          </a:solidFill>
+          <a:prstDash val="solid"/>
+          <a:miter lim="800000"/>
+        </a:ln>
+        <a:ln w="19050" cap="flat" cmpd="sng" algn="ctr">
+          <a:solidFill>
+            <a:schemeClr val="phClr"/>
+          </a:solidFill>
+          <a:prstDash val="solid"/>
+          <a:miter lim="800000"/>
+        </a:ln>
+      </a:lnStyleLst>
+      <a:effectStyleLst>
+        <a:effectStyle>
+          <a:effectLst/>
+        </a:effectStyle>
+        <a:effectStyle>
+          <a:effectLst/>
+        </a:effectStyle>
+        <a:effectStyle>
+          <a:effectLst>
+            <a:outerShdw blurRad="57150" dist="19050" dir="5400000" algn="ctr" rotWithShape="0">
+              <a:srgbClr val="000000">
+                <a:alpha val="63000"/>
+              </a:srgbClr>
+            </a:outerShdw>
+          </a:effectLst>
+        </a:effectStyle>
+      </a:effectStyleLst>
+      <a:bgFillStyleLst>
+        <a:solidFill>
+          <a:schemeClr val="phClr"/>
+        </a:solidFill>
+        <a:solidFill>
+          <a:schemeClr val="phClr">
+            <a:tint val="95000"/>
+            <a:satMod val="170000"/>
+          </a:schemeClr>
+        </a:solidFill>
+        <a:gradFill rotWithShape="1">
+          <a:gsLst>
+            <a:gs pos="0">
+              <a:schemeClr val="phClr">
+                <a:tint val="93000"/>
+                <a:satMod val="150000"/>
+                <a:shade val="98000"/>
+                <a:lumMod val="102000"/>
+              </a:schemeClr>
+            </a:gs>
+            <a:gs pos="50000">
+              <a:schemeClr val="phClr">
+                <a:tint val="98000"/>
+                <a:satMod val="130000"/>
+                <a:shade val="90000"/>
+                <a:lumMod val="103000"/>
+              </a:schemeClr>
+            </a:gs>
+            <a:gs pos="100000">
+              <a:schemeClr val="phClr">
+                <a:shade val="63000"/>
+                <a:satMod val="120000"/>
+              </a:schemeClr>
+            </a:gs>
+          </a:gsLst>
+          <a:lin ang="5400000" scaled="0"/>
+        </a:gradFill>
+      </a:bgFillStyleLst>
+    </a:fmtScheme>
+  </a:themeElements>
+  <a:objectDefaults/>
+  <a:extraClrSchemeLst/>
+  <a:extLst>
+    <a:ext uri="{05A4C25C-085E-4340-85A3-A5531E510DB2}">
+      <thm15:themeFamily xmlns:thm15="http://schemas.microsoft.com/office/thememl/2012/main" name="Office Theme" id="{62F939B6-93AF-4DB8-9C6B-D6C7DFDC589F}" vid="{4A3C46E8-61CC-4603-A589-7422A47A8E4A}"/>
+    </a:ext>
+  </a:extLst>
+</a:theme>
 </file>
</xml_diff>

<commit_message>
#44: Add base API to get Slide Master collection (#89)
</commit_message>
<xml_diff>
--- a/ShapeCrawler.Tests.Unit/Resource/002.pptx
+++ b/ShapeCrawler.Tests.Unit/Resource/002.pptx
@@ -3,11 +3,12 @@
 <p:presentation xmlns:a="http://schemas.openxmlformats.org/drawingml/2006/main" xmlns:r="http://schemas.openxmlformats.org/officeDocument/2006/relationships" xmlns:p="http://schemas.openxmlformats.org/presentationml/2006/main" saveSubsetFonts="1">
   <p:sldMasterIdLst>
     <p:sldMasterId id="2147483648" r:id="rId1"/>
+    <p:sldMasterId id="2147483660" r:id="rId2"/>
   </p:sldMasterIdLst>
   <p:sldIdLst>
-    <p:sldId id="256" r:id="rId2"/>
-    <p:sldId id="257" r:id="rId3"/>
-    <p:sldId id="258" r:id="rId4"/>
+    <p:sldId id="256" r:id="rId3"/>
+    <p:sldId id="257" r:id="rId4"/>
+    <p:sldId id="258" r:id="rId5"/>
   </p:sldIdLst>
   <p:sldSz cx="12192000" cy="6858000"/>
   <p:notesSz cx="6858000" cy="9144000"/>
@@ -1263,7 +1264,7 @@
           <a:p>
             <a:fld id="{6A2D1428-0459-4F75-829F-043936AE8C9E}" type="datetimeFigureOut">
               <a:rPr lang="en-US" smtClean="0"/>
-              <a:t>12/29/2020</a:t>
+              <a:t>1/16/2021</a:t>
             </a:fld>
             <a:endParaRPr lang="en-US"/>
           </a:p>
@@ -1463,7 +1464,7 @@
           <a:p>
             <a:fld id="{6A2D1428-0459-4F75-829F-043936AE8C9E}" type="datetimeFigureOut">
               <a:rPr lang="en-US" smtClean="0"/>
-              <a:t>12/29/2020</a:t>
+              <a:t>1/16/2021</a:t>
             </a:fld>
             <a:endParaRPr lang="en-US"/>
           </a:p>
@@ -1673,7 +1674,7 @@
           <a:p>
             <a:fld id="{6A2D1428-0459-4F75-829F-043936AE8C9E}" type="datetimeFigureOut">
               <a:rPr lang="en-US" smtClean="0"/>
-              <a:t>12/29/2020</a:t>
+              <a:t>1/16/2021</a:t>
             </a:fld>
             <a:endParaRPr lang="en-US"/>
           </a:p>
@@ -1737,6 +1738,1955 @@
     <p:extLst>
       <p:ext uri="{BB962C8B-B14F-4D97-AF65-F5344CB8AC3E}">
         <p14:creationId xmlns:p14="http://schemas.microsoft.com/office/powerpoint/2010/main" val="1918736846"/>
+      </p:ext>
+    </p:extLst>
+  </p:cSld>
+  <p:clrMapOvr>
+    <a:masterClrMapping/>
+  </p:clrMapOvr>
+</p:sldLayout>
+</file>
+
+<file path=ppt/slideLayouts/slideLayout12.xml><?xml version="1.0" encoding="utf-8"?>
+<p:sldLayout xmlns:a="http://schemas.openxmlformats.org/drawingml/2006/main" xmlns:r="http://schemas.openxmlformats.org/officeDocument/2006/relationships" xmlns:p="http://schemas.openxmlformats.org/presentationml/2006/main" type="title" preserve="1">
+  <p:cSld name="Title Slide">
+    <p:spTree>
+      <p:nvGrpSpPr>
+        <p:cNvPr id="1" name=""/>
+        <p:cNvGrpSpPr/>
+        <p:nvPr/>
+      </p:nvGrpSpPr>
+      <p:grpSpPr>
+        <a:xfrm>
+          <a:off x="0" y="0"/>
+          <a:ext cx="0" cy="0"/>
+          <a:chOff x="0" y="0"/>
+          <a:chExt cx="0" cy="0"/>
+        </a:xfrm>
+      </p:grpSpPr>
+      <p:sp>
+        <p:nvSpPr>
+          <p:cNvPr id="2" name="Title 1">
+            <a:extLst>
+              <a:ext uri="{FF2B5EF4-FFF2-40B4-BE49-F238E27FC236}">
+                <a16:creationId xmlns:a16="http://schemas.microsoft.com/office/drawing/2014/main" id="{F23892C7-9DD1-434E-AA12-D47DFEBC237B}"/>
+              </a:ext>
+            </a:extLst>
+          </p:cNvPr>
+          <p:cNvSpPr>
+            <a:spLocks noGrp="1"/>
+          </p:cNvSpPr>
+          <p:nvPr>
+            <p:ph type="ctrTitle"/>
+          </p:nvPr>
+        </p:nvSpPr>
+        <p:spPr>
+          <a:xfrm>
+            <a:off x="1524000" y="1122363"/>
+            <a:ext cx="9144000" cy="2387600"/>
+          </a:xfrm>
+        </p:spPr>
+        <p:txBody>
+          <a:bodyPr anchor="b"/>
+          <a:lstStyle>
+            <a:lvl1pPr algn="ctr">
+              <a:defRPr sz="6000"/>
+            </a:lvl1pPr>
+          </a:lstStyle>
+          <a:p>
+            <a:r>
+              <a:rPr lang="en-US"/>
+              <a:t>Click to edit Master title style</a:t>
+            </a:r>
+            <a:endParaRPr lang="ru-RU"/>
+          </a:p>
+        </p:txBody>
+      </p:sp>
+      <p:sp>
+        <p:nvSpPr>
+          <p:cNvPr id="3" name="Subtitle 2">
+            <a:extLst>
+              <a:ext uri="{FF2B5EF4-FFF2-40B4-BE49-F238E27FC236}">
+                <a16:creationId xmlns:a16="http://schemas.microsoft.com/office/drawing/2014/main" id="{E4332632-BF3A-4A82-AE40-F51F13614710}"/>
+              </a:ext>
+            </a:extLst>
+          </p:cNvPr>
+          <p:cNvSpPr>
+            <a:spLocks noGrp="1"/>
+          </p:cNvSpPr>
+          <p:nvPr>
+            <p:ph type="subTitle" idx="1"/>
+          </p:nvPr>
+        </p:nvSpPr>
+        <p:spPr>
+          <a:xfrm>
+            <a:off x="1524000" y="3602038"/>
+            <a:ext cx="9144000" cy="1655762"/>
+          </a:xfrm>
+        </p:spPr>
+        <p:txBody>
+          <a:bodyPr/>
+          <a:lstStyle>
+            <a:lvl1pPr marL="0" indent="0" algn="ctr">
+              <a:buNone/>
+              <a:defRPr sz="2400"/>
+            </a:lvl1pPr>
+            <a:lvl2pPr marL="457200" indent="0" algn="ctr">
+              <a:buNone/>
+              <a:defRPr sz="2000"/>
+            </a:lvl2pPr>
+            <a:lvl3pPr marL="914400" indent="0" algn="ctr">
+              <a:buNone/>
+              <a:defRPr sz="1800"/>
+            </a:lvl3pPr>
+            <a:lvl4pPr marL="1371600" indent="0" algn="ctr">
+              <a:buNone/>
+              <a:defRPr sz="1600"/>
+            </a:lvl4pPr>
+            <a:lvl5pPr marL="1828800" indent="0" algn="ctr">
+              <a:buNone/>
+              <a:defRPr sz="1600"/>
+            </a:lvl5pPr>
+            <a:lvl6pPr marL="2286000" indent="0" algn="ctr">
+              <a:buNone/>
+              <a:defRPr sz="1600"/>
+            </a:lvl6pPr>
+            <a:lvl7pPr marL="2743200" indent="0" algn="ctr">
+              <a:buNone/>
+              <a:defRPr sz="1600"/>
+            </a:lvl7pPr>
+            <a:lvl8pPr marL="3200400" indent="0" algn="ctr">
+              <a:buNone/>
+              <a:defRPr sz="1600"/>
+            </a:lvl8pPr>
+            <a:lvl9pPr marL="3657600" indent="0" algn="ctr">
+              <a:buNone/>
+              <a:defRPr sz="1600"/>
+            </a:lvl9pPr>
+          </a:lstStyle>
+          <a:p>
+            <a:r>
+              <a:rPr lang="en-US"/>
+              <a:t>Click to edit Master subtitle style</a:t>
+            </a:r>
+            <a:endParaRPr lang="ru-RU"/>
+          </a:p>
+        </p:txBody>
+      </p:sp>
+      <p:sp>
+        <p:nvSpPr>
+          <p:cNvPr id="4" name="Date Placeholder 3">
+            <a:extLst>
+              <a:ext uri="{FF2B5EF4-FFF2-40B4-BE49-F238E27FC236}">
+                <a16:creationId xmlns:a16="http://schemas.microsoft.com/office/drawing/2014/main" id="{D0ADC6C2-7F75-43A7-9EC9-6E5D37A0AA15}"/>
+              </a:ext>
+            </a:extLst>
+          </p:cNvPr>
+          <p:cNvSpPr>
+            <a:spLocks noGrp="1"/>
+          </p:cNvSpPr>
+          <p:nvPr>
+            <p:ph type="dt" sz="half" idx="10"/>
+          </p:nvPr>
+        </p:nvSpPr>
+        <p:spPr/>
+        <p:txBody>
+          <a:bodyPr/>
+          <a:lstStyle/>
+          <a:p>
+            <a:fld id="{CCE9C9EE-394A-4997-9AB6-FF4DF45241DD}" type="datetimeFigureOut">
+              <a:rPr lang="ru-RU" smtClean="0"/>
+              <a:t>16.01.2021</a:t>
+            </a:fld>
+            <a:endParaRPr lang="ru-RU"/>
+          </a:p>
+        </p:txBody>
+      </p:sp>
+      <p:sp>
+        <p:nvSpPr>
+          <p:cNvPr id="5" name="Footer Placeholder 4">
+            <a:extLst>
+              <a:ext uri="{FF2B5EF4-FFF2-40B4-BE49-F238E27FC236}">
+                <a16:creationId xmlns:a16="http://schemas.microsoft.com/office/drawing/2014/main" id="{5B1D918C-D00F-4F54-BEAC-F43BE12B0E91}"/>
+              </a:ext>
+            </a:extLst>
+          </p:cNvPr>
+          <p:cNvSpPr>
+            <a:spLocks noGrp="1"/>
+          </p:cNvSpPr>
+          <p:nvPr>
+            <p:ph type="ftr" sz="quarter" idx="11"/>
+          </p:nvPr>
+        </p:nvSpPr>
+        <p:spPr/>
+        <p:txBody>
+          <a:bodyPr/>
+          <a:lstStyle/>
+          <a:p>
+            <a:endParaRPr lang="ru-RU"/>
+          </a:p>
+        </p:txBody>
+      </p:sp>
+      <p:sp>
+        <p:nvSpPr>
+          <p:cNvPr id="6" name="Slide Number Placeholder 5">
+            <a:extLst>
+              <a:ext uri="{FF2B5EF4-FFF2-40B4-BE49-F238E27FC236}">
+                <a16:creationId xmlns:a16="http://schemas.microsoft.com/office/drawing/2014/main" id="{43E6C5EB-30AE-4ADE-BCA3-FA2007C4BE3E}"/>
+              </a:ext>
+            </a:extLst>
+          </p:cNvPr>
+          <p:cNvSpPr>
+            <a:spLocks noGrp="1"/>
+          </p:cNvSpPr>
+          <p:nvPr>
+            <p:ph type="sldNum" sz="quarter" idx="12"/>
+          </p:nvPr>
+        </p:nvSpPr>
+        <p:spPr/>
+        <p:txBody>
+          <a:bodyPr/>
+          <a:lstStyle/>
+          <a:p>
+            <a:fld id="{163AA9C3-46E6-45F3-8D85-E86FB74784B0}" type="slidenum">
+              <a:rPr lang="ru-RU" smtClean="0"/>
+              <a:t>‹#›</a:t>
+            </a:fld>
+            <a:endParaRPr lang="ru-RU"/>
+          </a:p>
+        </p:txBody>
+      </p:sp>
+    </p:spTree>
+    <p:extLst>
+      <p:ext uri="{BB962C8B-B14F-4D97-AF65-F5344CB8AC3E}">
+        <p14:creationId xmlns:p14="http://schemas.microsoft.com/office/powerpoint/2010/main" val="3455675271"/>
+      </p:ext>
+    </p:extLst>
+  </p:cSld>
+  <p:clrMapOvr>
+    <a:masterClrMapping/>
+  </p:clrMapOvr>
+</p:sldLayout>
+</file>
+
+<file path=ppt/slideLayouts/slideLayout13.xml><?xml version="1.0" encoding="utf-8"?>
+<p:sldLayout xmlns:a="http://schemas.openxmlformats.org/drawingml/2006/main" xmlns:r="http://schemas.openxmlformats.org/officeDocument/2006/relationships" xmlns:p="http://schemas.openxmlformats.org/presentationml/2006/main" type="obj" preserve="1">
+  <p:cSld name="Title and Content">
+    <p:spTree>
+      <p:nvGrpSpPr>
+        <p:cNvPr id="1" name=""/>
+        <p:cNvGrpSpPr/>
+        <p:nvPr/>
+      </p:nvGrpSpPr>
+      <p:grpSpPr>
+        <a:xfrm>
+          <a:off x="0" y="0"/>
+          <a:ext cx="0" cy="0"/>
+          <a:chOff x="0" y="0"/>
+          <a:chExt cx="0" cy="0"/>
+        </a:xfrm>
+      </p:grpSpPr>
+      <p:sp>
+        <p:nvSpPr>
+          <p:cNvPr id="2" name="Title 1">
+            <a:extLst>
+              <a:ext uri="{FF2B5EF4-FFF2-40B4-BE49-F238E27FC236}">
+                <a16:creationId xmlns:a16="http://schemas.microsoft.com/office/drawing/2014/main" id="{AA097075-A5C3-4C36-B3BC-0832802A0A7B}"/>
+              </a:ext>
+            </a:extLst>
+          </p:cNvPr>
+          <p:cNvSpPr>
+            <a:spLocks noGrp="1"/>
+          </p:cNvSpPr>
+          <p:nvPr>
+            <p:ph type="title"/>
+          </p:nvPr>
+        </p:nvSpPr>
+        <p:spPr/>
+        <p:txBody>
+          <a:bodyPr/>
+          <a:lstStyle/>
+          <a:p>
+            <a:r>
+              <a:rPr lang="en-US"/>
+              <a:t>Click to edit Master title style</a:t>
+            </a:r>
+            <a:endParaRPr lang="ru-RU"/>
+          </a:p>
+        </p:txBody>
+      </p:sp>
+      <p:sp>
+        <p:nvSpPr>
+          <p:cNvPr id="3" name="Content Placeholder 2">
+            <a:extLst>
+              <a:ext uri="{FF2B5EF4-FFF2-40B4-BE49-F238E27FC236}">
+                <a16:creationId xmlns:a16="http://schemas.microsoft.com/office/drawing/2014/main" id="{F36578B8-B788-4DCB-9BA3-C7634D4CBDA1}"/>
+              </a:ext>
+            </a:extLst>
+          </p:cNvPr>
+          <p:cNvSpPr>
+            <a:spLocks noGrp="1"/>
+          </p:cNvSpPr>
+          <p:nvPr>
+            <p:ph idx="1"/>
+          </p:nvPr>
+        </p:nvSpPr>
+        <p:spPr/>
+        <p:txBody>
+          <a:bodyPr/>
+          <a:lstStyle/>
+          <a:p>
+            <a:pPr lvl="0"/>
+            <a:r>
+              <a:rPr lang="en-US"/>
+              <a:t>Click to edit Master text styles</a:t>
+            </a:r>
+          </a:p>
+          <a:p>
+            <a:pPr lvl="1"/>
+            <a:r>
+              <a:rPr lang="en-US"/>
+              <a:t>Second level</a:t>
+            </a:r>
+          </a:p>
+          <a:p>
+            <a:pPr lvl="2"/>
+            <a:r>
+              <a:rPr lang="en-US"/>
+              <a:t>Third level</a:t>
+            </a:r>
+          </a:p>
+          <a:p>
+            <a:pPr lvl="3"/>
+            <a:r>
+              <a:rPr lang="en-US"/>
+              <a:t>Fourth level</a:t>
+            </a:r>
+          </a:p>
+          <a:p>
+            <a:pPr lvl="4"/>
+            <a:r>
+              <a:rPr lang="en-US"/>
+              <a:t>Fifth level</a:t>
+            </a:r>
+            <a:endParaRPr lang="ru-RU"/>
+          </a:p>
+        </p:txBody>
+      </p:sp>
+      <p:sp>
+        <p:nvSpPr>
+          <p:cNvPr id="4" name="Date Placeholder 3">
+            <a:extLst>
+              <a:ext uri="{FF2B5EF4-FFF2-40B4-BE49-F238E27FC236}">
+                <a16:creationId xmlns:a16="http://schemas.microsoft.com/office/drawing/2014/main" id="{A4F7FF1E-688B-485D-A515-211F5E276BAC}"/>
+              </a:ext>
+            </a:extLst>
+          </p:cNvPr>
+          <p:cNvSpPr>
+            <a:spLocks noGrp="1"/>
+          </p:cNvSpPr>
+          <p:nvPr>
+            <p:ph type="dt" sz="half" idx="10"/>
+          </p:nvPr>
+        </p:nvSpPr>
+        <p:spPr/>
+        <p:txBody>
+          <a:bodyPr/>
+          <a:lstStyle/>
+          <a:p>
+            <a:fld id="{CCE9C9EE-394A-4997-9AB6-FF4DF45241DD}" type="datetimeFigureOut">
+              <a:rPr lang="ru-RU" smtClean="0"/>
+              <a:t>16.01.2021</a:t>
+            </a:fld>
+            <a:endParaRPr lang="ru-RU"/>
+          </a:p>
+        </p:txBody>
+      </p:sp>
+      <p:sp>
+        <p:nvSpPr>
+          <p:cNvPr id="5" name="Footer Placeholder 4">
+            <a:extLst>
+              <a:ext uri="{FF2B5EF4-FFF2-40B4-BE49-F238E27FC236}">
+                <a16:creationId xmlns:a16="http://schemas.microsoft.com/office/drawing/2014/main" id="{937593EC-FD23-442E-8531-49B401BF434E}"/>
+              </a:ext>
+            </a:extLst>
+          </p:cNvPr>
+          <p:cNvSpPr>
+            <a:spLocks noGrp="1"/>
+          </p:cNvSpPr>
+          <p:nvPr>
+            <p:ph type="ftr" sz="quarter" idx="11"/>
+          </p:nvPr>
+        </p:nvSpPr>
+        <p:spPr/>
+        <p:txBody>
+          <a:bodyPr/>
+          <a:lstStyle/>
+          <a:p>
+            <a:endParaRPr lang="ru-RU"/>
+          </a:p>
+        </p:txBody>
+      </p:sp>
+      <p:sp>
+        <p:nvSpPr>
+          <p:cNvPr id="6" name="Slide Number Placeholder 5">
+            <a:extLst>
+              <a:ext uri="{FF2B5EF4-FFF2-40B4-BE49-F238E27FC236}">
+                <a16:creationId xmlns:a16="http://schemas.microsoft.com/office/drawing/2014/main" id="{6FFEAB9B-59E4-40C6-B197-32B5C6294782}"/>
+              </a:ext>
+            </a:extLst>
+          </p:cNvPr>
+          <p:cNvSpPr>
+            <a:spLocks noGrp="1"/>
+          </p:cNvSpPr>
+          <p:nvPr>
+            <p:ph type="sldNum" sz="quarter" idx="12"/>
+          </p:nvPr>
+        </p:nvSpPr>
+        <p:spPr/>
+        <p:txBody>
+          <a:bodyPr/>
+          <a:lstStyle/>
+          <a:p>
+            <a:fld id="{163AA9C3-46E6-45F3-8D85-E86FB74784B0}" type="slidenum">
+              <a:rPr lang="ru-RU" smtClean="0"/>
+              <a:t>‹#›</a:t>
+            </a:fld>
+            <a:endParaRPr lang="ru-RU"/>
+          </a:p>
+        </p:txBody>
+      </p:sp>
+    </p:spTree>
+    <p:extLst>
+      <p:ext uri="{BB962C8B-B14F-4D97-AF65-F5344CB8AC3E}">
+        <p14:creationId xmlns:p14="http://schemas.microsoft.com/office/powerpoint/2010/main" val="873709580"/>
+      </p:ext>
+    </p:extLst>
+  </p:cSld>
+  <p:clrMapOvr>
+    <a:masterClrMapping/>
+  </p:clrMapOvr>
+</p:sldLayout>
+</file>
+
+<file path=ppt/slideLayouts/slideLayout14.xml><?xml version="1.0" encoding="utf-8"?>
+<p:sldLayout xmlns:a="http://schemas.openxmlformats.org/drawingml/2006/main" xmlns:r="http://schemas.openxmlformats.org/officeDocument/2006/relationships" xmlns:p="http://schemas.openxmlformats.org/presentationml/2006/main" type="secHead" preserve="1">
+  <p:cSld name="Section Header">
+    <p:spTree>
+      <p:nvGrpSpPr>
+        <p:cNvPr id="1" name=""/>
+        <p:cNvGrpSpPr/>
+        <p:nvPr/>
+      </p:nvGrpSpPr>
+      <p:grpSpPr>
+        <a:xfrm>
+          <a:off x="0" y="0"/>
+          <a:ext cx="0" cy="0"/>
+          <a:chOff x="0" y="0"/>
+          <a:chExt cx="0" cy="0"/>
+        </a:xfrm>
+      </p:grpSpPr>
+      <p:sp>
+        <p:nvSpPr>
+          <p:cNvPr id="2" name="Title 1">
+            <a:extLst>
+              <a:ext uri="{FF2B5EF4-FFF2-40B4-BE49-F238E27FC236}">
+                <a16:creationId xmlns:a16="http://schemas.microsoft.com/office/drawing/2014/main" id="{A725B5D6-315B-4685-A0C3-7E37C3B3377B}"/>
+              </a:ext>
+            </a:extLst>
+          </p:cNvPr>
+          <p:cNvSpPr>
+            <a:spLocks noGrp="1"/>
+          </p:cNvSpPr>
+          <p:nvPr>
+            <p:ph type="title"/>
+          </p:nvPr>
+        </p:nvSpPr>
+        <p:spPr>
+          <a:xfrm>
+            <a:off x="831850" y="1709738"/>
+            <a:ext cx="10515600" cy="2852737"/>
+          </a:xfrm>
+        </p:spPr>
+        <p:txBody>
+          <a:bodyPr anchor="b"/>
+          <a:lstStyle>
+            <a:lvl1pPr>
+              <a:defRPr sz="6000"/>
+            </a:lvl1pPr>
+          </a:lstStyle>
+          <a:p>
+            <a:r>
+              <a:rPr lang="en-US"/>
+              <a:t>Click to edit Master title style</a:t>
+            </a:r>
+            <a:endParaRPr lang="ru-RU"/>
+          </a:p>
+        </p:txBody>
+      </p:sp>
+      <p:sp>
+        <p:nvSpPr>
+          <p:cNvPr id="3" name="Text Placeholder 2">
+            <a:extLst>
+              <a:ext uri="{FF2B5EF4-FFF2-40B4-BE49-F238E27FC236}">
+                <a16:creationId xmlns:a16="http://schemas.microsoft.com/office/drawing/2014/main" id="{0BC8CCA9-4616-47FD-84BC-ADE234C119C5}"/>
+              </a:ext>
+            </a:extLst>
+          </p:cNvPr>
+          <p:cNvSpPr>
+            <a:spLocks noGrp="1"/>
+          </p:cNvSpPr>
+          <p:nvPr>
+            <p:ph type="body" idx="1"/>
+          </p:nvPr>
+        </p:nvSpPr>
+        <p:spPr>
+          <a:xfrm>
+            <a:off x="831850" y="4589463"/>
+            <a:ext cx="10515600" cy="1500187"/>
+          </a:xfrm>
+        </p:spPr>
+        <p:txBody>
+          <a:bodyPr/>
+          <a:lstStyle>
+            <a:lvl1pPr marL="0" indent="0">
+              <a:buNone/>
+              <a:defRPr sz="2400">
+                <a:solidFill>
+                  <a:schemeClr val="tx1">
+                    <a:tint val="75000"/>
+                  </a:schemeClr>
+                </a:solidFill>
+              </a:defRPr>
+            </a:lvl1pPr>
+            <a:lvl2pPr marL="457200" indent="0">
+              <a:buNone/>
+              <a:defRPr sz="2000">
+                <a:solidFill>
+                  <a:schemeClr val="tx1">
+                    <a:tint val="75000"/>
+                  </a:schemeClr>
+                </a:solidFill>
+              </a:defRPr>
+            </a:lvl2pPr>
+            <a:lvl3pPr marL="914400" indent="0">
+              <a:buNone/>
+              <a:defRPr sz="1800">
+                <a:solidFill>
+                  <a:schemeClr val="tx1">
+                    <a:tint val="75000"/>
+                  </a:schemeClr>
+                </a:solidFill>
+              </a:defRPr>
+            </a:lvl3pPr>
+            <a:lvl4pPr marL="1371600" indent="0">
+              <a:buNone/>
+              <a:defRPr sz="1600">
+                <a:solidFill>
+                  <a:schemeClr val="tx1">
+                    <a:tint val="75000"/>
+                  </a:schemeClr>
+                </a:solidFill>
+              </a:defRPr>
+            </a:lvl4pPr>
+            <a:lvl5pPr marL="1828800" indent="0">
+              <a:buNone/>
+              <a:defRPr sz="1600">
+                <a:solidFill>
+                  <a:schemeClr val="tx1">
+                    <a:tint val="75000"/>
+                  </a:schemeClr>
+                </a:solidFill>
+              </a:defRPr>
+            </a:lvl5pPr>
+            <a:lvl6pPr marL="2286000" indent="0">
+              <a:buNone/>
+              <a:defRPr sz="1600">
+                <a:solidFill>
+                  <a:schemeClr val="tx1">
+                    <a:tint val="75000"/>
+                  </a:schemeClr>
+                </a:solidFill>
+              </a:defRPr>
+            </a:lvl6pPr>
+            <a:lvl7pPr marL="2743200" indent="0">
+              <a:buNone/>
+              <a:defRPr sz="1600">
+                <a:solidFill>
+                  <a:schemeClr val="tx1">
+                    <a:tint val="75000"/>
+                  </a:schemeClr>
+                </a:solidFill>
+              </a:defRPr>
+            </a:lvl7pPr>
+            <a:lvl8pPr marL="3200400" indent="0">
+              <a:buNone/>
+              <a:defRPr sz="1600">
+                <a:solidFill>
+                  <a:schemeClr val="tx1">
+                    <a:tint val="75000"/>
+                  </a:schemeClr>
+                </a:solidFill>
+              </a:defRPr>
+            </a:lvl8pPr>
+            <a:lvl9pPr marL="3657600" indent="0">
+              <a:buNone/>
+              <a:defRPr sz="1600">
+                <a:solidFill>
+                  <a:schemeClr val="tx1">
+                    <a:tint val="75000"/>
+                  </a:schemeClr>
+                </a:solidFill>
+              </a:defRPr>
+            </a:lvl9pPr>
+          </a:lstStyle>
+          <a:p>
+            <a:pPr lvl="0"/>
+            <a:r>
+              <a:rPr lang="en-US"/>
+              <a:t>Click to edit Master text styles</a:t>
+            </a:r>
+          </a:p>
+        </p:txBody>
+      </p:sp>
+      <p:sp>
+        <p:nvSpPr>
+          <p:cNvPr id="4" name="Date Placeholder 3">
+            <a:extLst>
+              <a:ext uri="{FF2B5EF4-FFF2-40B4-BE49-F238E27FC236}">
+                <a16:creationId xmlns:a16="http://schemas.microsoft.com/office/drawing/2014/main" id="{C7694868-A2F6-4159-9DB2-C643C67F88C3}"/>
+              </a:ext>
+            </a:extLst>
+          </p:cNvPr>
+          <p:cNvSpPr>
+            <a:spLocks noGrp="1"/>
+          </p:cNvSpPr>
+          <p:nvPr>
+            <p:ph type="dt" sz="half" idx="10"/>
+          </p:nvPr>
+        </p:nvSpPr>
+        <p:spPr/>
+        <p:txBody>
+          <a:bodyPr/>
+          <a:lstStyle/>
+          <a:p>
+            <a:fld id="{CCE9C9EE-394A-4997-9AB6-FF4DF45241DD}" type="datetimeFigureOut">
+              <a:rPr lang="ru-RU" smtClean="0"/>
+              <a:t>16.01.2021</a:t>
+            </a:fld>
+            <a:endParaRPr lang="ru-RU"/>
+          </a:p>
+        </p:txBody>
+      </p:sp>
+      <p:sp>
+        <p:nvSpPr>
+          <p:cNvPr id="5" name="Footer Placeholder 4">
+            <a:extLst>
+              <a:ext uri="{FF2B5EF4-FFF2-40B4-BE49-F238E27FC236}">
+                <a16:creationId xmlns:a16="http://schemas.microsoft.com/office/drawing/2014/main" id="{66205A39-F16B-46DB-8333-A0C3ED2DF876}"/>
+              </a:ext>
+            </a:extLst>
+          </p:cNvPr>
+          <p:cNvSpPr>
+            <a:spLocks noGrp="1"/>
+          </p:cNvSpPr>
+          <p:nvPr>
+            <p:ph type="ftr" sz="quarter" idx="11"/>
+          </p:nvPr>
+        </p:nvSpPr>
+        <p:spPr/>
+        <p:txBody>
+          <a:bodyPr/>
+          <a:lstStyle/>
+          <a:p>
+            <a:endParaRPr lang="ru-RU"/>
+          </a:p>
+        </p:txBody>
+      </p:sp>
+      <p:sp>
+        <p:nvSpPr>
+          <p:cNvPr id="6" name="Slide Number Placeholder 5">
+            <a:extLst>
+              <a:ext uri="{FF2B5EF4-FFF2-40B4-BE49-F238E27FC236}">
+                <a16:creationId xmlns:a16="http://schemas.microsoft.com/office/drawing/2014/main" id="{57B59FCB-7F13-4F2E-A64A-93EDD1EDB633}"/>
+              </a:ext>
+            </a:extLst>
+          </p:cNvPr>
+          <p:cNvSpPr>
+            <a:spLocks noGrp="1"/>
+          </p:cNvSpPr>
+          <p:nvPr>
+            <p:ph type="sldNum" sz="quarter" idx="12"/>
+          </p:nvPr>
+        </p:nvSpPr>
+        <p:spPr/>
+        <p:txBody>
+          <a:bodyPr/>
+          <a:lstStyle/>
+          <a:p>
+            <a:fld id="{163AA9C3-46E6-45F3-8D85-E86FB74784B0}" type="slidenum">
+              <a:rPr lang="ru-RU" smtClean="0"/>
+              <a:t>‹#›</a:t>
+            </a:fld>
+            <a:endParaRPr lang="ru-RU"/>
+          </a:p>
+        </p:txBody>
+      </p:sp>
+    </p:spTree>
+    <p:extLst>
+      <p:ext uri="{BB962C8B-B14F-4D97-AF65-F5344CB8AC3E}">
+        <p14:creationId xmlns:p14="http://schemas.microsoft.com/office/powerpoint/2010/main" val="3948370147"/>
+      </p:ext>
+    </p:extLst>
+  </p:cSld>
+  <p:clrMapOvr>
+    <a:masterClrMapping/>
+  </p:clrMapOvr>
+</p:sldLayout>
+</file>
+
+<file path=ppt/slideLayouts/slideLayout15.xml><?xml version="1.0" encoding="utf-8"?>
+<p:sldLayout xmlns:a="http://schemas.openxmlformats.org/drawingml/2006/main" xmlns:r="http://schemas.openxmlformats.org/officeDocument/2006/relationships" xmlns:p="http://schemas.openxmlformats.org/presentationml/2006/main" type="twoObj" preserve="1">
+  <p:cSld name="Two Content">
+    <p:spTree>
+      <p:nvGrpSpPr>
+        <p:cNvPr id="1" name=""/>
+        <p:cNvGrpSpPr/>
+        <p:nvPr/>
+      </p:nvGrpSpPr>
+      <p:grpSpPr>
+        <a:xfrm>
+          <a:off x="0" y="0"/>
+          <a:ext cx="0" cy="0"/>
+          <a:chOff x="0" y="0"/>
+          <a:chExt cx="0" cy="0"/>
+        </a:xfrm>
+      </p:grpSpPr>
+      <p:sp>
+        <p:nvSpPr>
+          <p:cNvPr id="2" name="Title 1">
+            <a:extLst>
+              <a:ext uri="{FF2B5EF4-FFF2-40B4-BE49-F238E27FC236}">
+                <a16:creationId xmlns:a16="http://schemas.microsoft.com/office/drawing/2014/main" id="{0D05038E-49A5-4D26-B189-DC6294F854C7}"/>
+              </a:ext>
+            </a:extLst>
+          </p:cNvPr>
+          <p:cNvSpPr>
+            <a:spLocks noGrp="1"/>
+          </p:cNvSpPr>
+          <p:nvPr>
+            <p:ph type="title"/>
+          </p:nvPr>
+        </p:nvSpPr>
+        <p:spPr/>
+        <p:txBody>
+          <a:bodyPr/>
+          <a:lstStyle/>
+          <a:p>
+            <a:r>
+              <a:rPr lang="en-US"/>
+              <a:t>Click to edit Master title style</a:t>
+            </a:r>
+            <a:endParaRPr lang="ru-RU"/>
+          </a:p>
+        </p:txBody>
+      </p:sp>
+      <p:sp>
+        <p:nvSpPr>
+          <p:cNvPr id="3" name="Content Placeholder 2">
+            <a:extLst>
+              <a:ext uri="{FF2B5EF4-FFF2-40B4-BE49-F238E27FC236}">
+                <a16:creationId xmlns:a16="http://schemas.microsoft.com/office/drawing/2014/main" id="{87A0D5EE-0FF1-4954-A0E4-BC4D241070D7}"/>
+              </a:ext>
+            </a:extLst>
+          </p:cNvPr>
+          <p:cNvSpPr>
+            <a:spLocks noGrp="1"/>
+          </p:cNvSpPr>
+          <p:nvPr>
+            <p:ph sz="half" idx="1"/>
+          </p:nvPr>
+        </p:nvSpPr>
+        <p:spPr>
+          <a:xfrm>
+            <a:off x="838200" y="1825625"/>
+            <a:ext cx="5181600" cy="4351338"/>
+          </a:xfrm>
+        </p:spPr>
+        <p:txBody>
+          <a:bodyPr/>
+          <a:lstStyle/>
+          <a:p>
+            <a:pPr lvl="0"/>
+            <a:r>
+              <a:rPr lang="en-US"/>
+              <a:t>Click to edit Master text styles</a:t>
+            </a:r>
+          </a:p>
+          <a:p>
+            <a:pPr lvl="1"/>
+            <a:r>
+              <a:rPr lang="en-US"/>
+              <a:t>Second level</a:t>
+            </a:r>
+          </a:p>
+          <a:p>
+            <a:pPr lvl="2"/>
+            <a:r>
+              <a:rPr lang="en-US"/>
+              <a:t>Third level</a:t>
+            </a:r>
+          </a:p>
+          <a:p>
+            <a:pPr lvl="3"/>
+            <a:r>
+              <a:rPr lang="en-US"/>
+              <a:t>Fourth level</a:t>
+            </a:r>
+          </a:p>
+          <a:p>
+            <a:pPr lvl="4"/>
+            <a:r>
+              <a:rPr lang="en-US"/>
+              <a:t>Fifth level</a:t>
+            </a:r>
+            <a:endParaRPr lang="ru-RU"/>
+          </a:p>
+        </p:txBody>
+      </p:sp>
+      <p:sp>
+        <p:nvSpPr>
+          <p:cNvPr id="4" name="Content Placeholder 3">
+            <a:extLst>
+              <a:ext uri="{FF2B5EF4-FFF2-40B4-BE49-F238E27FC236}">
+                <a16:creationId xmlns:a16="http://schemas.microsoft.com/office/drawing/2014/main" id="{19795135-AB63-442D-9D97-FEB05C210CF2}"/>
+              </a:ext>
+            </a:extLst>
+          </p:cNvPr>
+          <p:cNvSpPr>
+            <a:spLocks noGrp="1"/>
+          </p:cNvSpPr>
+          <p:nvPr>
+            <p:ph sz="half" idx="2"/>
+          </p:nvPr>
+        </p:nvSpPr>
+        <p:spPr>
+          <a:xfrm>
+            <a:off x="6172200" y="1825625"/>
+            <a:ext cx="5181600" cy="4351338"/>
+          </a:xfrm>
+        </p:spPr>
+        <p:txBody>
+          <a:bodyPr/>
+          <a:lstStyle/>
+          <a:p>
+            <a:pPr lvl="0"/>
+            <a:r>
+              <a:rPr lang="en-US"/>
+              <a:t>Click to edit Master text styles</a:t>
+            </a:r>
+          </a:p>
+          <a:p>
+            <a:pPr lvl="1"/>
+            <a:r>
+              <a:rPr lang="en-US"/>
+              <a:t>Second level</a:t>
+            </a:r>
+          </a:p>
+          <a:p>
+            <a:pPr lvl="2"/>
+            <a:r>
+              <a:rPr lang="en-US"/>
+              <a:t>Third level</a:t>
+            </a:r>
+          </a:p>
+          <a:p>
+            <a:pPr lvl="3"/>
+            <a:r>
+              <a:rPr lang="en-US"/>
+              <a:t>Fourth level</a:t>
+            </a:r>
+          </a:p>
+          <a:p>
+            <a:pPr lvl="4"/>
+            <a:r>
+              <a:rPr lang="en-US"/>
+              <a:t>Fifth level</a:t>
+            </a:r>
+            <a:endParaRPr lang="ru-RU"/>
+          </a:p>
+        </p:txBody>
+      </p:sp>
+      <p:sp>
+        <p:nvSpPr>
+          <p:cNvPr id="5" name="Date Placeholder 4">
+            <a:extLst>
+              <a:ext uri="{FF2B5EF4-FFF2-40B4-BE49-F238E27FC236}">
+                <a16:creationId xmlns:a16="http://schemas.microsoft.com/office/drawing/2014/main" id="{FD21C545-190D-4C03-AD03-A72A2041D2E6}"/>
+              </a:ext>
+            </a:extLst>
+          </p:cNvPr>
+          <p:cNvSpPr>
+            <a:spLocks noGrp="1"/>
+          </p:cNvSpPr>
+          <p:nvPr>
+            <p:ph type="dt" sz="half" idx="10"/>
+          </p:nvPr>
+        </p:nvSpPr>
+        <p:spPr/>
+        <p:txBody>
+          <a:bodyPr/>
+          <a:lstStyle/>
+          <a:p>
+            <a:fld id="{CCE9C9EE-394A-4997-9AB6-FF4DF45241DD}" type="datetimeFigureOut">
+              <a:rPr lang="ru-RU" smtClean="0"/>
+              <a:t>16.01.2021</a:t>
+            </a:fld>
+            <a:endParaRPr lang="ru-RU"/>
+          </a:p>
+        </p:txBody>
+      </p:sp>
+      <p:sp>
+        <p:nvSpPr>
+          <p:cNvPr id="6" name="Footer Placeholder 5">
+            <a:extLst>
+              <a:ext uri="{FF2B5EF4-FFF2-40B4-BE49-F238E27FC236}">
+                <a16:creationId xmlns:a16="http://schemas.microsoft.com/office/drawing/2014/main" id="{381480D0-7D90-4922-B332-690B40D1524A}"/>
+              </a:ext>
+            </a:extLst>
+          </p:cNvPr>
+          <p:cNvSpPr>
+            <a:spLocks noGrp="1"/>
+          </p:cNvSpPr>
+          <p:nvPr>
+            <p:ph type="ftr" sz="quarter" idx="11"/>
+          </p:nvPr>
+        </p:nvSpPr>
+        <p:spPr/>
+        <p:txBody>
+          <a:bodyPr/>
+          <a:lstStyle/>
+          <a:p>
+            <a:endParaRPr lang="ru-RU"/>
+          </a:p>
+        </p:txBody>
+      </p:sp>
+      <p:sp>
+        <p:nvSpPr>
+          <p:cNvPr id="7" name="Slide Number Placeholder 6">
+            <a:extLst>
+              <a:ext uri="{FF2B5EF4-FFF2-40B4-BE49-F238E27FC236}">
+                <a16:creationId xmlns:a16="http://schemas.microsoft.com/office/drawing/2014/main" id="{F0B39328-1B0D-41A4-9478-86E4F375C25C}"/>
+              </a:ext>
+            </a:extLst>
+          </p:cNvPr>
+          <p:cNvSpPr>
+            <a:spLocks noGrp="1"/>
+          </p:cNvSpPr>
+          <p:nvPr>
+            <p:ph type="sldNum" sz="quarter" idx="12"/>
+          </p:nvPr>
+        </p:nvSpPr>
+        <p:spPr/>
+        <p:txBody>
+          <a:bodyPr/>
+          <a:lstStyle/>
+          <a:p>
+            <a:fld id="{163AA9C3-46E6-45F3-8D85-E86FB74784B0}" type="slidenum">
+              <a:rPr lang="ru-RU" smtClean="0"/>
+              <a:t>‹#›</a:t>
+            </a:fld>
+            <a:endParaRPr lang="ru-RU"/>
+          </a:p>
+        </p:txBody>
+      </p:sp>
+    </p:spTree>
+    <p:extLst>
+      <p:ext uri="{BB962C8B-B14F-4D97-AF65-F5344CB8AC3E}">
+        <p14:creationId xmlns:p14="http://schemas.microsoft.com/office/powerpoint/2010/main" val="850710192"/>
+      </p:ext>
+    </p:extLst>
+  </p:cSld>
+  <p:clrMapOvr>
+    <a:masterClrMapping/>
+  </p:clrMapOvr>
+</p:sldLayout>
+</file>
+
+<file path=ppt/slideLayouts/slideLayout16.xml><?xml version="1.0" encoding="utf-8"?>
+<p:sldLayout xmlns:a="http://schemas.openxmlformats.org/drawingml/2006/main" xmlns:r="http://schemas.openxmlformats.org/officeDocument/2006/relationships" xmlns:p="http://schemas.openxmlformats.org/presentationml/2006/main" type="twoTxTwoObj" preserve="1">
+  <p:cSld name="Comparison">
+    <p:spTree>
+      <p:nvGrpSpPr>
+        <p:cNvPr id="1" name=""/>
+        <p:cNvGrpSpPr/>
+        <p:nvPr/>
+      </p:nvGrpSpPr>
+      <p:grpSpPr>
+        <a:xfrm>
+          <a:off x="0" y="0"/>
+          <a:ext cx="0" cy="0"/>
+          <a:chOff x="0" y="0"/>
+          <a:chExt cx="0" cy="0"/>
+        </a:xfrm>
+      </p:grpSpPr>
+      <p:sp>
+        <p:nvSpPr>
+          <p:cNvPr id="2" name="Title 1">
+            <a:extLst>
+              <a:ext uri="{FF2B5EF4-FFF2-40B4-BE49-F238E27FC236}">
+                <a16:creationId xmlns:a16="http://schemas.microsoft.com/office/drawing/2014/main" id="{85921FF9-E642-4DE5-8E94-4247F3B65A5B}"/>
+              </a:ext>
+            </a:extLst>
+          </p:cNvPr>
+          <p:cNvSpPr>
+            <a:spLocks noGrp="1"/>
+          </p:cNvSpPr>
+          <p:nvPr>
+            <p:ph type="title"/>
+          </p:nvPr>
+        </p:nvSpPr>
+        <p:spPr>
+          <a:xfrm>
+            <a:off x="839788" y="365125"/>
+            <a:ext cx="10515600" cy="1325563"/>
+          </a:xfrm>
+        </p:spPr>
+        <p:txBody>
+          <a:bodyPr/>
+          <a:lstStyle/>
+          <a:p>
+            <a:r>
+              <a:rPr lang="en-US"/>
+              <a:t>Click to edit Master title style</a:t>
+            </a:r>
+            <a:endParaRPr lang="ru-RU"/>
+          </a:p>
+        </p:txBody>
+      </p:sp>
+      <p:sp>
+        <p:nvSpPr>
+          <p:cNvPr id="3" name="Text Placeholder 2">
+            <a:extLst>
+              <a:ext uri="{FF2B5EF4-FFF2-40B4-BE49-F238E27FC236}">
+                <a16:creationId xmlns:a16="http://schemas.microsoft.com/office/drawing/2014/main" id="{4D3B4CA4-03E2-485A-A148-AA73E96FAC61}"/>
+              </a:ext>
+            </a:extLst>
+          </p:cNvPr>
+          <p:cNvSpPr>
+            <a:spLocks noGrp="1"/>
+          </p:cNvSpPr>
+          <p:nvPr>
+            <p:ph type="body" idx="1"/>
+          </p:nvPr>
+        </p:nvSpPr>
+        <p:spPr>
+          <a:xfrm>
+            <a:off x="839788" y="1681163"/>
+            <a:ext cx="5157787" cy="823912"/>
+          </a:xfrm>
+        </p:spPr>
+        <p:txBody>
+          <a:bodyPr anchor="b"/>
+          <a:lstStyle>
+            <a:lvl1pPr marL="0" indent="0">
+              <a:buNone/>
+              <a:defRPr sz="2400" b="1"/>
+            </a:lvl1pPr>
+            <a:lvl2pPr marL="457200" indent="0">
+              <a:buNone/>
+              <a:defRPr sz="2000" b="1"/>
+            </a:lvl2pPr>
+            <a:lvl3pPr marL="914400" indent="0">
+              <a:buNone/>
+              <a:defRPr sz="1800" b="1"/>
+            </a:lvl3pPr>
+            <a:lvl4pPr marL="1371600" indent="0">
+              <a:buNone/>
+              <a:defRPr sz="1600" b="1"/>
+            </a:lvl4pPr>
+            <a:lvl5pPr marL="1828800" indent="0">
+              <a:buNone/>
+              <a:defRPr sz="1600" b="1"/>
+            </a:lvl5pPr>
+            <a:lvl6pPr marL="2286000" indent="0">
+              <a:buNone/>
+              <a:defRPr sz="1600" b="1"/>
+            </a:lvl6pPr>
+            <a:lvl7pPr marL="2743200" indent="0">
+              <a:buNone/>
+              <a:defRPr sz="1600" b="1"/>
+            </a:lvl7pPr>
+            <a:lvl8pPr marL="3200400" indent="0">
+              <a:buNone/>
+              <a:defRPr sz="1600" b="1"/>
+            </a:lvl8pPr>
+            <a:lvl9pPr marL="3657600" indent="0">
+              <a:buNone/>
+              <a:defRPr sz="1600" b="1"/>
+            </a:lvl9pPr>
+          </a:lstStyle>
+          <a:p>
+            <a:pPr lvl="0"/>
+            <a:r>
+              <a:rPr lang="en-US"/>
+              <a:t>Click to edit Master text styles</a:t>
+            </a:r>
+          </a:p>
+        </p:txBody>
+      </p:sp>
+      <p:sp>
+        <p:nvSpPr>
+          <p:cNvPr id="4" name="Content Placeholder 3">
+            <a:extLst>
+              <a:ext uri="{FF2B5EF4-FFF2-40B4-BE49-F238E27FC236}">
+                <a16:creationId xmlns:a16="http://schemas.microsoft.com/office/drawing/2014/main" id="{135CA531-45FA-43F7-B6BC-34144819136E}"/>
+              </a:ext>
+            </a:extLst>
+          </p:cNvPr>
+          <p:cNvSpPr>
+            <a:spLocks noGrp="1"/>
+          </p:cNvSpPr>
+          <p:nvPr>
+            <p:ph sz="half" idx="2"/>
+          </p:nvPr>
+        </p:nvSpPr>
+        <p:spPr>
+          <a:xfrm>
+            <a:off x="839788" y="2505075"/>
+            <a:ext cx="5157787" cy="3684588"/>
+          </a:xfrm>
+        </p:spPr>
+        <p:txBody>
+          <a:bodyPr/>
+          <a:lstStyle/>
+          <a:p>
+            <a:pPr lvl="0"/>
+            <a:r>
+              <a:rPr lang="en-US"/>
+              <a:t>Click to edit Master text styles</a:t>
+            </a:r>
+          </a:p>
+          <a:p>
+            <a:pPr lvl="1"/>
+            <a:r>
+              <a:rPr lang="en-US"/>
+              <a:t>Second level</a:t>
+            </a:r>
+          </a:p>
+          <a:p>
+            <a:pPr lvl="2"/>
+            <a:r>
+              <a:rPr lang="en-US"/>
+              <a:t>Third level</a:t>
+            </a:r>
+          </a:p>
+          <a:p>
+            <a:pPr lvl="3"/>
+            <a:r>
+              <a:rPr lang="en-US"/>
+              <a:t>Fourth level</a:t>
+            </a:r>
+          </a:p>
+          <a:p>
+            <a:pPr lvl="4"/>
+            <a:r>
+              <a:rPr lang="en-US"/>
+              <a:t>Fifth level</a:t>
+            </a:r>
+            <a:endParaRPr lang="ru-RU"/>
+          </a:p>
+        </p:txBody>
+      </p:sp>
+      <p:sp>
+        <p:nvSpPr>
+          <p:cNvPr id="5" name="Text Placeholder 4">
+            <a:extLst>
+              <a:ext uri="{FF2B5EF4-FFF2-40B4-BE49-F238E27FC236}">
+                <a16:creationId xmlns:a16="http://schemas.microsoft.com/office/drawing/2014/main" id="{63A5F208-50D3-4409-839D-3E0BB5D1C811}"/>
+              </a:ext>
+            </a:extLst>
+          </p:cNvPr>
+          <p:cNvSpPr>
+            <a:spLocks noGrp="1"/>
+          </p:cNvSpPr>
+          <p:nvPr>
+            <p:ph type="body" sz="quarter" idx="3"/>
+          </p:nvPr>
+        </p:nvSpPr>
+        <p:spPr>
+          <a:xfrm>
+            <a:off x="6172200" y="1681163"/>
+            <a:ext cx="5183188" cy="823912"/>
+          </a:xfrm>
+        </p:spPr>
+        <p:txBody>
+          <a:bodyPr anchor="b"/>
+          <a:lstStyle>
+            <a:lvl1pPr marL="0" indent="0">
+              <a:buNone/>
+              <a:defRPr sz="2400" b="1"/>
+            </a:lvl1pPr>
+            <a:lvl2pPr marL="457200" indent="0">
+              <a:buNone/>
+              <a:defRPr sz="2000" b="1"/>
+            </a:lvl2pPr>
+            <a:lvl3pPr marL="914400" indent="0">
+              <a:buNone/>
+              <a:defRPr sz="1800" b="1"/>
+            </a:lvl3pPr>
+            <a:lvl4pPr marL="1371600" indent="0">
+              <a:buNone/>
+              <a:defRPr sz="1600" b="1"/>
+            </a:lvl4pPr>
+            <a:lvl5pPr marL="1828800" indent="0">
+              <a:buNone/>
+              <a:defRPr sz="1600" b="1"/>
+            </a:lvl5pPr>
+            <a:lvl6pPr marL="2286000" indent="0">
+              <a:buNone/>
+              <a:defRPr sz="1600" b="1"/>
+            </a:lvl6pPr>
+            <a:lvl7pPr marL="2743200" indent="0">
+              <a:buNone/>
+              <a:defRPr sz="1600" b="1"/>
+            </a:lvl7pPr>
+            <a:lvl8pPr marL="3200400" indent="0">
+              <a:buNone/>
+              <a:defRPr sz="1600" b="1"/>
+            </a:lvl8pPr>
+            <a:lvl9pPr marL="3657600" indent="0">
+              <a:buNone/>
+              <a:defRPr sz="1600" b="1"/>
+            </a:lvl9pPr>
+          </a:lstStyle>
+          <a:p>
+            <a:pPr lvl="0"/>
+            <a:r>
+              <a:rPr lang="en-US"/>
+              <a:t>Click to edit Master text styles</a:t>
+            </a:r>
+          </a:p>
+        </p:txBody>
+      </p:sp>
+      <p:sp>
+        <p:nvSpPr>
+          <p:cNvPr id="6" name="Content Placeholder 5">
+            <a:extLst>
+              <a:ext uri="{FF2B5EF4-FFF2-40B4-BE49-F238E27FC236}">
+                <a16:creationId xmlns:a16="http://schemas.microsoft.com/office/drawing/2014/main" id="{78268002-E787-481B-8499-387082814FE3}"/>
+              </a:ext>
+            </a:extLst>
+          </p:cNvPr>
+          <p:cNvSpPr>
+            <a:spLocks noGrp="1"/>
+          </p:cNvSpPr>
+          <p:nvPr>
+            <p:ph sz="quarter" idx="4"/>
+          </p:nvPr>
+        </p:nvSpPr>
+        <p:spPr>
+          <a:xfrm>
+            <a:off x="6172200" y="2505075"/>
+            <a:ext cx="5183188" cy="3684588"/>
+          </a:xfrm>
+        </p:spPr>
+        <p:txBody>
+          <a:bodyPr/>
+          <a:lstStyle/>
+          <a:p>
+            <a:pPr lvl="0"/>
+            <a:r>
+              <a:rPr lang="en-US"/>
+              <a:t>Click to edit Master text styles</a:t>
+            </a:r>
+          </a:p>
+          <a:p>
+            <a:pPr lvl="1"/>
+            <a:r>
+              <a:rPr lang="en-US"/>
+              <a:t>Second level</a:t>
+            </a:r>
+          </a:p>
+          <a:p>
+            <a:pPr lvl="2"/>
+            <a:r>
+              <a:rPr lang="en-US"/>
+              <a:t>Third level</a:t>
+            </a:r>
+          </a:p>
+          <a:p>
+            <a:pPr lvl="3"/>
+            <a:r>
+              <a:rPr lang="en-US"/>
+              <a:t>Fourth level</a:t>
+            </a:r>
+          </a:p>
+          <a:p>
+            <a:pPr lvl="4"/>
+            <a:r>
+              <a:rPr lang="en-US"/>
+              <a:t>Fifth level</a:t>
+            </a:r>
+            <a:endParaRPr lang="ru-RU"/>
+          </a:p>
+        </p:txBody>
+      </p:sp>
+      <p:sp>
+        <p:nvSpPr>
+          <p:cNvPr id="7" name="Date Placeholder 6">
+            <a:extLst>
+              <a:ext uri="{FF2B5EF4-FFF2-40B4-BE49-F238E27FC236}">
+                <a16:creationId xmlns:a16="http://schemas.microsoft.com/office/drawing/2014/main" id="{D5753F34-EB66-40DF-95BE-DE4190A9067F}"/>
+              </a:ext>
+            </a:extLst>
+          </p:cNvPr>
+          <p:cNvSpPr>
+            <a:spLocks noGrp="1"/>
+          </p:cNvSpPr>
+          <p:nvPr>
+            <p:ph type="dt" sz="half" idx="10"/>
+          </p:nvPr>
+        </p:nvSpPr>
+        <p:spPr/>
+        <p:txBody>
+          <a:bodyPr/>
+          <a:lstStyle/>
+          <a:p>
+            <a:fld id="{CCE9C9EE-394A-4997-9AB6-FF4DF45241DD}" type="datetimeFigureOut">
+              <a:rPr lang="ru-RU" smtClean="0"/>
+              <a:t>16.01.2021</a:t>
+            </a:fld>
+            <a:endParaRPr lang="ru-RU"/>
+          </a:p>
+        </p:txBody>
+      </p:sp>
+      <p:sp>
+        <p:nvSpPr>
+          <p:cNvPr id="8" name="Footer Placeholder 7">
+            <a:extLst>
+              <a:ext uri="{FF2B5EF4-FFF2-40B4-BE49-F238E27FC236}">
+                <a16:creationId xmlns:a16="http://schemas.microsoft.com/office/drawing/2014/main" id="{46D56356-56F1-4728-9E08-516E6B4403E9}"/>
+              </a:ext>
+            </a:extLst>
+          </p:cNvPr>
+          <p:cNvSpPr>
+            <a:spLocks noGrp="1"/>
+          </p:cNvSpPr>
+          <p:nvPr>
+            <p:ph type="ftr" sz="quarter" idx="11"/>
+          </p:nvPr>
+        </p:nvSpPr>
+        <p:spPr/>
+        <p:txBody>
+          <a:bodyPr/>
+          <a:lstStyle/>
+          <a:p>
+            <a:endParaRPr lang="ru-RU"/>
+          </a:p>
+        </p:txBody>
+      </p:sp>
+      <p:sp>
+        <p:nvSpPr>
+          <p:cNvPr id="9" name="Slide Number Placeholder 8">
+            <a:extLst>
+              <a:ext uri="{FF2B5EF4-FFF2-40B4-BE49-F238E27FC236}">
+                <a16:creationId xmlns:a16="http://schemas.microsoft.com/office/drawing/2014/main" id="{F653AD86-1874-4D7A-9FF4-706100AA98B4}"/>
+              </a:ext>
+            </a:extLst>
+          </p:cNvPr>
+          <p:cNvSpPr>
+            <a:spLocks noGrp="1"/>
+          </p:cNvSpPr>
+          <p:nvPr>
+            <p:ph type="sldNum" sz="quarter" idx="12"/>
+          </p:nvPr>
+        </p:nvSpPr>
+        <p:spPr/>
+        <p:txBody>
+          <a:bodyPr/>
+          <a:lstStyle/>
+          <a:p>
+            <a:fld id="{163AA9C3-46E6-45F3-8D85-E86FB74784B0}" type="slidenum">
+              <a:rPr lang="ru-RU" smtClean="0"/>
+              <a:t>‹#›</a:t>
+            </a:fld>
+            <a:endParaRPr lang="ru-RU"/>
+          </a:p>
+        </p:txBody>
+      </p:sp>
+    </p:spTree>
+    <p:extLst>
+      <p:ext uri="{BB962C8B-B14F-4D97-AF65-F5344CB8AC3E}">
+        <p14:creationId xmlns:p14="http://schemas.microsoft.com/office/powerpoint/2010/main" val="3600612390"/>
+      </p:ext>
+    </p:extLst>
+  </p:cSld>
+  <p:clrMapOvr>
+    <a:masterClrMapping/>
+  </p:clrMapOvr>
+</p:sldLayout>
+</file>
+
+<file path=ppt/slideLayouts/slideLayout17.xml><?xml version="1.0" encoding="utf-8"?>
+<p:sldLayout xmlns:a="http://schemas.openxmlformats.org/drawingml/2006/main" xmlns:r="http://schemas.openxmlformats.org/officeDocument/2006/relationships" xmlns:p="http://schemas.openxmlformats.org/presentationml/2006/main" type="titleOnly" preserve="1">
+  <p:cSld name="Title Only">
+    <p:spTree>
+      <p:nvGrpSpPr>
+        <p:cNvPr id="1" name=""/>
+        <p:cNvGrpSpPr/>
+        <p:nvPr/>
+      </p:nvGrpSpPr>
+      <p:grpSpPr>
+        <a:xfrm>
+          <a:off x="0" y="0"/>
+          <a:ext cx="0" cy="0"/>
+          <a:chOff x="0" y="0"/>
+          <a:chExt cx="0" cy="0"/>
+        </a:xfrm>
+      </p:grpSpPr>
+      <p:sp>
+        <p:nvSpPr>
+          <p:cNvPr id="2" name="Title 1">
+            <a:extLst>
+              <a:ext uri="{FF2B5EF4-FFF2-40B4-BE49-F238E27FC236}">
+                <a16:creationId xmlns:a16="http://schemas.microsoft.com/office/drawing/2014/main" id="{374510DB-1EF8-4063-9D6D-541CD2F4A184}"/>
+              </a:ext>
+            </a:extLst>
+          </p:cNvPr>
+          <p:cNvSpPr>
+            <a:spLocks noGrp="1"/>
+          </p:cNvSpPr>
+          <p:nvPr>
+            <p:ph type="title"/>
+          </p:nvPr>
+        </p:nvSpPr>
+        <p:spPr/>
+        <p:txBody>
+          <a:bodyPr/>
+          <a:lstStyle/>
+          <a:p>
+            <a:r>
+              <a:rPr lang="en-US"/>
+              <a:t>Click to edit Master title style</a:t>
+            </a:r>
+            <a:endParaRPr lang="ru-RU"/>
+          </a:p>
+        </p:txBody>
+      </p:sp>
+      <p:sp>
+        <p:nvSpPr>
+          <p:cNvPr id="3" name="Date Placeholder 2">
+            <a:extLst>
+              <a:ext uri="{FF2B5EF4-FFF2-40B4-BE49-F238E27FC236}">
+                <a16:creationId xmlns:a16="http://schemas.microsoft.com/office/drawing/2014/main" id="{8B804AA4-FFF2-4F7A-94D9-4CB53ABD03A5}"/>
+              </a:ext>
+            </a:extLst>
+          </p:cNvPr>
+          <p:cNvSpPr>
+            <a:spLocks noGrp="1"/>
+          </p:cNvSpPr>
+          <p:nvPr>
+            <p:ph type="dt" sz="half" idx="10"/>
+          </p:nvPr>
+        </p:nvSpPr>
+        <p:spPr/>
+        <p:txBody>
+          <a:bodyPr/>
+          <a:lstStyle/>
+          <a:p>
+            <a:fld id="{CCE9C9EE-394A-4997-9AB6-FF4DF45241DD}" type="datetimeFigureOut">
+              <a:rPr lang="ru-RU" smtClean="0"/>
+              <a:t>16.01.2021</a:t>
+            </a:fld>
+            <a:endParaRPr lang="ru-RU"/>
+          </a:p>
+        </p:txBody>
+      </p:sp>
+      <p:sp>
+        <p:nvSpPr>
+          <p:cNvPr id="4" name="Footer Placeholder 3">
+            <a:extLst>
+              <a:ext uri="{FF2B5EF4-FFF2-40B4-BE49-F238E27FC236}">
+                <a16:creationId xmlns:a16="http://schemas.microsoft.com/office/drawing/2014/main" id="{FDF16265-A9FB-4B1B-B7A9-4DC5CF7E7B56}"/>
+              </a:ext>
+            </a:extLst>
+          </p:cNvPr>
+          <p:cNvSpPr>
+            <a:spLocks noGrp="1"/>
+          </p:cNvSpPr>
+          <p:nvPr>
+            <p:ph type="ftr" sz="quarter" idx="11"/>
+          </p:nvPr>
+        </p:nvSpPr>
+        <p:spPr/>
+        <p:txBody>
+          <a:bodyPr/>
+          <a:lstStyle/>
+          <a:p>
+            <a:endParaRPr lang="ru-RU"/>
+          </a:p>
+        </p:txBody>
+      </p:sp>
+      <p:sp>
+        <p:nvSpPr>
+          <p:cNvPr id="5" name="Slide Number Placeholder 4">
+            <a:extLst>
+              <a:ext uri="{FF2B5EF4-FFF2-40B4-BE49-F238E27FC236}">
+                <a16:creationId xmlns:a16="http://schemas.microsoft.com/office/drawing/2014/main" id="{90D3EC47-638D-41C5-A2BF-537A8C4ADDE4}"/>
+              </a:ext>
+            </a:extLst>
+          </p:cNvPr>
+          <p:cNvSpPr>
+            <a:spLocks noGrp="1"/>
+          </p:cNvSpPr>
+          <p:nvPr>
+            <p:ph type="sldNum" sz="quarter" idx="12"/>
+          </p:nvPr>
+        </p:nvSpPr>
+        <p:spPr/>
+        <p:txBody>
+          <a:bodyPr/>
+          <a:lstStyle/>
+          <a:p>
+            <a:fld id="{163AA9C3-46E6-45F3-8D85-E86FB74784B0}" type="slidenum">
+              <a:rPr lang="ru-RU" smtClean="0"/>
+              <a:t>‹#›</a:t>
+            </a:fld>
+            <a:endParaRPr lang="ru-RU"/>
+          </a:p>
+        </p:txBody>
+      </p:sp>
+    </p:spTree>
+    <p:extLst>
+      <p:ext uri="{BB962C8B-B14F-4D97-AF65-F5344CB8AC3E}">
+        <p14:creationId xmlns:p14="http://schemas.microsoft.com/office/powerpoint/2010/main" val="4025948681"/>
+      </p:ext>
+    </p:extLst>
+  </p:cSld>
+  <p:clrMapOvr>
+    <a:masterClrMapping/>
+  </p:clrMapOvr>
+</p:sldLayout>
+</file>
+
+<file path=ppt/slideLayouts/slideLayout18.xml><?xml version="1.0" encoding="utf-8"?>
+<p:sldLayout xmlns:a="http://schemas.openxmlformats.org/drawingml/2006/main" xmlns:r="http://schemas.openxmlformats.org/officeDocument/2006/relationships" xmlns:p="http://schemas.openxmlformats.org/presentationml/2006/main" type="blank" preserve="1">
+  <p:cSld name="Blank">
+    <p:spTree>
+      <p:nvGrpSpPr>
+        <p:cNvPr id="1" name=""/>
+        <p:cNvGrpSpPr/>
+        <p:nvPr/>
+      </p:nvGrpSpPr>
+      <p:grpSpPr>
+        <a:xfrm>
+          <a:off x="0" y="0"/>
+          <a:ext cx="0" cy="0"/>
+          <a:chOff x="0" y="0"/>
+          <a:chExt cx="0" cy="0"/>
+        </a:xfrm>
+      </p:grpSpPr>
+      <p:sp>
+        <p:nvSpPr>
+          <p:cNvPr id="2" name="Date Placeholder 1">
+            <a:extLst>
+              <a:ext uri="{FF2B5EF4-FFF2-40B4-BE49-F238E27FC236}">
+                <a16:creationId xmlns:a16="http://schemas.microsoft.com/office/drawing/2014/main" id="{D5DEBEC2-644A-4152-88D4-30A2D4BB0B21}"/>
+              </a:ext>
+            </a:extLst>
+          </p:cNvPr>
+          <p:cNvSpPr>
+            <a:spLocks noGrp="1"/>
+          </p:cNvSpPr>
+          <p:nvPr>
+            <p:ph type="dt" sz="half" idx="10"/>
+          </p:nvPr>
+        </p:nvSpPr>
+        <p:spPr/>
+        <p:txBody>
+          <a:bodyPr/>
+          <a:lstStyle/>
+          <a:p>
+            <a:fld id="{CCE9C9EE-394A-4997-9AB6-FF4DF45241DD}" type="datetimeFigureOut">
+              <a:rPr lang="ru-RU" smtClean="0"/>
+              <a:t>16.01.2021</a:t>
+            </a:fld>
+            <a:endParaRPr lang="ru-RU"/>
+          </a:p>
+        </p:txBody>
+      </p:sp>
+      <p:sp>
+        <p:nvSpPr>
+          <p:cNvPr id="3" name="Footer Placeholder 2">
+            <a:extLst>
+              <a:ext uri="{FF2B5EF4-FFF2-40B4-BE49-F238E27FC236}">
+                <a16:creationId xmlns:a16="http://schemas.microsoft.com/office/drawing/2014/main" id="{08F325D8-9357-4B0B-9BC2-932F479F1F66}"/>
+              </a:ext>
+            </a:extLst>
+          </p:cNvPr>
+          <p:cNvSpPr>
+            <a:spLocks noGrp="1"/>
+          </p:cNvSpPr>
+          <p:nvPr>
+            <p:ph type="ftr" sz="quarter" idx="11"/>
+          </p:nvPr>
+        </p:nvSpPr>
+        <p:spPr/>
+        <p:txBody>
+          <a:bodyPr/>
+          <a:lstStyle/>
+          <a:p>
+            <a:endParaRPr lang="ru-RU"/>
+          </a:p>
+        </p:txBody>
+      </p:sp>
+      <p:sp>
+        <p:nvSpPr>
+          <p:cNvPr id="4" name="Slide Number Placeholder 3">
+            <a:extLst>
+              <a:ext uri="{FF2B5EF4-FFF2-40B4-BE49-F238E27FC236}">
+                <a16:creationId xmlns:a16="http://schemas.microsoft.com/office/drawing/2014/main" id="{668605D4-6141-4569-A902-4C0D5B773C1A}"/>
+              </a:ext>
+            </a:extLst>
+          </p:cNvPr>
+          <p:cNvSpPr>
+            <a:spLocks noGrp="1"/>
+          </p:cNvSpPr>
+          <p:nvPr>
+            <p:ph type="sldNum" sz="quarter" idx="12"/>
+          </p:nvPr>
+        </p:nvSpPr>
+        <p:spPr/>
+        <p:txBody>
+          <a:bodyPr/>
+          <a:lstStyle/>
+          <a:p>
+            <a:fld id="{163AA9C3-46E6-45F3-8D85-E86FB74784B0}" type="slidenum">
+              <a:rPr lang="ru-RU" smtClean="0"/>
+              <a:t>‹#›</a:t>
+            </a:fld>
+            <a:endParaRPr lang="ru-RU"/>
+          </a:p>
+        </p:txBody>
+      </p:sp>
+    </p:spTree>
+    <p:extLst>
+      <p:ext uri="{BB962C8B-B14F-4D97-AF65-F5344CB8AC3E}">
+        <p14:creationId xmlns:p14="http://schemas.microsoft.com/office/powerpoint/2010/main" val="1120224097"/>
+      </p:ext>
+    </p:extLst>
+  </p:cSld>
+  <p:clrMapOvr>
+    <a:masterClrMapping/>
+  </p:clrMapOvr>
+</p:sldLayout>
+</file>
+
+<file path=ppt/slideLayouts/slideLayout19.xml><?xml version="1.0" encoding="utf-8"?>
+<p:sldLayout xmlns:a="http://schemas.openxmlformats.org/drawingml/2006/main" xmlns:r="http://schemas.openxmlformats.org/officeDocument/2006/relationships" xmlns:p="http://schemas.openxmlformats.org/presentationml/2006/main" type="objTx" preserve="1">
+  <p:cSld name="Content with Caption">
+    <p:spTree>
+      <p:nvGrpSpPr>
+        <p:cNvPr id="1" name=""/>
+        <p:cNvGrpSpPr/>
+        <p:nvPr/>
+      </p:nvGrpSpPr>
+      <p:grpSpPr>
+        <a:xfrm>
+          <a:off x="0" y="0"/>
+          <a:ext cx="0" cy="0"/>
+          <a:chOff x="0" y="0"/>
+          <a:chExt cx="0" cy="0"/>
+        </a:xfrm>
+      </p:grpSpPr>
+      <p:sp>
+        <p:nvSpPr>
+          <p:cNvPr id="2" name="Title 1">
+            <a:extLst>
+              <a:ext uri="{FF2B5EF4-FFF2-40B4-BE49-F238E27FC236}">
+                <a16:creationId xmlns:a16="http://schemas.microsoft.com/office/drawing/2014/main" id="{3D02DB12-8AD6-45FB-BE21-7F0095E9FD26}"/>
+              </a:ext>
+            </a:extLst>
+          </p:cNvPr>
+          <p:cNvSpPr>
+            <a:spLocks noGrp="1"/>
+          </p:cNvSpPr>
+          <p:nvPr>
+            <p:ph type="title"/>
+          </p:nvPr>
+        </p:nvSpPr>
+        <p:spPr>
+          <a:xfrm>
+            <a:off x="839788" y="457200"/>
+            <a:ext cx="3932237" cy="1600200"/>
+          </a:xfrm>
+        </p:spPr>
+        <p:txBody>
+          <a:bodyPr anchor="b"/>
+          <a:lstStyle>
+            <a:lvl1pPr>
+              <a:defRPr sz="3200"/>
+            </a:lvl1pPr>
+          </a:lstStyle>
+          <a:p>
+            <a:r>
+              <a:rPr lang="en-US"/>
+              <a:t>Click to edit Master title style</a:t>
+            </a:r>
+            <a:endParaRPr lang="ru-RU"/>
+          </a:p>
+        </p:txBody>
+      </p:sp>
+      <p:sp>
+        <p:nvSpPr>
+          <p:cNvPr id="3" name="Content Placeholder 2">
+            <a:extLst>
+              <a:ext uri="{FF2B5EF4-FFF2-40B4-BE49-F238E27FC236}">
+                <a16:creationId xmlns:a16="http://schemas.microsoft.com/office/drawing/2014/main" id="{DFAC8C00-89C8-4336-90CC-FE42EA68BDF3}"/>
+              </a:ext>
+            </a:extLst>
+          </p:cNvPr>
+          <p:cNvSpPr>
+            <a:spLocks noGrp="1"/>
+          </p:cNvSpPr>
+          <p:nvPr>
+            <p:ph idx="1"/>
+          </p:nvPr>
+        </p:nvSpPr>
+        <p:spPr>
+          <a:xfrm>
+            <a:off x="5183188" y="987425"/>
+            <a:ext cx="6172200" cy="4873625"/>
+          </a:xfrm>
+        </p:spPr>
+        <p:txBody>
+          <a:bodyPr/>
+          <a:lstStyle>
+            <a:lvl1pPr>
+              <a:defRPr sz="3200"/>
+            </a:lvl1pPr>
+            <a:lvl2pPr>
+              <a:defRPr sz="2800"/>
+            </a:lvl2pPr>
+            <a:lvl3pPr>
+              <a:defRPr sz="2400"/>
+            </a:lvl3pPr>
+            <a:lvl4pPr>
+              <a:defRPr sz="2000"/>
+            </a:lvl4pPr>
+            <a:lvl5pPr>
+              <a:defRPr sz="2000"/>
+            </a:lvl5pPr>
+            <a:lvl6pPr>
+              <a:defRPr sz="2000"/>
+            </a:lvl6pPr>
+            <a:lvl7pPr>
+              <a:defRPr sz="2000"/>
+            </a:lvl7pPr>
+            <a:lvl8pPr>
+              <a:defRPr sz="2000"/>
+            </a:lvl8pPr>
+            <a:lvl9pPr>
+              <a:defRPr sz="2000"/>
+            </a:lvl9pPr>
+          </a:lstStyle>
+          <a:p>
+            <a:pPr lvl="0"/>
+            <a:r>
+              <a:rPr lang="en-US"/>
+              <a:t>Click to edit Master text styles</a:t>
+            </a:r>
+          </a:p>
+          <a:p>
+            <a:pPr lvl="1"/>
+            <a:r>
+              <a:rPr lang="en-US"/>
+              <a:t>Second level</a:t>
+            </a:r>
+          </a:p>
+          <a:p>
+            <a:pPr lvl="2"/>
+            <a:r>
+              <a:rPr lang="en-US"/>
+              <a:t>Third level</a:t>
+            </a:r>
+          </a:p>
+          <a:p>
+            <a:pPr lvl="3"/>
+            <a:r>
+              <a:rPr lang="en-US"/>
+              <a:t>Fourth level</a:t>
+            </a:r>
+          </a:p>
+          <a:p>
+            <a:pPr lvl="4"/>
+            <a:r>
+              <a:rPr lang="en-US"/>
+              <a:t>Fifth level</a:t>
+            </a:r>
+            <a:endParaRPr lang="ru-RU"/>
+          </a:p>
+        </p:txBody>
+      </p:sp>
+      <p:sp>
+        <p:nvSpPr>
+          <p:cNvPr id="4" name="Text Placeholder 3">
+            <a:extLst>
+              <a:ext uri="{FF2B5EF4-FFF2-40B4-BE49-F238E27FC236}">
+                <a16:creationId xmlns:a16="http://schemas.microsoft.com/office/drawing/2014/main" id="{5238DAEC-C1AE-473C-8543-BCF92EDABE4F}"/>
+              </a:ext>
+            </a:extLst>
+          </p:cNvPr>
+          <p:cNvSpPr>
+            <a:spLocks noGrp="1"/>
+          </p:cNvSpPr>
+          <p:nvPr>
+            <p:ph type="body" sz="half" idx="2"/>
+          </p:nvPr>
+        </p:nvSpPr>
+        <p:spPr>
+          <a:xfrm>
+            <a:off x="839788" y="2057400"/>
+            <a:ext cx="3932237" cy="3811588"/>
+          </a:xfrm>
+        </p:spPr>
+        <p:txBody>
+          <a:bodyPr/>
+          <a:lstStyle>
+            <a:lvl1pPr marL="0" indent="0">
+              <a:buNone/>
+              <a:defRPr sz="1600"/>
+            </a:lvl1pPr>
+            <a:lvl2pPr marL="457200" indent="0">
+              <a:buNone/>
+              <a:defRPr sz="1400"/>
+            </a:lvl2pPr>
+            <a:lvl3pPr marL="914400" indent="0">
+              <a:buNone/>
+              <a:defRPr sz="1200"/>
+            </a:lvl3pPr>
+            <a:lvl4pPr marL="1371600" indent="0">
+              <a:buNone/>
+              <a:defRPr sz="1000"/>
+            </a:lvl4pPr>
+            <a:lvl5pPr marL="1828800" indent="0">
+              <a:buNone/>
+              <a:defRPr sz="1000"/>
+            </a:lvl5pPr>
+            <a:lvl6pPr marL="2286000" indent="0">
+              <a:buNone/>
+              <a:defRPr sz="1000"/>
+            </a:lvl6pPr>
+            <a:lvl7pPr marL="2743200" indent="0">
+              <a:buNone/>
+              <a:defRPr sz="1000"/>
+            </a:lvl7pPr>
+            <a:lvl8pPr marL="3200400" indent="0">
+              <a:buNone/>
+              <a:defRPr sz="1000"/>
+            </a:lvl8pPr>
+            <a:lvl9pPr marL="3657600" indent="0">
+              <a:buNone/>
+              <a:defRPr sz="1000"/>
+            </a:lvl9pPr>
+          </a:lstStyle>
+          <a:p>
+            <a:pPr lvl="0"/>
+            <a:r>
+              <a:rPr lang="en-US"/>
+              <a:t>Click to edit Master text styles</a:t>
+            </a:r>
+          </a:p>
+        </p:txBody>
+      </p:sp>
+      <p:sp>
+        <p:nvSpPr>
+          <p:cNvPr id="5" name="Date Placeholder 4">
+            <a:extLst>
+              <a:ext uri="{FF2B5EF4-FFF2-40B4-BE49-F238E27FC236}">
+                <a16:creationId xmlns:a16="http://schemas.microsoft.com/office/drawing/2014/main" id="{E53C1A71-B978-4368-8B7D-573C793F5D6B}"/>
+              </a:ext>
+            </a:extLst>
+          </p:cNvPr>
+          <p:cNvSpPr>
+            <a:spLocks noGrp="1"/>
+          </p:cNvSpPr>
+          <p:nvPr>
+            <p:ph type="dt" sz="half" idx="10"/>
+          </p:nvPr>
+        </p:nvSpPr>
+        <p:spPr/>
+        <p:txBody>
+          <a:bodyPr/>
+          <a:lstStyle/>
+          <a:p>
+            <a:fld id="{CCE9C9EE-394A-4997-9AB6-FF4DF45241DD}" type="datetimeFigureOut">
+              <a:rPr lang="ru-RU" smtClean="0"/>
+              <a:t>16.01.2021</a:t>
+            </a:fld>
+            <a:endParaRPr lang="ru-RU"/>
+          </a:p>
+        </p:txBody>
+      </p:sp>
+      <p:sp>
+        <p:nvSpPr>
+          <p:cNvPr id="6" name="Footer Placeholder 5">
+            <a:extLst>
+              <a:ext uri="{FF2B5EF4-FFF2-40B4-BE49-F238E27FC236}">
+                <a16:creationId xmlns:a16="http://schemas.microsoft.com/office/drawing/2014/main" id="{2CD3433E-B658-4833-B4C7-5C4DA2117118}"/>
+              </a:ext>
+            </a:extLst>
+          </p:cNvPr>
+          <p:cNvSpPr>
+            <a:spLocks noGrp="1"/>
+          </p:cNvSpPr>
+          <p:nvPr>
+            <p:ph type="ftr" sz="quarter" idx="11"/>
+          </p:nvPr>
+        </p:nvSpPr>
+        <p:spPr/>
+        <p:txBody>
+          <a:bodyPr/>
+          <a:lstStyle/>
+          <a:p>
+            <a:endParaRPr lang="ru-RU"/>
+          </a:p>
+        </p:txBody>
+      </p:sp>
+      <p:sp>
+        <p:nvSpPr>
+          <p:cNvPr id="7" name="Slide Number Placeholder 6">
+            <a:extLst>
+              <a:ext uri="{FF2B5EF4-FFF2-40B4-BE49-F238E27FC236}">
+                <a16:creationId xmlns:a16="http://schemas.microsoft.com/office/drawing/2014/main" id="{7F190E35-BB80-49AD-9F5D-49F792573BCC}"/>
+              </a:ext>
+            </a:extLst>
+          </p:cNvPr>
+          <p:cNvSpPr>
+            <a:spLocks noGrp="1"/>
+          </p:cNvSpPr>
+          <p:nvPr>
+            <p:ph type="sldNum" sz="quarter" idx="12"/>
+          </p:nvPr>
+        </p:nvSpPr>
+        <p:spPr/>
+        <p:txBody>
+          <a:bodyPr/>
+          <a:lstStyle/>
+          <a:p>
+            <a:fld id="{163AA9C3-46E6-45F3-8D85-E86FB74784B0}" type="slidenum">
+              <a:rPr lang="ru-RU" smtClean="0"/>
+              <a:t>‹#›</a:t>
+            </a:fld>
+            <a:endParaRPr lang="ru-RU"/>
+          </a:p>
+        </p:txBody>
+      </p:sp>
+    </p:spTree>
+    <p:extLst>
+      <p:ext uri="{BB962C8B-B14F-4D97-AF65-F5344CB8AC3E}">
+        <p14:creationId xmlns:p14="http://schemas.microsoft.com/office/powerpoint/2010/main" val="4261361707"/>
       </p:ext>
     </p:extLst>
   </p:cSld>
@@ -1873,7 +3823,7 @@
           <a:p>
             <a:fld id="{6A2D1428-0459-4F75-829F-043936AE8C9E}" type="datetimeFigureOut">
               <a:rPr lang="en-US" smtClean="0"/>
-              <a:t>12/29/2020</a:t>
+              <a:t>1/16/2021</a:t>
             </a:fld>
             <a:endParaRPr lang="en-US"/>
           </a:p>
@@ -1937,6 +3887,705 @@
     <p:extLst>
       <p:ext uri="{BB962C8B-B14F-4D97-AF65-F5344CB8AC3E}">
         <p14:creationId xmlns:p14="http://schemas.microsoft.com/office/powerpoint/2010/main" val="3618271668"/>
+      </p:ext>
+    </p:extLst>
+  </p:cSld>
+  <p:clrMapOvr>
+    <a:masterClrMapping/>
+  </p:clrMapOvr>
+</p:sldLayout>
+</file>
+
+<file path=ppt/slideLayouts/slideLayout20.xml><?xml version="1.0" encoding="utf-8"?>
+<p:sldLayout xmlns:a="http://schemas.openxmlformats.org/drawingml/2006/main" xmlns:r="http://schemas.openxmlformats.org/officeDocument/2006/relationships" xmlns:p="http://schemas.openxmlformats.org/presentationml/2006/main" type="picTx" preserve="1">
+  <p:cSld name="Picture with Caption">
+    <p:spTree>
+      <p:nvGrpSpPr>
+        <p:cNvPr id="1" name=""/>
+        <p:cNvGrpSpPr/>
+        <p:nvPr/>
+      </p:nvGrpSpPr>
+      <p:grpSpPr>
+        <a:xfrm>
+          <a:off x="0" y="0"/>
+          <a:ext cx="0" cy="0"/>
+          <a:chOff x="0" y="0"/>
+          <a:chExt cx="0" cy="0"/>
+        </a:xfrm>
+      </p:grpSpPr>
+      <p:sp>
+        <p:nvSpPr>
+          <p:cNvPr id="2" name="Title 1">
+            <a:extLst>
+              <a:ext uri="{FF2B5EF4-FFF2-40B4-BE49-F238E27FC236}">
+                <a16:creationId xmlns:a16="http://schemas.microsoft.com/office/drawing/2014/main" id="{35C0FB1F-3D35-4034-9111-41C32BBE77C1}"/>
+              </a:ext>
+            </a:extLst>
+          </p:cNvPr>
+          <p:cNvSpPr>
+            <a:spLocks noGrp="1"/>
+          </p:cNvSpPr>
+          <p:nvPr>
+            <p:ph type="title"/>
+          </p:nvPr>
+        </p:nvSpPr>
+        <p:spPr>
+          <a:xfrm>
+            <a:off x="839788" y="457200"/>
+            <a:ext cx="3932237" cy="1600200"/>
+          </a:xfrm>
+        </p:spPr>
+        <p:txBody>
+          <a:bodyPr anchor="b"/>
+          <a:lstStyle>
+            <a:lvl1pPr>
+              <a:defRPr sz="3200"/>
+            </a:lvl1pPr>
+          </a:lstStyle>
+          <a:p>
+            <a:r>
+              <a:rPr lang="en-US"/>
+              <a:t>Click to edit Master title style</a:t>
+            </a:r>
+            <a:endParaRPr lang="ru-RU"/>
+          </a:p>
+        </p:txBody>
+      </p:sp>
+      <p:sp>
+        <p:nvSpPr>
+          <p:cNvPr id="3" name="Picture Placeholder 2">
+            <a:extLst>
+              <a:ext uri="{FF2B5EF4-FFF2-40B4-BE49-F238E27FC236}">
+                <a16:creationId xmlns:a16="http://schemas.microsoft.com/office/drawing/2014/main" id="{9C735B84-D92A-47B3-BB68-AD16F2A9B4C0}"/>
+              </a:ext>
+            </a:extLst>
+          </p:cNvPr>
+          <p:cNvSpPr>
+            <a:spLocks noGrp="1"/>
+          </p:cNvSpPr>
+          <p:nvPr>
+            <p:ph type="pic" idx="1"/>
+          </p:nvPr>
+        </p:nvSpPr>
+        <p:spPr>
+          <a:xfrm>
+            <a:off x="5183188" y="987425"/>
+            <a:ext cx="6172200" cy="4873625"/>
+          </a:xfrm>
+        </p:spPr>
+        <p:txBody>
+          <a:bodyPr/>
+          <a:lstStyle>
+            <a:lvl1pPr marL="0" indent="0">
+              <a:buNone/>
+              <a:defRPr sz="3200"/>
+            </a:lvl1pPr>
+            <a:lvl2pPr marL="457200" indent="0">
+              <a:buNone/>
+              <a:defRPr sz="2800"/>
+            </a:lvl2pPr>
+            <a:lvl3pPr marL="914400" indent="0">
+              <a:buNone/>
+              <a:defRPr sz="2400"/>
+            </a:lvl3pPr>
+            <a:lvl4pPr marL="1371600" indent="0">
+              <a:buNone/>
+              <a:defRPr sz="2000"/>
+            </a:lvl4pPr>
+            <a:lvl5pPr marL="1828800" indent="0">
+              <a:buNone/>
+              <a:defRPr sz="2000"/>
+            </a:lvl5pPr>
+            <a:lvl6pPr marL="2286000" indent="0">
+              <a:buNone/>
+              <a:defRPr sz="2000"/>
+            </a:lvl6pPr>
+            <a:lvl7pPr marL="2743200" indent="0">
+              <a:buNone/>
+              <a:defRPr sz="2000"/>
+            </a:lvl7pPr>
+            <a:lvl8pPr marL="3200400" indent="0">
+              <a:buNone/>
+              <a:defRPr sz="2000"/>
+            </a:lvl8pPr>
+            <a:lvl9pPr marL="3657600" indent="0">
+              <a:buNone/>
+              <a:defRPr sz="2000"/>
+            </a:lvl9pPr>
+          </a:lstStyle>
+          <a:p>
+            <a:endParaRPr lang="ru-RU"/>
+          </a:p>
+        </p:txBody>
+      </p:sp>
+      <p:sp>
+        <p:nvSpPr>
+          <p:cNvPr id="4" name="Text Placeholder 3">
+            <a:extLst>
+              <a:ext uri="{FF2B5EF4-FFF2-40B4-BE49-F238E27FC236}">
+                <a16:creationId xmlns:a16="http://schemas.microsoft.com/office/drawing/2014/main" id="{52D8EA8B-0D80-4DB7-9B94-31A5523D3991}"/>
+              </a:ext>
+            </a:extLst>
+          </p:cNvPr>
+          <p:cNvSpPr>
+            <a:spLocks noGrp="1"/>
+          </p:cNvSpPr>
+          <p:nvPr>
+            <p:ph type="body" sz="half" idx="2"/>
+          </p:nvPr>
+        </p:nvSpPr>
+        <p:spPr>
+          <a:xfrm>
+            <a:off x="839788" y="2057400"/>
+            <a:ext cx="3932237" cy="3811588"/>
+          </a:xfrm>
+        </p:spPr>
+        <p:txBody>
+          <a:bodyPr/>
+          <a:lstStyle>
+            <a:lvl1pPr marL="0" indent="0">
+              <a:buNone/>
+              <a:defRPr sz="1600"/>
+            </a:lvl1pPr>
+            <a:lvl2pPr marL="457200" indent="0">
+              <a:buNone/>
+              <a:defRPr sz="1400"/>
+            </a:lvl2pPr>
+            <a:lvl3pPr marL="914400" indent="0">
+              <a:buNone/>
+              <a:defRPr sz="1200"/>
+            </a:lvl3pPr>
+            <a:lvl4pPr marL="1371600" indent="0">
+              <a:buNone/>
+              <a:defRPr sz="1000"/>
+            </a:lvl4pPr>
+            <a:lvl5pPr marL="1828800" indent="0">
+              <a:buNone/>
+              <a:defRPr sz="1000"/>
+            </a:lvl5pPr>
+            <a:lvl6pPr marL="2286000" indent="0">
+              <a:buNone/>
+              <a:defRPr sz="1000"/>
+            </a:lvl6pPr>
+            <a:lvl7pPr marL="2743200" indent="0">
+              <a:buNone/>
+              <a:defRPr sz="1000"/>
+            </a:lvl7pPr>
+            <a:lvl8pPr marL="3200400" indent="0">
+              <a:buNone/>
+              <a:defRPr sz="1000"/>
+            </a:lvl8pPr>
+            <a:lvl9pPr marL="3657600" indent="0">
+              <a:buNone/>
+              <a:defRPr sz="1000"/>
+            </a:lvl9pPr>
+          </a:lstStyle>
+          <a:p>
+            <a:pPr lvl="0"/>
+            <a:r>
+              <a:rPr lang="en-US"/>
+              <a:t>Click to edit Master text styles</a:t>
+            </a:r>
+          </a:p>
+        </p:txBody>
+      </p:sp>
+      <p:sp>
+        <p:nvSpPr>
+          <p:cNvPr id="5" name="Date Placeholder 4">
+            <a:extLst>
+              <a:ext uri="{FF2B5EF4-FFF2-40B4-BE49-F238E27FC236}">
+                <a16:creationId xmlns:a16="http://schemas.microsoft.com/office/drawing/2014/main" id="{D91CD360-050E-458B-BA2E-02C8C7E21882}"/>
+              </a:ext>
+            </a:extLst>
+          </p:cNvPr>
+          <p:cNvSpPr>
+            <a:spLocks noGrp="1"/>
+          </p:cNvSpPr>
+          <p:nvPr>
+            <p:ph type="dt" sz="half" idx="10"/>
+          </p:nvPr>
+        </p:nvSpPr>
+        <p:spPr/>
+        <p:txBody>
+          <a:bodyPr/>
+          <a:lstStyle/>
+          <a:p>
+            <a:fld id="{CCE9C9EE-394A-4997-9AB6-FF4DF45241DD}" type="datetimeFigureOut">
+              <a:rPr lang="ru-RU" smtClean="0"/>
+              <a:t>16.01.2021</a:t>
+            </a:fld>
+            <a:endParaRPr lang="ru-RU"/>
+          </a:p>
+        </p:txBody>
+      </p:sp>
+      <p:sp>
+        <p:nvSpPr>
+          <p:cNvPr id="6" name="Footer Placeholder 5">
+            <a:extLst>
+              <a:ext uri="{FF2B5EF4-FFF2-40B4-BE49-F238E27FC236}">
+                <a16:creationId xmlns:a16="http://schemas.microsoft.com/office/drawing/2014/main" id="{C2028114-D16C-45C6-B60B-E77347B8CC3B}"/>
+              </a:ext>
+            </a:extLst>
+          </p:cNvPr>
+          <p:cNvSpPr>
+            <a:spLocks noGrp="1"/>
+          </p:cNvSpPr>
+          <p:nvPr>
+            <p:ph type="ftr" sz="quarter" idx="11"/>
+          </p:nvPr>
+        </p:nvSpPr>
+        <p:spPr/>
+        <p:txBody>
+          <a:bodyPr/>
+          <a:lstStyle/>
+          <a:p>
+            <a:endParaRPr lang="ru-RU"/>
+          </a:p>
+        </p:txBody>
+      </p:sp>
+      <p:sp>
+        <p:nvSpPr>
+          <p:cNvPr id="7" name="Slide Number Placeholder 6">
+            <a:extLst>
+              <a:ext uri="{FF2B5EF4-FFF2-40B4-BE49-F238E27FC236}">
+                <a16:creationId xmlns:a16="http://schemas.microsoft.com/office/drawing/2014/main" id="{6A627B13-D65B-49B2-A2B9-39B15ED5CCB7}"/>
+              </a:ext>
+            </a:extLst>
+          </p:cNvPr>
+          <p:cNvSpPr>
+            <a:spLocks noGrp="1"/>
+          </p:cNvSpPr>
+          <p:nvPr>
+            <p:ph type="sldNum" sz="quarter" idx="12"/>
+          </p:nvPr>
+        </p:nvSpPr>
+        <p:spPr/>
+        <p:txBody>
+          <a:bodyPr/>
+          <a:lstStyle/>
+          <a:p>
+            <a:fld id="{163AA9C3-46E6-45F3-8D85-E86FB74784B0}" type="slidenum">
+              <a:rPr lang="ru-RU" smtClean="0"/>
+              <a:t>‹#›</a:t>
+            </a:fld>
+            <a:endParaRPr lang="ru-RU"/>
+          </a:p>
+        </p:txBody>
+      </p:sp>
+    </p:spTree>
+    <p:extLst>
+      <p:ext uri="{BB962C8B-B14F-4D97-AF65-F5344CB8AC3E}">
+        <p14:creationId xmlns:p14="http://schemas.microsoft.com/office/powerpoint/2010/main" val="220815512"/>
+      </p:ext>
+    </p:extLst>
+  </p:cSld>
+  <p:clrMapOvr>
+    <a:masterClrMapping/>
+  </p:clrMapOvr>
+</p:sldLayout>
+</file>
+
+<file path=ppt/slideLayouts/slideLayout21.xml><?xml version="1.0" encoding="utf-8"?>
+<p:sldLayout xmlns:a="http://schemas.openxmlformats.org/drawingml/2006/main" xmlns:r="http://schemas.openxmlformats.org/officeDocument/2006/relationships" xmlns:p="http://schemas.openxmlformats.org/presentationml/2006/main" type="vertTx" preserve="1">
+  <p:cSld name="Title and Vertical Text">
+    <p:spTree>
+      <p:nvGrpSpPr>
+        <p:cNvPr id="1" name=""/>
+        <p:cNvGrpSpPr/>
+        <p:nvPr/>
+      </p:nvGrpSpPr>
+      <p:grpSpPr>
+        <a:xfrm>
+          <a:off x="0" y="0"/>
+          <a:ext cx="0" cy="0"/>
+          <a:chOff x="0" y="0"/>
+          <a:chExt cx="0" cy="0"/>
+        </a:xfrm>
+      </p:grpSpPr>
+      <p:sp>
+        <p:nvSpPr>
+          <p:cNvPr id="2" name="Title 1">
+            <a:extLst>
+              <a:ext uri="{FF2B5EF4-FFF2-40B4-BE49-F238E27FC236}">
+                <a16:creationId xmlns:a16="http://schemas.microsoft.com/office/drawing/2014/main" id="{854B4651-F838-421B-B355-05BACA71FBDA}"/>
+              </a:ext>
+            </a:extLst>
+          </p:cNvPr>
+          <p:cNvSpPr>
+            <a:spLocks noGrp="1"/>
+          </p:cNvSpPr>
+          <p:nvPr>
+            <p:ph type="title"/>
+          </p:nvPr>
+        </p:nvSpPr>
+        <p:spPr/>
+        <p:txBody>
+          <a:bodyPr/>
+          <a:lstStyle/>
+          <a:p>
+            <a:r>
+              <a:rPr lang="en-US"/>
+              <a:t>Click to edit Master title style</a:t>
+            </a:r>
+            <a:endParaRPr lang="ru-RU"/>
+          </a:p>
+        </p:txBody>
+      </p:sp>
+      <p:sp>
+        <p:nvSpPr>
+          <p:cNvPr id="3" name="Vertical Text Placeholder 2">
+            <a:extLst>
+              <a:ext uri="{FF2B5EF4-FFF2-40B4-BE49-F238E27FC236}">
+                <a16:creationId xmlns:a16="http://schemas.microsoft.com/office/drawing/2014/main" id="{BF87E54A-D29D-4FF8-9283-B6C4AC9D49FC}"/>
+              </a:ext>
+            </a:extLst>
+          </p:cNvPr>
+          <p:cNvSpPr>
+            <a:spLocks noGrp="1"/>
+          </p:cNvSpPr>
+          <p:nvPr>
+            <p:ph type="body" orient="vert" idx="1"/>
+          </p:nvPr>
+        </p:nvSpPr>
+        <p:spPr/>
+        <p:txBody>
+          <a:bodyPr vert="eaVert"/>
+          <a:lstStyle/>
+          <a:p>
+            <a:pPr lvl="0"/>
+            <a:r>
+              <a:rPr lang="en-US"/>
+              <a:t>Click to edit Master text styles</a:t>
+            </a:r>
+          </a:p>
+          <a:p>
+            <a:pPr lvl="1"/>
+            <a:r>
+              <a:rPr lang="en-US"/>
+              <a:t>Second level</a:t>
+            </a:r>
+          </a:p>
+          <a:p>
+            <a:pPr lvl="2"/>
+            <a:r>
+              <a:rPr lang="en-US"/>
+              <a:t>Third level</a:t>
+            </a:r>
+          </a:p>
+          <a:p>
+            <a:pPr lvl="3"/>
+            <a:r>
+              <a:rPr lang="en-US"/>
+              <a:t>Fourth level</a:t>
+            </a:r>
+          </a:p>
+          <a:p>
+            <a:pPr lvl="4"/>
+            <a:r>
+              <a:rPr lang="en-US"/>
+              <a:t>Fifth level</a:t>
+            </a:r>
+            <a:endParaRPr lang="ru-RU"/>
+          </a:p>
+        </p:txBody>
+      </p:sp>
+      <p:sp>
+        <p:nvSpPr>
+          <p:cNvPr id="4" name="Date Placeholder 3">
+            <a:extLst>
+              <a:ext uri="{FF2B5EF4-FFF2-40B4-BE49-F238E27FC236}">
+                <a16:creationId xmlns:a16="http://schemas.microsoft.com/office/drawing/2014/main" id="{88795A5C-8F28-4ACC-A9A4-2D809F9AD361}"/>
+              </a:ext>
+            </a:extLst>
+          </p:cNvPr>
+          <p:cNvSpPr>
+            <a:spLocks noGrp="1"/>
+          </p:cNvSpPr>
+          <p:nvPr>
+            <p:ph type="dt" sz="half" idx="10"/>
+          </p:nvPr>
+        </p:nvSpPr>
+        <p:spPr/>
+        <p:txBody>
+          <a:bodyPr/>
+          <a:lstStyle/>
+          <a:p>
+            <a:fld id="{CCE9C9EE-394A-4997-9AB6-FF4DF45241DD}" type="datetimeFigureOut">
+              <a:rPr lang="ru-RU" smtClean="0"/>
+              <a:t>16.01.2021</a:t>
+            </a:fld>
+            <a:endParaRPr lang="ru-RU"/>
+          </a:p>
+        </p:txBody>
+      </p:sp>
+      <p:sp>
+        <p:nvSpPr>
+          <p:cNvPr id="5" name="Footer Placeholder 4">
+            <a:extLst>
+              <a:ext uri="{FF2B5EF4-FFF2-40B4-BE49-F238E27FC236}">
+                <a16:creationId xmlns:a16="http://schemas.microsoft.com/office/drawing/2014/main" id="{61FD8B3B-6F80-4AB7-8C86-8E34DC703088}"/>
+              </a:ext>
+            </a:extLst>
+          </p:cNvPr>
+          <p:cNvSpPr>
+            <a:spLocks noGrp="1"/>
+          </p:cNvSpPr>
+          <p:nvPr>
+            <p:ph type="ftr" sz="quarter" idx="11"/>
+          </p:nvPr>
+        </p:nvSpPr>
+        <p:spPr/>
+        <p:txBody>
+          <a:bodyPr/>
+          <a:lstStyle/>
+          <a:p>
+            <a:endParaRPr lang="ru-RU"/>
+          </a:p>
+        </p:txBody>
+      </p:sp>
+      <p:sp>
+        <p:nvSpPr>
+          <p:cNvPr id="6" name="Slide Number Placeholder 5">
+            <a:extLst>
+              <a:ext uri="{FF2B5EF4-FFF2-40B4-BE49-F238E27FC236}">
+                <a16:creationId xmlns:a16="http://schemas.microsoft.com/office/drawing/2014/main" id="{FBE8A5A0-0371-40BA-AC69-65F168BC1AB3}"/>
+              </a:ext>
+            </a:extLst>
+          </p:cNvPr>
+          <p:cNvSpPr>
+            <a:spLocks noGrp="1"/>
+          </p:cNvSpPr>
+          <p:nvPr>
+            <p:ph type="sldNum" sz="quarter" idx="12"/>
+          </p:nvPr>
+        </p:nvSpPr>
+        <p:spPr/>
+        <p:txBody>
+          <a:bodyPr/>
+          <a:lstStyle/>
+          <a:p>
+            <a:fld id="{163AA9C3-46E6-45F3-8D85-E86FB74784B0}" type="slidenum">
+              <a:rPr lang="ru-RU" smtClean="0"/>
+              <a:t>‹#›</a:t>
+            </a:fld>
+            <a:endParaRPr lang="ru-RU"/>
+          </a:p>
+        </p:txBody>
+      </p:sp>
+    </p:spTree>
+    <p:extLst>
+      <p:ext uri="{BB962C8B-B14F-4D97-AF65-F5344CB8AC3E}">
+        <p14:creationId xmlns:p14="http://schemas.microsoft.com/office/powerpoint/2010/main" val="1926408487"/>
+      </p:ext>
+    </p:extLst>
+  </p:cSld>
+  <p:clrMapOvr>
+    <a:masterClrMapping/>
+  </p:clrMapOvr>
+</p:sldLayout>
+</file>
+
+<file path=ppt/slideLayouts/slideLayout22.xml><?xml version="1.0" encoding="utf-8"?>
+<p:sldLayout xmlns:a="http://schemas.openxmlformats.org/drawingml/2006/main" xmlns:r="http://schemas.openxmlformats.org/officeDocument/2006/relationships" xmlns:p="http://schemas.openxmlformats.org/presentationml/2006/main" type="vertTitleAndTx" preserve="1">
+  <p:cSld name="Vertical Title and Text">
+    <p:spTree>
+      <p:nvGrpSpPr>
+        <p:cNvPr id="1" name=""/>
+        <p:cNvGrpSpPr/>
+        <p:nvPr/>
+      </p:nvGrpSpPr>
+      <p:grpSpPr>
+        <a:xfrm>
+          <a:off x="0" y="0"/>
+          <a:ext cx="0" cy="0"/>
+          <a:chOff x="0" y="0"/>
+          <a:chExt cx="0" cy="0"/>
+        </a:xfrm>
+      </p:grpSpPr>
+      <p:sp>
+        <p:nvSpPr>
+          <p:cNvPr id="2" name="Vertical Title 1">
+            <a:extLst>
+              <a:ext uri="{FF2B5EF4-FFF2-40B4-BE49-F238E27FC236}">
+                <a16:creationId xmlns:a16="http://schemas.microsoft.com/office/drawing/2014/main" id="{0A105EDF-0BD2-4C25-9513-804C57801693}"/>
+              </a:ext>
+            </a:extLst>
+          </p:cNvPr>
+          <p:cNvSpPr>
+            <a:spLocks noGrp="1"/>
+          </p:cNvSpPr>
+          <p:nvPr>
+            <p:ph type="title" orient="vert"/>
+          </p:nvPr>
+        </p:nvSpPr>
+        <p:spPr>
+          <a:xfrm>
+            <a:off x="8724900" y="365125"/>
+            <a:ext cx="2628900" cy="5811838"/>
+          </a:xfrm>
+        </p:spPr>
+        <p:txBody>
+          <a:bodyPr vert="eaVert"/>
+          <a:lstStyle/>
+          <a:p>
+            <a:r>
+              <a:rPr lang="en-US"/>
+              <a:t>Click to edit Master title style</a:t>
+            </a:r>
+            <a:endParaRPr lang="ru-RU"/>
+          </a:p>
+        </p:txBody>
+      </p:sp>
+      <p:sp>
+        <p:nvSpPr>
+          <p:cNvPr id="3" name="Vertical Text Placeholder 2">
+            <a:extLst>
+              <a:ext uri="{FF2B5EF4-FFF2-40B4-BE49-F238E27FC236}">
+                <a16:creationId xmlns:a16="http://schemas.microsoft.com/office/drawing/2014/main" id="{32D72B23-989B-4F81-B89A-F6603B1F3A4D}"/>
+              </a:ext>
+            </a:extLst>
+          </p:cNvPr>
+          <p:cNvSpPr>
+            <a:spLocks noGrp="1"/>
+          </p:cNvSpPr>
+          <p:nvPr>
+            <p:ph type="body" orient="vert" idx="1"/>
+          </p:nvPr>
+        </p:nvSpPr>
+        <p:spPr>
+          <a:xfrm>
+            <a:off x="838200" y="365125"/>
+            <a:ext cx="7734300" cy="5811838"/>
+          </a:xfrm>
+        </p:spPr>
+        <p:txBody>
+          <a:bodyPr vert="eaVert"/>
+          <a:lstStyle/>
+          <a:p>
+            <a:pPr lvl="0"/>
+            <a:r>
+              <a:rPr lang="en-US"/>
+              <a:t>Click to edit Master text styles</a:t>
+            </a:r>
+          </a:p>
+          <a:p>
+            <a:pPr lvl="1"/>
+            <a:r>
+              <a:rPr lang="en-US"/>
+              <a:t>Second level</a:t>
+            </a:r>
+          </a:p>
+          <a:p>
+            <a:pPr lvl="2"/>
+            <a:r>
+              <a:rPr lang="en-US"/>
+              <a:t>Third level</a:t>
+            </a:r>
+          </a:p>
+          <a:p>
+            <a:pPr lvl="3"/>
+            <a:r>
+              <a:rPr lang="en-US"/>
+              <a:t>Fourth level</a:t>
+            </a:r>
+          </a:p>
+          <a:p>
+            <a:pPr lvl="4"/>
+            <a:r>
+              <a:rPr lang="en-US"/>
+              <a:t>Fifth level</a:t>
+            </a:r>
+            <a:endParaRPr lang="ru-RU"/>
+          </a:p>
+        </p:txBody>
+      </p:sp>
+      <p:sp>
+        <p:nvSpPr>
+          <p:cNvPr id="4" name="Date Placeholder 3">
+            <a:extLst>
+              <a:ext uri="{FF2B5EF4-FFF2-40B4-BE49-F238E27FC236}">
+                <a16:creationId xmlns:a16="http://schemas.microsoft.com/office/drawing/2014/main" id="{AFE162BE-FD4E-432C-8148-B55D26B4053D}"/>
+              </a:ext>
+            </a:extLst>
+          </p:cNvPr>
+          <p:cNvSpPr>
+            <a:spLocks noGrp="1"/>
+          </p:cNvSpPr>
+          <p:nvPr>
+            <p:ph type="dt" sz="half" idx="10"/>
+          </p:nvPr>
+        </p:nvSpPr>
+        <p:spPr/>
+        <p:txBody>
+          <a:bodyPr/>
+          <a:lstStyle/>
+          <a:p>
+            <a:fld id="{CCE9C9EE-394A-4997-9AB6-FF4DF45241DD}" type="datetimeFigureOut">
+              <a:rPr lang="ru-RU" smtClean="0"/>
+              <a:t>16.01.2021</a:t>
+            </a:fld>
+            <a:endParaRPr lang="ru-RU"/>
+          </a:p>
+        </p:txBody>
+      </p:sp>
+      <p:sp>
+        <p:nvSpPr>
+          <p:cNvPr id="5" name="Footer Placeholder 4">
+            <a:extLst>
+              <a:ext uri="{FF2B5EF4-FFF2-40B4-BE49-F238E27FC236}">
+                <a16:creationId xmlns:a16="http://schemas.microsoft.com/office/drawing/2014/main" id="{871A9294-E248-4E91-B25F-AD56879363E3}"/>
+              </a:ext>
+            </a:extLst>
+          </p:cNvPr>
+          <p:cNvSpPr>
+            <a:spLocks noGrp="1"/>
+          </p:cNvSpPr>
+          <p:nvPr>
+            <p:ph type="ftr" sz="quarter" idx="11"/>
+          </p:nvPr>
+        </p:nvSpPr>
+        <p:spPr/>
+        <p:txBody>
+          <a:bodyPr/>
+          <a:lstStyle/>
+          <a:p>
+            <a:endParaRPr lang="ru-RU"/>
+          </a:p>
+        </p:txBody>
+      </p:sp>
+      <p:sp>
+        <p:nvSpPr>
+          <p:cNvPr id="6" name="Slide Number Placeholder 5">
+            <a:extLst>
+              <a:ext uri="{FF2B5EF4-FFF2-40B4-BE49-F238E27FC236}">
+                <a16:creationId xmlns:a16="http://schemas.microsoft.com/office/drawing/2014/main" id="{B4B8A8FC-17FF-450F-9CF7-02879FC142B4}"/>
+              </a:ext>
+            </a:extLst>
+          </p:cNvPr>
+          <p:cNvSpPr>
+            <a:spLocks noGrp="1"/>
+          </p:cNvSpPr>
+          <p:nvPr>
+            <p:ph type="sldNum" sz="quarter" idx="12"/>
+          </p:nvPr>
+        </p:nvSpPr>
+        <p:spPr/>
+        <p:txBody>
+          <a:bodyPr/>
+          <a:lstStyle/>
+          <a:p>
+            <a:fld id="{163AA9C3-46E6-45F3-8D85-E86FB74784B0}" type="slidenum">
+              <a:rPr lang="ru-RU" smtClean="0"/>
+              <a:t>‹#›</a:t>
+            </a:fld>
+            <a:endParaRPr lang="ru-RU"/>
+          </a:p>
+        </p:txBody>
+      </p:sp>
+    </p:spTree>
+    <p:extLst>
+      <p:ext uri="{BB962C8B-B14F-4D97-AF65-F5344CB8AC3E}">
+        <p14:creationId xmlns:p14="http://schemas.microsoft.com/office/powerpoint/2010/main" val="1634526763"/>
       </p:ext>
     </p:extLst>
   </p:cSld>
@@ -2149,7 +4798,7 @@
           <a:p>
             <a:fld id="{6A2D1428-0459-4F75-829F-043936AE8C9E}" type="datetimeFigureOut">
               <a:rPr lang="en-US" smtClean="0"/>
-              <a:t>12/29/2020</a:t>
+              <a:t>1/16/2021</a:t>
             </a:fld>
             <a:endParaRPr lang="en-US"/>
           </a:p>
@@ -2417,7 +5066,7 @@
           <a:p>
             <a:fld id="{6A2D1428-0459-4F75-829F-043936AE8C9E}" type="datetimeFigureOut">
               <a:rPr lang="en-US" smtClean="0"/>
-              <a:t>12/29/2020</a:t>
+              <a:t>1/16/2021</a:t>
             </a:fld>
             <a:endParaRPr lang="en-US"/>
           </a:p>
@@ -2832,7 +5481,7 @@
           <a:p>
             <a:fld id="{6A2D1428-0459-4F75-829F-043936AE8C9E}" type="datetimeFigureOut">
               <a:rPr lang="en-US" smtClean="0"/>
-              <a:t>12/29/2020</a:t>
+              <a:t>1/16/2021</a:t>
             </a:fld>
             <a:endParaRPr lang="en-US"/>
           </a:p>
@@ -2974,7 +5623,7 @@
           <a:p>
             <a:fld id="{6A2D1428-0459-4F75-829F-043936AE8C9E}" type="datetimeFigureOut">
               <a:rPr lang="en-US" smtClean="0"/>
-              <a:t>12/29/2020</a:t>
+              <a:t>1/16/2021</a:t>
             </a:fld>
             <a:endParaRPr lang="en-US"/>
           </a:p>
@@ -3087,7 +5736,7 @@
           <a:p>
             <a:fld id="{6A2D1428-0459-4F75-829F-043936AE8C9E}" type="datetimeFigureOut">
               <a:rPr lang="en-US" smtClean="0"/>
-              <a:t>12/29/2020</a:t>
+              <a:t>1/16/2021</a:t>
             </a:fld>
             <a:endParaRPr lang="en-US"/>
           </a:p>
@@ -3400,7 +6049,7 @@
           <a:p>
             <a:fld id="{6A2D1428-0459-4F75-829F-043936AE8C9E}" type="datetimeFigureOut">
               <a:rPr lang="en-US" smtClean="0"/>
-              <a:t>12/29/2020</a:t>
+              <a:t>1/16/2021</a:t>
             </a:fld>
             <a:endParaRPr lang="en-US"/>
           </a:p>
@@ -3689,7 +6338,7 @@
           <a:p>
             <a:fld id="{6A2D1428-0459-4F75-829F-043936AE8C9E}" type="datetimeFigureOut">
               <a:rPr lang="en-US" smtClean="0"/>
-              <a:t>12/29/2020</a:t>
+              <a:t>1/16/2021</a:t>
             </a:fld>
             <a:endParaRPr lang="en-US"/>
           </a:p>
@@ -3932,7 +6581,7 @@
           <a:p>
             <a:fld id="{6A2D1428-0459-4F75-829F-043936AE8C9E}" type="datetimeFigureOut">
               <a:rPr lang="en-US" smtClean="0"/>
-              <a:t>12/29/2020</a:t>
+              <a:t>1/16/2021</a:t>
             </a:fld>
             <a:endParaRPr lang="en-US"/>
           </a:p>
@@ -4236,6 +6885,576 @@
     <p:otherStyle>
       <a:defPPr>
         <a:defRPr lang="en-US"/>
+      </a:defPPr>
+      <a:lvl1pPr marL="0" algn="l" defTabSz="914400" rtl="0" eaLnBrk="1" latinLnBrk="0" hangingPunct="1">
+        <a:defRPr sz="1800" kern="1200">
+          <a:solidFill>
+            <a:schemeClr val="tx1"/>
+          </a:solidFill>
+          <a:latin typeface="+mn-lt"/>
+          <a:ea typeface="+mn-ea"/>
+          <a:cs typeface="+mn-cs"/>
+        </a:defRPr>
+      </a:lvl1pPr>
+      <a:lvl2pPr marL="457200" algn="l" defTabSz="914400" rtl="0" eaLnBrk="1" latinLnBrk="0" hangingPunct="1">
+        <a:defRPr sz="1800" kern="1200">
+          <a:solidFill>
+            <a:schemeClr val="tx1"/>
+          </a:solidFill>
+          <a:latin typeface="+mn-lt"/>
+          <a:ea typeface="+mn-ea"/>
+          <a:cs typeface="+mn-cs"/>
+        </a:defRPr>
+      </a:lvl2pPr>
+      <a:lvl3pPr marL="914400" algn="l" defTabSz="914400" rtl="0" eaLnBrk="1" latinLnBrk="0" hangingPunct="1">
+        <a:defRPr sz="1800" kern="1200">
+          <a:solidFill>
+            <a:schemeClr val="tx1"/>
+          </a:solidFill>
+          <a:latin typeface="+mn-lt"/>
+          <a:ea typeface="+mn-ea"/>
+          <a:cs typeface="+mn-cs"/>
+        </a:defRPr>
+      </a:lvl3pPr>
+      <a:lvl4pPr marL="1371600" algn="l" defTabSz="914400" rtl="0" eaLnBrk="1" latinLnBrk="0" hangingPunct="1">
+        <a:defRPr sz="1800" kern="1200">
+          <a:solidFill>
+            <a:schemeClr val="tx1"/>
+          </a:solidFill>
+          <a:latin typeface="+mn-lt"/>
+          <a:ea typeface="+mn-ea"/>
+          <a:cs typeface="+mn-cs"/>
+        </a:defRPr>
+      </a:lvl4pPr>
+      <a:lvl5pPr marL="1828800" algn="l" defTabSz="914400" rtl="0" eaLnBrk="1" latinLnBrk="0" hangingPunct="1">
+        <a:defRPr sz="1800" kern="1200">
+          <a:solidFill>
+            <a:schemeClr val="tx1"/>
+          </a:solidFill>
+          <a:latin typeface="+mn-lt"/>
+          <a:ea typeface="+mn-ea"/>
+          <a:cs typeface="+mn-cs"/>
+        </a:defRPr>
+      </a:lvl5pPr>
+      <a:lvl6pPr marL="2286000" algn="l" defTabSz="914400" rtl="0" eaLnBrk="1" latinLnBrk="0" hangingPunct="1">
+        <a:defRPr sz="1800" kern="1200">
+          <a:solidFill>
+            <a:schemeClr val="tx1"/>
+          </a:solidFill>
+          <a:latin typeface="+mn-lt"/>
+          <a:ea typeface="+mn-ea"/>
+          <a:cs typeface="+mn-cs"/>
+        </a:defRPr>
+      </a:lvl6pPr>
+      <a:lvl7pPr marL="2743200" algn="l" defTabSz="914400" rtl="0" eaLnBrk="1" latinLnBrk="0" hangingPunct="1">
+        <a:defRPr sz="1800" kern="1200">
+          <a:solidFill>
+            <a:schemeClr val="tx1"/>
+          </a:solidFill>
+          <a:latin typeface="+mn-lt"/>
+          <a:ea typeface="+mn-ea"/>
+          <a:cs typeface="+mn-cs"/>
+        </a:defRPr>
+      </a:lvl7pPr>
+      <a:lvl8pPr marL="3200400" algn="l" defTabSz="914400" rtl="0" eaLnBrk="1" latinLnBrk="0" hangingPunct="1">
+        <a:defRPr sz="1800" kern="1200">
+          <a:solidFill>
+            <a:schemeClr val="tx1"/>
+          </a:solidFill>
+          <a:latin typeface="+mn-lt"/>
+          <a:ea typeface="+mn-ea"/>
+          <a:cs typeface="+mn-cs"/>
+        </a:defRPr>
+      </a:lvl8pPr>
+      <a:lvl9pPr marL="3657600" algn="l" defTabSz="914400" rtl="0" eaLnBrk="1" latinLnBrk="0" hangingPunct="1">
+        <a:defRPr sz="1800" kern="1200">
+          <a:solidFill>
+            <a:schemeClr val="tx1"/>
+          </a:solidFill>
+          <a:latin typeface="+mn-lt"/>
+          <a:ea typeface="+mn-ea"/>
+          <a:cs typeface="+mn-cs"/>
+        </a:defRPr>
+      </a:lvl9pPr>
+    </p:otherStyle>
+  </p:txStyles>
+</p:sldMaster>
+</file>
+
+<file path=ppt/slideMasters/slideMaster2.xml><?xml version="1.0" encoding="utf-8"?>
+<p:sldMaster xmlns:a="http://schemas.openxmlformats.org/drawingml/2006/main" xmlns:r="http://schemas.openxmlformats.org/officeDocument/2006/relationships" xmlns:p="http://schemas.openxmlformats.org/presentationml/2006/main" preserve="1">
+  <p:cSld>
+    <p:bg>
+      <p:bgRef idx="1001">
+        <a:schemeClr val="bg1"/>
+      </p:bgRef>
+    </p:bg>
+    <p:spTree>
+      <p:nvGrpSpPr>
+        <p:cNvPr id="1" name=""/>
+        <p:cNvGrpSpPr/>
+        <p:nvPr/>
+      </p:nvGrpSpPr>
+      <p:grpSpPr>
+        <a:xfrm>
+          <a:off x="0" y="0"/>
+          <a:ext cx="0" cy="0"/>
+          <a:chOff x="0" y="0"/>
+          <a:chExt cx="0" cy="0"/>
+        </a:xfrm>
+      </p:grpSpPr>
+      <p:sp>
+        <p:nvSpPr>
+          <p:cNvPr id="2" name="Title Placeholder 1">
+            <a:extLst>
+              <a:ext uri="{FF2B5EF4-FFF2-40B4-BE49-F238E27FC236}">
+                <a16:creationId xmlns:a16="http://schemas.microsoft.com/office/drawing/2014/main" id="{2776DC2D-F0C2-457F-9C57-EE8A30F106E1}"/>
+              </a:ext>
+            </a:extLst>
+          </p:cNvPr>
+          <p:cNvSpPr>
+            <a:spLocks noGrp="1"/>
+          </p:cNvSpPr>
+          <p:nvPr>
+            <p:ph type="title"/>
+          </p:nvPr>
+        </p:nvSpPr>
+        <p:spPr>
+          <a:xfrm>
+            <a:off x="838200" y="365125"/>
+            <a:ext cx="10515600" cy="1325563"/>
+          </a:xfrm>
+          <a:prstGeom prst="rect">
+            <a:avLst/>
+          </a:prstGeom>
+        </p:spPr>
+        <p:txBody>
+          <a:bodyPr vert="horz" lIns="91440" tIns="45720" rIns="91440" bIns="45720" rtlCol="0" anchor="ctr">
+            <a:normAutofit/>
+          </a:bodyPr>
+          <a:lstStyle/>
+          <a:p>
+            <a:r>
+              <a:rPr lang="en-US"/>
+              <a:t>Click to edit Master title style</a:t>
+            </a:r>
+            <a:endParaRPr lang="ru-RU"/>
+          </a:p>
+        </p:txBody>
+      </p:sp>
+      <p:sp>
+        <p:nvSpPr>
+          <p:cNvPr id="3" name="Text Placeholder 2">
+            <a:extLst>
+              <a:ext uri="{FF2B5EF4-FFF2-40B4-BE49-F238E27FC236}">
+                <a16:creationId xmlns:a16="http://schemas.microsoft.com/office/drawing/2014/main" id="{B2B1526C-310A-4C91-88DE-FA8B2F528790}"/>
+              </a:ext>
+            </a:extLst>
+          </p:cNvPr>
+          <p:cNvSpPr>
+            <a:spLocks noGrp="1"/>
+          </p:cNvSpPr>
+          <p:nvPr>
+            <p:ph type="body" idx="1"/>
+          </p:nvPr>
+        </p:nvSpPr>
+        <p:spPr>
+          <a:xfrm>
+            <a:off x="838200" y="1825625"/>
+            <a:ext cx="10515600" cy="4351338"/>
+          </a:xfrm>
+          <a:prstGeom prst="rect">
+            <a:avLst/>
+          </a:prstGeom>
+        </p:spPr>
+        <p:txBody>
+          <a:bodyPr vert="horz" lIns="91440" tIns="45720" rIns="91440" bIns="45720" rtlCol="0">
+            <a:normAutofit/>
+          </a:bodyPr>
+          <a:lstStyle/>
+          <a:p>
+            <a:pPr lvl="0"/>
+            <a:r>
+              <a:rPr lang="en-US"/>
+              <a:t>Click to edit Master text styles</a:t>
+            </a:r>
+          </a:p>
+          <a:p>
+            <a:pPr lvl="1"/>
+            <a:r>
+              <a:rPr lang="en-US"/>
+              <a:t>Second level</a:t>
+            </a:r>
+          </a:p>
+          <a:p>
+            <a:pPr lvl="2"/>
+            <a:r>
+              <a:rPr lang="en-US"/>
+              <a:t>Third level</a:t>
+            </a:r>
+          </a:p>
+          <a:p>
+            <a:pPr lvl="3"/>
+            <a:r>
+              <a:rPr lang="en-US"/>
+              <a:t>Fourth level</a:t>
+            </a:r>
+          </a:p>
+          <a:p>
+            <a:pPr lvl="4"/>
+            <a:r>
+              <a:rPr lang="en-US"/>
+              <a:t>Fifth level</a:t>
+            </a:r>
+            <a:endParaRPr lang="ru-RU"/>
+          </a:p>
+        </p:txBody>
+      </p:sp>
+      <p:sp>
+        <p:nvSpPr>
+          <p:cNvPr id="4" name="Date Placeholder 3">
+            <a:extLst>
+              <a:ext uri="{FF2B5EF4-FFF2-40B4-BE49-F238E27FC236}">
+                <a16:creationId xmlns:a16="http://schemas.microsoft.com/office/drawing/2014/main" id="{968F1387-45CD-4559-9295-6443C5C82962}"/>
+              </a:ext>
+            </a:extLst>
+          </p:cNvPr>
+          <p:cNvSpPr>
+            <a:spLocks noGrp="1"/>
+          </p:cNvSpPr>
+          <p:nvPr>
+            <p:ph type="dt" sz="half" idx="2"/>
+          </p:nvPr>
+        </p:nvSpPr>
+        <p:spPr>
+          <a:xfrm>
+            <a:off x="838200" y="6356350"/>
+            <a:ext cx="2743200" cy="365125"/>
+          </a:xfrm>
+          <a:prstGeom prst="rect">
+            <a:avLst/>
+          </a:prstGeom>
+        </p:spPr>
+        <p:txBody>
+          <a:bodyPr vert="horz" lIns="91440" tIns="45720" rIns="91440" bIns="45720" rtlCol="0" anchor="ctr"/>
+          <a:lstStyle>
+            <a:lvl1pPr algn="l">
+              <a:defRPr sz="1200">
+                <a:solidFill>
+                  <a:schemeClr val="tx1">
+                    <a:tint val="75000"/>
+                  </a:schemeClr>
+                </a:solidFill>
+              </a:defRPr>
+            </a:lvl1pPr>
+          </a:lstStyle>
+          <a:p>
+            <a:fld id="{CCE9C9EE-394A-4997-9AB6-FF4DF45241DD}" type="datetimeFigureOut">
+              <a:rPr lang="ru-RU" smtClean="0"/>
+              <a:t>16.01.2021</a:t>
+            </a:fld>
+            <a:endParaRPr lang="ru-RU"/>
+          </a:p>
+        </p:txBody>
+      </p:sp>
+      <p:sp>
+        <p:nvSpPr>
+          <p:cNvPr id="5" name="Footer Placeholder 4">
+            <a:extLst>
+              <a:ext uri="{FF2B5EF4-FFF2-40B4-BE49-F238E27FC236}">
+                <a16:creationId xmlns:a16="http://schemas.microsoft.com/office/drawing/2014/main" id="{3157A664-63CB-4E5E-9B8A-40B049079BE7}"/>
+              </a:ext>
+            </a:extLst>
+          </p:cNvPr>
+          <p:cNvSpPr>
+            <a:spLocks noGrp="1"/>
+          </p:cNvSpPr>
+          <p:nvPr>
+            <p:ph type="ftr" sz="quarter" idx="3"/>
+          </p:nvPr>
+        </p:nvSpPr>
+        <p:spPr>
+          <a:xfrm>
+            <a:off x="4038600" y="6356350"/>
+            <a:ext cx="4114800" cy="365125"/>
+          </a:xfrm>
+          <a:prstGeom prst="rect">
+            <a:avLst/>
+          </a:prstGeom>
+        </p:spPr>
+        <p:txBody>
+          <a:bodyPr vert="horz" lIns="91440" tIns="45720" rIns="91440" bIns="45720" rtlCol="0" anchor="ctr"/>
+          <a:lstStyle>
+            <a:lvl1pPr algn="ctr">
+              <a:defRPr sz="1200">
+                <a:solidFill>
+                  <a:schemeClr val="tx1">
+                    <a:tint val="75000"/>
+                  </a:schemeClr>
+                </a:solidFill>
+              </a:defRPr>
+            </a:lvl1pPr>
+          </a:lstStyle>
+          <a:p>
+            <a:endParaRPr lang="ru-RU"/>
+          </a:p>
+        </p:txBody>
+      </p:sp>
+      <p:sp>
+        <p:nvSpPr>
+          <p:cNvPr id="6" name="Slide Number Placeholder 5">
+            <a:extLst>
+              <a:ext uri="{FF2B5EF4-FFF2-40B4-BE49-F238E27FC236}">
+                <a16:creationId xmlns:a16="http://schemas.microsoft.com/office/drawing/2014/main" id="{AFEBA7C1-6C01-440B-B61F-3C7C8C405D4F}"/>
+              </a:ext>
+            </a:extLst>
+          </p:cNvPr>
+          <p:cNvSpPr>
+            <a:spLocks noGrp="1"/>
+          </p:cNvSpPr>
+          <p:nvPr>
+            <p:ph type="sldNum" sz="quarter" idx="4"/>
+          </p:nvPr>
+        </p:nvSpPr>
+        <p:spPr>
+          <a:xfrm>
+            <a:off x="8610600" y="6356350"/>
+            <a:ext cx="2743200" cy="365125"/>
+          </a:xfrm>
+          <a:prstGeom prst="rect">
+            <a:avLst/>
+          </a:prstGeom>
+        </p:spPr>
+        <p:txBody>
+          <a:bodyPr vert="horz" lIns="91440" tIns="45720" rIns="91440" bIns="45720" rtlCol="0" anchor="ctr"/>
+          <a:lstStyle>
+            <a:lvl1pPr algn="r">
+              <a:defRPr sz="1200">
+                <a:solidFill>
+                  <a:schemeClr val="tx1">
+                    <a:tint val="75000"/>
+                  </a:schemeClr>
+                </a:solidFill>
+              </a:defRPr>
+            </a:lvl1pPr>
+          </a:lstStyle>
+          <a:p>
+            <a:fld id="{163AA9C3-46E6-45F3-8D85-E86FB74784B0}" type="slidenum">
+              <a:rPr lang="ru-RU" smtClean="0"/>
+              <a:t>‹#›</a:t>
+            </a:fld>
+            <a:endParaRPr lang="ru-RU"/>
+          </a:p>
+        </p:txBody>
+      </p:sp>
+    </p:spTree>
+    <p:extLst>
+      <p:ext uri="{BB962C8B-B14F-4D97-AF65-F5344CB8AC3E}">
+        <p14:creationId xmlns:p14="http://schemas.microsoft.com/office/powerpoint/2010/main" val="122591122"/>
+      </p:ext>
+    </p:extLst>
+  </p:cSld>
+  <p:clrMap bg1="lt1" tx1="dk1" bg2="lt2" tx2="dk2" accent1="accent1" accent2="accent2" accent3="accent3" accent4="accent4" accent5="accent5" accent6="accent6" hlink="hlink" folHlink="folHlink"/>
+  <p:sldLayoutIdLst>
+    <p:sldLayoutId id="2147483661" r:id="rId1"/>
+    <p:sldLayoutId id="2147483662" r:id="rId2"/>
+    <p:sldLayoutId id="2147483663" r:id="rId3"/>
+    <p:sldLayoutId id="2147483664" r:id="rId4"/>
+    <p:sldLayoutId id="2147483665" r:id="rId5"/>
+    <p:sldLayoutId id="2147483666" r:id="rId6"/>
+    <p:sldLayoutId id="2147483667" r:id="rId7"/>
+    <p:sldLayoutId id="2147483668" r:id="rId8"/>
+    <p:sldLayoutId id="2147483669" r:id="rId9"/>
+    <p:sldLayoutId id="2147483670" r:id="rId10"/>
+    <p:sldLayoutId id="2147483671" r:id="rId11"/>
+  </p:sldLayoutIdLst>
+  <p:txStyles>
+    <p:titleStyle>
+      <a:lvl1pPr algn="l" defTabSz="914400" rtl="0" eaLnBrk="1" latinLnBrk="0" hangingPunct="1">
+        <a:lnSpc>
+          <a:spcPct val="90000"/>
+        </a:lnSpc>
+        <a:spcBef>
+          <a:spcPct val="0"/>
+        </a:spcBef>
+        <a:buNone/>
+        <a:defRPr sz="4400" kern="1200">
+          <a:solidFill>
+            <a:schemeClr val="tx1"/>
+          </a:solidFill>
+          <a:latin typeface="+mj-lt"/>
+          <a:ea typeface="+mj-ea"/>
+          <a:cs typeface="+mj-cs"/>
+        </a:defRPr>
+      </a:lvl1pPr>
+    </p:titleStyle>
+    <p:bodyStyle>
+      <a:lvl1pPr marL="228600" indent="-228600" algn="l" defTabSz="914400" rtl="0" eaLnBrk="1" latinLnBrk="0" hangingPunct="1">
+        <a:lnSpc>
+          <a:spcPct val="90000"/>
+        </a:lnSpc>
+        <a:spcBef>
+          <a:spcPts val="1000"/>
+        </a:spcBef>
+        <a:buFont typeface="Arial" panose="020B0604020202020204" pitchFamily="34" charset="0"/>
+        <a:buChar char="•"/>
+        <a:defRPr sz="2800" kern="1200">
+          <a:solidFill>
+            <a:schemeClr val="tx1"/>
+          </a:solidFill>
+          <a:latin typeface="+mn-lt"/>
+          <a:ea typeface="+mn-ea"/>
+          <a:cs typeface="+mn-cs"/>
+        </a:defRPr>
+      </a:lvl1pPr>
+      <a:lvl2pPr marL="685800" indent="-228600" algn="l" defTabSz="914400" rtl="0" eaLnBrk="1" latinLnBrk="0" hangingPunct="1">
+        <a:lnSpc>
+          <a:spcPct val="90000"/>
+        </a:lnSpc>
+        <a:spcBef>
+          <a:spcPts val="500"/>
+        </a:spcBef>
+        <a:buFont typeface="Arial" panose="020B0604020202020204" pitchFamily="34" charset="0"/>
+        <a:buChar char="•"/>
+        <a:defRPr sz="2400" kern="1200">
+          <a:solidFill>
+            <a:schemeClr val="tx1"/>
+          </a:solidFill>
+          <a:latin typeface="+mn-lt"/>
+          <a:ea typeface="+mn-ea"/>
+          <a:cs typeface="+mn-cs"/>
+        </a:defRPr>
+      </a:lvl2pPr>
+      <a:lvl3pPr marL="1143000" indent="-228600" algn="l" defTabSz="914400" rtl="0" eaLnBrk="1" latinLnBrk="0" hangingPunct="1">
+        <a:lnSpc>
+          <a:spcPct val="90000"/>
+        </a:lnSpc>
+        <a:spcBef>
+          <a:spcPts val="500"/>
+        </a:spcBef>
+        <a:buFont typeface="Arial" panose="020B0604020202020204" pitchFamily="34" charset="0"/>
+        <a:buChar char="•"/>
+        <a:defRPr sz="2000" kern="1200">
+          <a:solidFill>
+            <a:schemeClr val="tx1"/>
+          </a:solidFill>
+          <a:latin typeface="+mn-lt"/>
+          <a:ea typeface="+mn-ea"/>
+          <a:cs typeface="+mn-cs"/>
+        </a:defRPr>
+      </a:lvl3pPr>
+      <a:lvl4pPr marL="1600200" indent="-228600" algn="l" defTabSz="914400" rtl="0" eaLnBrk="1" latinLnBrk="0" hangingPunct="1">
+        <a:lnSpc>
+          <a:spcPct val="90000"/>
+        </a:lnSpc>
+        <a:spcBef>
+          <a:spcPts val="500"/>
+        </a:spcBef>
+        <a:buFont typeface="Arial" panose="020B0604020202020204" pitchFamily="34" charset="0"/>
+        <a:buChar char="•"/>
+        <a:defRPr sz="1800" kern="1200">
+          <a:solidFill>
+            <a:schemeClr val="tx1"/>
+          </a:solidFill>
+          <a:latin typeface="+mn-lt"/>
+          <a:ea typeface="+mn-ea"/>
+          <a:cs typeface="+mn-cs"/>
+        </a:defRPr>
+      </a:lvl4pPr>
+      <a:lvl5pPr marL="2057400" indent="-228600" algn="l" defTabSz="914400" rtl="0" eaLnBrk="1" latinLnBrk="0" hangingPunct="1">
+        <a:lnSpc>
+          <a:spcPct val="90000"/>
+        </a:lnSpc>
+        <a:spcBef>
+          <a:spcPts val="500"/>
+        </a:spcBef>
+        <a:buFont typeface="Arial" panose="020B0604020202020204" pitchFamily="34" charset="0"/>
+        <a:buChar char="•"/>
+        <a:defRPr sz="1800" kern="1200">
+          <a:solidFill>
+            <a:schemeClr val="tx1"/>
+          </a:solidFill>
+          <a:latin typeface="+mn-lt"/>
+          <a:ea typeface="+mn-ea"/>
+          <a:cs typeface="+mn-cs"/>
+        </a:defRPr>
+      </a:lvl5pPr>
+      <a:lvl6pPr marL="2514600" indent="-228600" algn="l" defTabSz="914400" rtl="0" eaLnBrk="1" latinLnBrk="0" hangingPunct="1">
+        <a:lnSpc>
+          <a:spcPct val="90000"/>
+        </a:lnSpc>
+        <a:spcBef>
+          <a:spcPts val="500"/>
+        </a:spcBef>
+        <a:buFont typeface="Arial" panose="020B0604020202020204" pitchFamily="34" charset="0"/>
+        <a:buChar char="•"/>
+        <a:defRPr sz="1800" kern="1200">
+          <a:solidFill>
+            <a:schemeClr val="tx1"/>
+          </a:solidFill>
+          <a:latin typeface="+mn-lt"/>
+          <a:ea typeface="+mn-ea"/>
+          <a:cs typeface="+mn-cs"/>
+        </a:defRPr>
+      </a:lvl6pPr>
+      <a:lvl7pPr marL="2971800" indent="-228600" algn="l" defTabSz="914400" rtl="0" eaLnBrk="1" latinLnBrk="0" hangingPunct="1">
+        <a:lnSpc>
+          <a:spcPct val="90000"/>
+        </a:lnSpc>
+        <a:spcBef>
+          <a:spcPts val="500"/>
+        </a:spcBef>
+        <a:buFont typeface="Arial" panose="020B0604020202020204" pitchFamily="34" charset="0"/>
+        <a:buChar char="•"/>
+        <a:defRPr sz="1800" kern="1200">
+          <a:solidFill>
+            <a:schemeClr val="tx1"/>
+          </a:solidFill>
+          <a:latin typeface="+mn-lt"/>
+          <a:ea typeface="+mn-ea"/>
+          <a:cs typeface="+mn-cs"/>
+        </a:defRPr>
+      </a:lvl7pPr>
+      <a:lvl8pPr marL="3429000" indent="-228600" algn="l" defTabSz="914400" rtl="0" eaLnBrk="1" latinLnBrk="0" hangingPunct="1">
+        <a:lnSpc>
+          <a:spcPct val="90000"/>
+        </a:lnSpc>
+        <a:spcBef>
+          <a:spcPts val="500"/>
+        </a:spcBef>
+        <a:buFont typeface="Arial" panose="020B0604020202020204" pitchFamily="34" charset="0"/>
+        <a:buChar char="•"/>
+        <a:defRPr sz="1800" kern="1200">
+          <a:solidFill>
+            <a:schemeClr val="tx1"/>
+          </a:solidFill>
+          <a:latin typeface="+mn-lt"/>
+          <a:ea typeface="+mn-ea"/>
+          <a:cs typeface="+mn-cs"/>
+        </a:defRPr>
+      </a:lvl8pPr>
+      <a:lvl9pPr marL="3886200" indent="-228600" algn="l" defTabSz="914400" rtl="0" eaLnBrk="1" latinLnBrk="0" hangingPunct="1">
+        <a:lnSpc>
+          <a:spcPct val="90000"/>
+        </a:lnSpc>
+        <a:spcBef>
+          <a:spcPts val="500"/>
+        </a:spcBef>
+        <a:buFont typeface="Arial" panose="020B0604020202020204" pitchFamily="34" charset="0"/>
+        <a:buChar char="•"/>
+        <a:defRPr sz="1800" kern="1200">
+          <a:solidFill>
+            <a:schemeClr val="tx1"/>
+          </a:solidFill>
+          <a:latin typeface="+mn-lt"/>
+          <a:ea typeface="+mn-ea"/>
+          <a:cs typeface="+mn-cs"/>
+        </a:defRPr>
+      </a:lvl9pPr>
+    </p:bodyStyle>
+    <p:otherStyle>
+      <a:defPPr>
+        <a:defRPr lang="ru-RU"/>
       </a:defPPr>
       <a:lvl1pPr marL="0" algn="l" defTabSz="914400" rtl="0" eaLnBrk="1" latinLnBrk="0" hangingPunct="1">
         <a:defRPr sz="1800" kern="1200">
@@ -5176,4 +8395,299 @@
     </a:ext>
   </a:extLst>
 </a:theme>
+</file>
+
+<file path=ppt/theme/theme2.xml><?xml version="1.0" encoding="utf-8"?>
+<a:theme xmlns:a="http://schemas.openxmlformats.org/drawingml/2006/main" name="Custom Design">
+  <a:themeElements>
+    <a:clrScheme name="Office">
+      <a:dk1>
+        <a:sysClr val="windowText" lastClr="000000"/>
+      </a:dk1>
+      <a:lt1>
+        <a:sysClr val="window" lastClr="FFFFFF"/>
+      </a:lt1>
+      <a:dk2>
+        <a:srgbClr val="44546A"/>
+      </a:dk2>
+      <a:lt2>
+        <a:srgbClr val="E7E6E6"/>
+      </a:lt2>
+      <a:accent1>
+        <a:srgbClr val="4472C4"/>
+      </a:accent1>
+      <a:accent2>
+        <a:srgbClr val="ED7D31"/>
+      </a:accent2>
+      <a:accent3>
+        <a:srgbClr val="A5A5A5"/>
+      </a:accent3>
+      <a:accent4>
+        <a:srgbClr val="FFC000"/>
+      </a:accent4>
+      <a:accent5>
+        <a:srgbClr val="5B9BD5"/>
+      </a:accent5>
+      <a:accent6>
+        <a:srgbClr val="70AD47"/>
+      </a:accent6>
+      <a:hlink>
+        <a:srgbClr val="0563C1"/>
+      </a:hlink>
+      <a:folHlink>
+        <a:srgbClr val="954F72"/>
+      </a:folHlink>
+    </a:clrScheme>
+    <a:fontScheme name="Office">
+      <a:majorFont>
+        <a:latin typeface="Calibri Light" panose="020F0302020204030204"/>
+        <a:ea typeface=""/>
+        <a:cs typeface=""/>
+        <a:font script="Jpan" typeface="游ゴシック Light"/>
+        <a:font script="Hang" typeface="맑은 고딕"/>
+        <a:font script="Hans" typeface="等线 Light"/>
+        <a:font script="Hant" typeface="新細明體"/>
+        <a:font script="Arab" typeface="Times New Roman"/>
+        <a:font script="Hebr" typeface="Times New Roman"/>
+        <a:font script="Thai" typeface="Angsana New"/>
+        <a:font script="Ethi" typeface="Nyala"/>
+        <a:font script="Beng" typeface="Vrinda"/>
+        <a:font script="Gujr" typeface="Shruti"/>
+        <a:font script="Khmr" typeface="MoolBoran"/>
+        <a:font script="Knda" typeface="Tunga"/>
+        <a:font script="Guru" typeface="Raavi"/>
+        <a:font script="Cans" typeface="Euphemia"/>
+        <a:font script="Cher" typeface="Plantagenet Cherokee"/>
+        <a:font script="Yiii" typeface="Microsoft Yi Baiti"/>
+        <a:font script="Tibt" typeface="Microsoft Himalaya"/>
+        <a:font script="Thaa" typeface="MV Boli"/>
+        <a:font script="Deva" typeface="Mangal"/>
+        <a:font script="Telu" typeface="Gautami"/>
+        <a:font script="Taml" typeface="Latha"/>
+        <a:font script="Syrc" typeface="Estrangelo Edessa"/>
+        <a:font script="Orya" typeface="Kalinga"/>
+        <a:font script="Mlym" typeface="Kartika"/>
+        <a:font script="Laoo" typeface="DokChampa"/>
+        <a:font script="Sinh" typeface="Iskoola Pota"/>
+        <a:font script="Mong" typeface="Mongolian Baiti"/>
+        <a:font script="Viet" typeface="Times New Roman"/>
+        <a:font script="Uigh" typeface="Microsoft Uighur"/>
+        <a:font script="Geor" typeface="Sylfaen"/>
+        <a:font script="Armn" typeface="Arial"/>
+        <a:font script="Bugi" typeface="Leelawadee UI"/>
+        <a:font script="Bopo" typeface="Microsoft JhengHei"/>
+        <a:font script="Java" typeface="Javanese Text"/>
+        <a:font script="Lisu" typeface="Segoe UI"/>
+        <a:font script="Mymr" typeface="Myanmar Text"/>
+        <a:font script="Nkoo" typeface="Ebrima"/>
+        <a:font script="Olck" typeface="Nirmala UI"/>
+        <a:font script="Osma" typeface="Ebrima"/>
+        <a:font script="Phag" typeface="Phagspa"/>
+        <a:font script="Syrn" typeface="Estrangelo Edessa"/>
+        <a:font script="Syrj" typeface="Estrangelo Edessa"/>
+        <a:font script="Syre" typeface="Estrangelo Edessa"/>
+        <a:font script="Sora" typeface="Nirmala UI"/>
+        <a:font script="Tale" typeface="Microsoft Tai Le"/>
+        <a:font script="Talu" typeface="Microsoft New Tai Lue"/>
+        <a:font script="Tfng" typeface="Ebrima"/>
+      </a:majorFont>
+      <a:minorFont>
+        <a:latin typeface="Calibri" panose="020F0502020204030204"/>
+        <a:ea typeface=""/>
+        <a:cs typeface=""/>
+        <a:font script="Jpan" typeface="游ゴシック"/>
+        <a:font script="Hang" typeface="맑은 고딕"/>
+        <a:font script="Hans" typeface="等线"/>
+        <a:font script="Hant" typeface="新細明體"/>
+        <a:font script="Arab" typeface="Arial"/>
+        <a:font script="Hebr" typeface="Arial"/>
+        <a:font script="Thai" typeface="Cordia New"/>
+        <a:font script="Ethi" typeface="Nyala"/>
+        <a:font script="Beng" typeface="Vrinda"/>
+        <a:font script="Gujr" typeface="Shruti"/>
+        <a:font script="Khmr" typeface="DaunPenh"/>
+        <a:font script="Knda" typeface="Tunga"/>
+        <a:font script="Guru" typeface="Raavi"/>
+        <a:font script="Cans" typeface="Euphemia"/>
+        <a:font script="Cher" typeface="Plantagenet Cherokee"/>
+        <a:font script="Yiii" typeface="Microsoft Yi Baiti"/>
+        <a:font script="Tibt" typeface="Microsoft Himalaya"/>
+        <a:font script="Thaa" typeface="MV Boli"/>
+        <a:font script="Deva" typeface="Mangal"/>
+        <a:font script="Telu" typeface="Gautami"/>
+        <a:font script="Taml" typeface="Latha"/>
+        <a:font script="Syrc" typeface="Estrangelo Edessa"/>
+        <a:font script="Orya" typeface="Kalinga"/>
+        <a:font script="Mlym" typeface="Kartika"/>
+        <a:font script="Laoo" typeface="DokChampa"/>
+        <a:font script="Sinh" typeface="Iskoola Pota"/>
+        <a:font script="Mong" typeface="Mongolian Baiti"/>
+        <a:font script="Viet" typeface="Arial"/>
+        <a:font script="Uigh" typeface="Microsoft Uighur"/>
+        <a:font script="Geor" typeface="Sylfaen"/>
+        <a:font script="Armn" typeface="Arial"/>
+        <a:font script="Bugi" typeface="Leelawadee UI"/>
+        <a:font script="Bopo" typeface="Microsoft JhengHei"/>
+        <a:font script="Java" typeface="Javanese Text"/>
+        <a:font script="Lisu" typeface="Segoe UI"/>
+        <a:font script="Mymr" typeface="Myanmar Text"/>
+        <a:font script="Nkoo" typeface="Ebrima"/>
+        <a:font script="Olck" typeface="Nirmala UI"/>
+        <a:font script="Osma" typeface="Ebrima"/>
+        <a:font script="Phag" typeface="Phagspa"/>
+        <a:font script="Syrn" typeface="Estrangelo Edessa"/>
+        <a:font script="Syrj" typeface="Estrangelo Edessa"/>
+        <a:font script="Syre" typeface="Estrangelo Edessa"/>
+        <a:font script="Sora" typeface="Nirmala UI"/>
+        <a:font script="Tale" typeface="Microsoft Tai Le"/>
+        <a:font script="Talu" typeface="Microsoft New Tai Lue"/>
+        <a:font script="Tfng" typeface="Ebrima"/>
+      </a:minorFont>
+    </a:fontScheme>
+    <a:fmtScheme name="Office">
+      <a:fillStyleLst>
+        <a:solidFill>
+          <a:schemeClr val="phClr"/>
+        </a:solidFill>
+        <a:gradFill rotWithShape="1">
+          <a:gsLst>
+            <a:gs pos="0">
+              <a:schemeClr val="phClr">
+                <a:lumMod val="110000"/>
+                <a:satMod val="105000"/>
+                <a:tint val="67000"/>
+              </a:schemeClr>
+            </a:gs>
+            <a:gs pos="50000">
+              <a:schemeClr val="phClr">
+                <a:lumMod val="105000"/>
+                <a:satMod val="103000"/>
+                <a:tint val="73000"/>
+              </a:schemeClr>
+            </a:gs>
+            <a:gs pos="100000">
+              <a:schemeClr val="phClr">
+                <a:lumMod val="105000"/>
+                <a:satMod val="109000"/>
+                <a:tint val="81000"/>
+              </a:schemeClr>
+            </a:gs>
+          </a:gsLst>
+          <a:lin ang="5400000" scaled="0"/>
+        </a:gradFill>
+        <a:gradFill rotWithShape="1">
+          <a:gsLst>
+            <a:gs pos="0">
+              <a:schemeClr val="phClr">
+                <a:satMod val="103000"/>
+                <a:lumMod val="102000"/>
+                <a:tint val="94000"/>
+              </a:schemeClr>
+            </a:gs>
+            <a:gs pos="50000">
+              <a:schemeClr val="phClr">
+                <a:satMod val="110000"/>
+                <a:lumMod val="100000"/>
+                <a:shade val="100000"/>
+              </a:schemeClr>
+            </a:gs>
+            <a:gs pos="100000">
+              <a:schemeClr val="phClr">
+                <a:lumMod val="99000"/>
+                <a:satMod val="120000"/>
+                <a:shade val="78000"/>
+              </a:schemeClr>
+            </a:gs>
+          </a:gsLst>
+          <a:lin ang="5400000" scaled="0"/>
+        </a:gradFill>
+      </a:fillStyleLst>
+      <a:lnStyleLst>
+        <a:ln w="6350" cap="flat" cmpd="sng" algn="ctr">
+          <a:solidFill>
+            <a:schemeClr val="phClr"/>
+          </a:solidFill>
+          <a:prstDash val="solid"/>
+          <a:miter lim="800000"/>
+        </a:ln>
+        <a:ln w="12700" cap="flat" cmpd="sng" algn="ctr">
+          <a:solidFill>
+            <a:schemeClr val="phClr"/>
+          </a:solidFill>
+          <a:prstDash val="solid"/>
+          <a:miter lim="800000"/>
+        </a:ln>
+        <a:ln w="19050" cap="flat" cmpd="sng" algn="ctr">
+          <a:solidFill>
+            <a:schemeClr val="phClr"/>
+          </a:solidFill>
+          <a:prstDash val="solid"/>
+          <a:miter lim="800000"/>
+        </a:ln>
+      </a:lnStyleLst>
+      <a:effectStyleLst>
+        <a:effectStyle>
+          <a:effectLst/>
+        </a:effectStyle>
+        <a:effectStyle>
+          <a:effectLst/>
+        </a:effectStyle>
+        <a:effectStyle>
+          <a:effectLst>
+            <a:outerShdw blurRad="57150" dist="19050" dir="5400000" algn="ctr" rotWithShape="0">
+              <a:srgbClr val="000000">
+                <a:alpha val="63000"/>
+              </a:srgbClr>
+            </a:outerShdw>
+          </a:effectLst>
+        </a:effectStyle>
+      </a:effectStyleLst>
+      <a:bgFillStyleLst>
+        <a:solidFill>
+          <a:schemeClr val="phClr"/>
+        </a:solidFill>
+        <a:solidFill>
+          <a:schemeClr val="phClr">
+            <a:tint val="95000"/>
+            <a:satMod val="170000"/>
+          </a:schemeClr>
+        </a:solidFill>
+        <a:gradFill rotWithShape="1">
+          <a:gsLst>
+            <a:gs pos="0">
+              <a:schemeClr val="phClr">
+                <a:tint val="93000"/>
+                <a:satMod val="150000"/>
+                <a:shade val="98000"/>
+                <a:lumMod val="102000"/>
+              </a:schemeClr>
+            </a:gs>
+            <a:gs pos="50000">
+              <a:schemeClr val="phClr">
+                <a:tint val="98000"/>
+                <a:satMod val="130000"/>
+                <a:shade val="90000"/>
+                <a:lumMod val="103000"/>
+              </a:schemeClr>
+            </a:gs>
+            <a:gs pos="100000">
+              <a:schemeClr val="phClr">
+                <a:shade val="63000"/>
+                <a:satMod val="120000"/>
+              </a:schemeClr>
+            </a:gs>
+          </a:gsLst>
+          <a:lin ang="5400000" scaled="0"/>
+        </a:gradFill>
+      </a:bgFillStyleLst>
+    </a:fmtScheme>
+  </a:themeElements>
+  <a:objectDefaults/>
+  <a:extraClrSchemeLst/>
+  <a:extLst>
+    <a:ext uri="{05A4C25C-085E-4340-85A3-A5531E510DB2}">
+      <thm15:themeFamily xmlns:thm15="http://schemas.microsoft.com/office/thememl/2012/main" name="Office Theme" id="{62F939B6-93AF-4DB8-9C6B-D6C7DFDC589F}" vid="{4A3C46E8-61CC-4603-A589-7422A47A8E4A}"/>
+    </a:ext>
+  </a:extLst>
+</a:theme>
 </file>
</xml_diff>

<commit_message>
SC-66: Fix parsing sheet name
</commit_message>
<xml_diff>
--- a/ShapeCrawler.Tests.Unit/Resource/002.pptx
+++ b/ShapeCrawler.Tests.Unit/Resource/002.pptx
@@ -1200,7 +1200,7 @@
           <a:p>
             <a:fld id="{3CB2ACD1-A4A6-4B80-B4FE-51F8801B8731}" type="datetimeFigureOut">
               <a:rPr lang="en-US" smtClean="0"/>
-              <a:t>9/11/2021</a:t>
+              <a:t>2/5/2022</a:t>
             </a:fld>
             <a:endParaRPr lang="en-US"/>
           </a:p>
@@ -1703,7 +1703,7 @@
           <a:p>
             <a:fld id="{6A2D1428-0459-4F75-829F-043936AE8C9E}" type="datetimeFigureOut">
               <a:rPr lang="en-US" smtClean="0"/>
-              <a:t>9/11/2021</a:t>
+              <a:t>2/5/2022</a:t>
             </a:fld>
             <a:endParaRPr lang="en-US"/>
           </a:p>
@@ -1903,7 +1903,7 @@
           <a:p>
             <a:fld id="{6A2D1428-0459-4F75-829F-043936AE8C9E}" type="datetimeFigureOut">
               <a:rPr lang="en-US" smtClean="0"/>
-              <a:t>9/11/2021</a:t>
+              <a:t>2/5/2022</a:t>
             </a:fld>
             <a:endParaRPr lang="en-US"/>
           </a:p>
@@ -2113,7 +2113,7 @@
           <a:p>
             <a:fld id="{6A2D1428-0459-4F75-829F-043936AE8C9E}" type="datetimeFigureOut">
               <a:rPr lang="en-US" smtClean="0"/>
-              <a:t>9/11/2021</a:t>
+              <a:t>2/5/2022</a:t>
             </a:fld>
             <a:endParaRPr lang="en-US"/>
           </a:p>
@@ -2335,7 +2335,7 @@
           <a:p>
             <a:fld id="{CCE9C9EE-394A-4997-9AB6-FF4DF45241DD}" type="datetimeFigureOut">
               <a:rPr lang="ru-RU" smtClean="0"/>
-              <a:t>11.09.2021</a:t>
+              <a:t>05.02.2022</a:t>
             </a:fld>
             <a:endParaRPr lang="ru-RU"/>
           </a:p>
@@ -2535,7 +2535,7 @@
           <a:p>
             <a:fld id="{CCE9C9EE-394A-4997-9AB6-FF4DF45241DD}" type="datetimeFigureOut">
               <a:rPr lang="ru-RU" smtClean="0"/>
-              <a:t>11.09.2021</a:t>
+              <a:t>05.02.2022</a:t>
             </a:fld>
             <a:endParaRPr lang="ru-RU"/>
           </a:p>
@@ -2811,7 +2811,7 @@
           <a:p>
             <a:fld id="{CCE9C9EE-394A-4997-9AB6-FF4DF45241DD}" type="datetimeFigureOut">
               <a:rPr lang="ru-RU" smtClean="0"/>
-              <a:t>11.09.2021</a:t>
+              <a:t>05.02.2022</a:t>
             </a:fld>
             <a:endParaRPr lang="ru-RU"/>
           </a:p>
@@ -3079,7 +3079,7 @@
           <a:p>
             <a:fld id="{CCE9C9EE-394A-4997-9AB6-FF4DF45241DD}" type="datetimeFigureOut">
               <a:rPr lang="ru-RU" smtClean="0"/>
-              <a:t>11.09.2021</a:t>
+              <a:t>05.02.2022</a:t>
             </a:fld>
             <a:endParaRPr lang="ru-RU"/>
           </a:p>
@@ -3494,7 +3494,7 @@
           <a:p>
             <a:fld id="{CCE9C9EE-394A-4997-9AB6-FF4DF45241DD}" type="datetimeFigureOut">
               <a:rPr lang="ru-RU" smtClean="0"/>
-              <a:t>11.09.2021</a:t>
+              <a:t>05.02.2022</a:t>
             </a:fld>
             <a:endParaRPr lang="ru-RU"/>
           </a:p>
@@ -3636,7 +3636,7 @@
           <a:p>
             <a:fld id="{CCE9C9EE-394A-4997-9AB6-FF4DF45241DD}" type="datetimeFigureOut">
               <a:rPr lang="ru-RU" smtClean="0"/>
-              <a:t>11.09.2021</a:t>
+              <a:t>05.02.2022</a:t>
             </a:fld>
             <a:endParaRPr lang="ru-RU"/>
           </a:p>
@@ -3749,7 +3749,7 @@
           <a:p>
             <a:fld id="{CCE9C9EE-394A-4997-9AB6-FF4DF45241DD}" type="datetimeFigureOut">
               <a:rPr lang="ru-RU" smtClean="0"/>
-              <a:t>11.09.2021</a:t>
+              <a:t>05.02.2022</a:t>
             </a:fld>
             <a:endParaRPr lang="ru-RU"/>
           </a:p>
@@ -4062,7 +4062,7 @@
           <a:p>
             <a:fld id="{CCE9C9EE-394A-4997-9AB6-FF4DF45241DD}" type="datetimeFigureOut">
               <a:rPr lang="ru-RU" smtClean="0"/>
-              <a:t>11.09.2021</a:t>
+              <a:t>05.02.2022</a:t>
             </a:fld>
             <a:endParaRPr lang="ru-RU"/>
           </a:p>
@@ -4262,7 +4262,7 @@
           <a:p>
             <a:fld id="{6A2D1428-0459-4F75-829F-043936AE8C9E}" type="datetimeFigureOut">
               <a:rPr lang="en-US" smtClean="0"/>
-              <a:t>9/11/2021</a:t>
+              <a:t>2/5/2022</a:t>
             </a:fld>
             <a:endParaRPr lang="en-US"/>
           </a:p>
@@ -4551,7 +4551,7 @@
           <a:p>
             <a:fld id="{CCE9C9EE-394A-4997-9AB6-FF4DF45241DD}" type="datetimeFigureOut">
               <a:rPr lang="ru-RU" smtClean="0"/>
-              <a:t>11.09.2021</a:t>
+              <a:t>05.02.2022</a:t>
             </a:fld>
             <a:endParaRPr lang="ru-RU"/>
           </a:p>
@@ -4751,7 +4751,7 @@
           <a:p>
             <a:fld id="{CCE9C9EE-394A-4997-9AB6-FF4DF45241DD}" type="datetimeFigureOut">
               <a:rPr lang="ru-RU" smtClean="0"/>
-              <a:t>11.09.2021</a:t>
+              <a:t>05.02.2022</a:t>
             </a:fld>
             <a:endParaRPr lang="ru-RU"/>
           </a:p>
@@ -4961,7 +4961,7 @@
           <a:p>
             <a:fld id="{CCE9C9EE-394A-4997-9AB6-FF4DF45241DD}" type="datetimeFigureOut">
               <a:rPr lang="ru-RU" smtClean="0"/>
-              <a:t>11.09.2021</a:t>
+              <a:t>05.02.2022</a:t>
             </a:fld>
             <a:endParaRPr lang="ru-RU"/>
           </a:p>
@@ -5237,7 +5237,7 @@
           <a:p>
             <a:fld id="{6A2D1428-0459-4F75-829F-043936AE8C9E}" type="datetimeFigureOut">
               <a:rPr lang="en-US" smtClean="0"/>
-              <a:t>9/11/2021</a:t>
+              <a:t>2/5/2022</a:t>
             </a:fld>
             <a:endParaRPr lang="en-US"/>
           </a:p>
@@ -5505,7 +5505,7 @@
           <a:p>
             <a:fld id="{6A2D1428-0459-4F75-829F-043936AE8C9E}" type="datetimeFigureOut">
               <a:rPr lang="en-US" smtClean="0"/>
-              <a:t>9/11/2021</a:t>
+              <a:t>2/5/2022</a:t>
             </a:fld>
             <a:endParaRPr lang="en-US"/>
           </a:p>
@@ -5920,7 +5920,7 @@
           <a:p>
             <a:fld id="{6A2D1428-0459-4F75-829F-043936AE8C9E}" type="datetimeFigureOut">
               <a:rPr lang="en-US" smtClean="0"/>
-              <a:t>9/11/2021</a:t>
+              <a:t>2/5/2022</a:t>
             </a:fld>
             <a:endParaRPr lang="en-US"/>
           </a:p>
@@ -6062,7 +6062,7 @@
           <a:p>
             <a:fld id="{6A2D1428-0459-4F75-829F-043936AE8C9E}" type="datetimeFigureOut">
               <a:rPr lang="en-US" smtClean="0"/>
-              <a:t>9/11/2021</a:t>
+              <a:t>2/5/2022</a:t>
             </a:fld>
             <a:endParaRPr lang="en-US"/>
           </a:p>
@@ -6175,7 +6175,7 @@
           <a:p>
             <a:fld id="{6A2D1428-0459-4F75-829F-043936AE8C9E}" type="datetimeFigureOut">
               <a:rPr lang="en-US" smtClean="0"/>
-              <a:t>9/11/2021</a:t>
+              <a:t>2/5/2022</a:t>
             </a:fld>
             <a:endParaRPr lang="en-US"/>
           </a:p>
@@ -6488,7 +6488,7 @@
           <a:p>
             <a:fld id="{6A2D1428-0459-4F75-829F-043936AE8C9E}" type="datetimeFigureOut">
               <a:rPr lang="en-US" smtClean="0"/>
-              <a:t>9/11/2021</a:t>
+              <a:t>2/5/2022</a:t>
             </a:fld>
             <a:endParaRPr lang="en-US"/>
           </a:p>
@@ -6777,7 +6777,7 @@
           <a:p>
             <a:fld id="{6A2D1428-0459-4F75-829F-043936AE8C9E}" type="datetimeFigureOut">
               <a:rPr lang="en-US" smtClean="0"/>
-              <a:t>9/11/2021</a:t>
+              <a:t>2/5/2022</a:t>
             </a:fld>
             <a:endParaRPr lang="en-US"/>
           </a:p>
@@ -7020,7 +7020,7 @@
           <a:p>
             <a:fld id="{6A2D1428-0459-4F75-829F-043936AE8C9E}" type="datetimeFigureOut">
               <a:rPr lang="en-US" smtClean="0"/>
-              <a:t>9/11/2021</a:t>
+              <a:t>2/5/2022</a:t>
             </a:fld>
             <a:endParaRPr lang="en-US"/>
           </a:p>
@@ -7590,7 +7590,7 @@
           <a:p>
             <a:fld id="{CCE9C9EE-394A-4997-9AB6-FF4DF45241DD}" type="datetimeFigureOut">
               <a:rPr lang="ru-RU" smtClean="0"/>
-              <a:t>11.09.2021</a:t>
+              <a:t>05.02.2022</a:t>
             </a:fld>
             <a:endParaRPr lang="ru-RU"/>
           </a:p>
@@ -8148,7 +8148,7 @@
       </p:pic>
       <p:graphicFrame>
         <p:nvGraphicFramePr>
-          <p:cNvPr id="9" name="Диаграмма 8">
+          <p:cNvPr id="9" name="Chart 8">
             <a:extLst>
               <a:ext uri="{FF2B5EF4-FFF2-40B4-BE49-F238E27FC236}">
                 <a16:creationId xmlns:a16="http://schemas.microsoft.com/office/drawing/2014/main" id="{FED8C2D6-A336-48F1-8E82-B1F73F49404E}"/>
@@ -8159,7 +8159,7 @@
           <p:nvPr>
             <p:extLst>
               <p:ext uri="{D42A27DB-BD31-4B8C-83A1-F6EECF244321}">
-                <p14:modId xmlns:p14="http://schemas.microsoft.com/office/powerpoint/2010/main" val="3873739331"/>
+                <p14:modId xmlns:p14="http://schemas.microsoft.com/office/powerpoint/2010/main" val="373471811"/>
               </p:ext>
             </p:extLst>
           </p:nvPr>

</xml_diff>